<commit_message>
Termino primeira semana do curso
</commit_message>
<xml_diff>
--- a/Documentos/Curso Java.pptx
+++ b/Documentos/Curso Java.pptx
@@ -5,7 +5,7 @@
     <p:sldMasterId id="2147483802" r:id="rId1"/>
   </p:sldMasterIdLst>
   <p:notesMasterIdLst>
-    <p:notesMasterId r:id="rId28"/>
+    <p:notesMasterId r:id="rId38"/>
   </p:notesMasterIdLst>
   <p:sldIdLst>
     <p:sldId id="256" r:id="rId2"/>
@@ -34,6 +34,16 @@
     <p:sldId id="280" r:id="rId25"/>
     <p:sldId id="281" r:id="rId26"/>
     <p:sldId id="282" r:id="rId27"/>
+    <p:sldId id="285" r:id="rId28"/>
+    <p:sldId id="286" r:id="rId29"/>
+    <p:sldId id="287" r:id="rId30"/>
+    <p:sldId id="288" r:id="rId31"/>
+    <p:sldId id="289" r:id="rId32"/>
+    <p:sldId id="294" r:id="rId33"/>
+    <p:sldId id="290" r:id="rId34"/>
+    <p:sldId id="295" r:id="rId35"/>
+    <p:sldId id="292" r:id="rId36"/>
+    <p:sldId id="293" r:id="rId37"/>
   </p:sldIdLst>
   <p:sldSz cx="9144000" cy="6858000" type="screen4x3"/>
   <p:notesSz cx="6858000" cy="9144000"/>
@@ -217,7 +227,7 @@
           <a:p>
             <a:fld id="{E2B913E8-0330-B643-A20B-1A6E83DAE541}" type="datetimeFigureOut">
               <a:rPr lang="en-US" smtClean="0"/>
-              <a:t>14/11/14</a:t>
+              <a:t>17/11/14</a:t>
             </a:fld>
             <a:endParaRPr lang="en-US"/>
           </a:p>
@@ -767,7 +777,7 @@
             <a:fld id="{9EB5ECD5-515E-4817-8A06-1D2ED2C83850}" type="datetime4">
               <a:rPr lang="en-US" smtClean="0"/>
               <a:pPr/>
-              <a:t>November 14, 2014</a:t>
+              <a:t>November 17, 2014</a:t>
             </a:fld>
             <a:endParaRPr lang="en-US"/>
           </a:p>
@@ -939,7 +949,7 @@
             <a:fld id="{BA5B59F4-DDCB-41FF-83F5-A48440F36FA7}" type="datetime4">
               <a:rPr lang="en-US" smtClean="0"/>
               <a:pPr/>
-              <a:t>November 14, 2014</a:t>
+              <a:t>November 17, 2014</a:t>
             </a:fld>
             <a:endParaRPr lang="en-US"/>
           </a:p>
@@ -2059,7 +2069,7 @@
             <a:fld id="{48056348-D703-428C-A1C4-7D6796EF5F41}" type="datetime4">
               <a:rPr lang="en-US" smtClean="0"/>
               <a:pPr/>
-              <a:t>November 14, 2014</a:t>
+              <a:t>November 17, 2014</a:t>
             </a:fld>
             <a:endParaRPr lang="en-US"/>
           </a:p>
@@ -3169,7 +3179,7 @@
             <a:fld id="{732D1919-1B5F-4141-B613-3E5C6008A186}" type="datetime4">
               <a:rPr lang="en-US" smtClean="0"/>
               <a:pPr/>
-              <a:t>November 14, 2014</a:t>
+              <a:t>November 17, 2014</a:t>
             </a:fld>
             <a:endParaRPr lang="en-US"/>
           </a:p>
@@ -3417,7 +3427,7 @@
             <a:fld id="{BAD22427-B1DD-49E6-9F05-DE0F1467D7DC}" type="datetime4">
               <a:rPr lang="en-US" smtClean="0"/>
               <a:pPr/>
-              <a:t>November 14, 2014</a:t>
+              <a:t>November 17, 2014</a:t>
             </a:fld>
             <a:endParaRPr lang="en-US"/>
           </a:p>
@@ -3707,7 +3717,7 @@
             <a:fld id="{BBCCA7B5-8BC9-491C-A887-7C3E7ED947D8}" type="datetime4">
               <a:rPr lang="en-US" smtClean="0"/>
               <a:pPr/>
-              <a:t>November 14, 2014</a:t>
+              <a:t>November 17, 2014</a:t>
             </a:fld>
             <a:endParaRPr lang="en-US"/>
           </a:p>
@@ -4131,7 +4141,7 @@
             <a:fld id="{BDA18ED0-40F2-434C-A848-B92581875164}" type="datetime4">
               <a:rPr lang="en-US" smtClean="0"/>
               <a:pPr/>
-              <a:t>November 14, 2014</a:t>
+              <a:t>November 17, 2014</a:t>
             </a:fld>
             <a:endParaRPr lang="en-US"/>
           </a:p>
@@ -4251,7 +4261,7 @@
             <a:fld id="{7855437F-F4F9-44A9-B4D3-9191CA04E889}" type="datetime4">
               <a:rPr lang="en-US" smtClean="0"/>
               <a:pPr/>
-              <a:t>November 14, 2014</a:t>
+              <a:t>November 17, 2014</a:t>
             </a:fld>
             <a:endParaRPr lang="en-US"/>
           </a:p>
@@ -4348,7 +4358,7 @@
             <a:fld id="{39A24E59-01D0-4537-B876-7E5EC75B028D}" type="datetime4">
               <a:rPr lang="en-US" smtClean="0"/>
               <a:pPr/>
-              <a:t>November 14, 2014</a:t>
+              <a:t>November 17, 2014</a:t>
             </a:fld>
             <a:endParaRPr lang="en-US"/>
           </a:p>
@@ -4627,7 +4637,7 @@
             <a:fld id="{655A2E49-18A1-40BC-BA5D-5A2EC8FDDF15}" type="datetime4">
               <a:rPr lang="en-US" smtClean="0"/>
               <a:pPr/>
-              <a:t>November 14, 2014</a:t>
+              <a:t>November 17, 2014</a:t>
             </a:fld>
             <a:endParaRPr lang="en-US"/>
           </a:p>
@@ -4882,7 +4892,7 @@
             <a:fld id="{52983DA4-3B24-449B-95CA-514EB7E30A99}" type="datetime4">
               <a:rPr lang="en-US" smtClean="0"/>
               <a:pPr/>
-              <a:t>November 14, 2014</a:t>
+              <a:t>November 17, 2014</a:t>
             </a:fld>
             <a:endParaRPr lang="en-US"/>
           </a:p>
@@ -5097,7 +5107,7 @@
             <a:fld id="{942120D2-3948-4F8F-BE5D-E7E7D97880B2}" type="datetime4">
               <a:rPr lang="en-US" smtClean="0"/>
               <a:pPr/>
-              <a:t>November 14, 2014</a:t>
+              <a:t>November 17, 2014</a:t>
             </a:fld>
             <a:endParaRPr lang="en-US" dirty="0" err="1"/>
           </a:p>
@@ -8851,6 +8861,18 @@
               <a:rPr lang="en-US" dirty="0" err="1" smtClean="0"/>
               <a:t>Lógicos</a:t>
             </a:r>
+            <a:r>
+              <a:rPr lang="en-US" dirty="0" smtClean="0"/>
+              <a:t>/</a:t>
+            </a:r>
+            <a:r>
+              <a:rPr lang="en-US" dirty="0" err="1" smtClean="0"/>
+              <a:t>Aritm</a:t>
+            </a:r>
+            <a:r>
+              <a:rPr lang="en-US" dirty="0" err="1" smtClean="0"/>
+              <a:t>éticos</a:t>
+            </a:r>
             <a:endParaRPr lang="en-US" dirty="0"/>
           </a:p>
         </p:txBody>
@@ -10586,6 +10608,1019 @@
 </p:sld>
 </file>
 
+<file path=ppt/slides/slide27.xml><?xml version="1.0" encoding="utf-8"?>
+<p:sld xmlns:a="http://schemas.openxmlformats.org/drawingml/2006/main" xmlns:r="http://schemas.openxmlformats.org/officeDocument/2006/relationships" xmlns:p="http://schemas.openxmlformats.org/presentationml/2006/main">
+  <p:cSld>
+    <p:spTree>
+      <p:nvGrpSpPr>
+        <p:cNvPr id="1" name=""/>
+        <p:cNvGrpSpPr/>
+        <p:nvPr/>
+      </p:nvGrpSpPr>
+      <p:grpSpPr>
+        <a:xfrm>
+          <a:off x="0" y="0"/>
+          <a:ext cx="0" cy="0"/>
+          <a:chOff x="0" y="0"/>
+          <a:chExt cx="0" cy="0"/>
+        </a:xfrm>
+      </p:grpSpPr>
+      <p:sp>
+        <p:nvSpPr>
+          <p:cNvPr id="2" name="Title 1"/>
+          <p:cNvSpPr>
+            <a:spLocks noGrp="1"/>
+          </p:cNvSpPr>
+          <p:nvPr>
+            <p:ph type="title"/>
+          </p:nvPr>
+        </p:nvSpPr>
+        <p:spPr/>
+        <p:txBody>
+          <a:bodyPr/>
+          <a:lstStyle/>
+          <a:p>
+            <a:r>
+              <a:rPr lang="en-US" dirty="0" err="1" smtClean="0"/>
+              <a:t>Promo</a:t>
+            </a:r>
+            <a:r>
+              <a:rPr lang="en-US" dirty="0" err="1" smtClean="0"/>
+              <a:t>ção</a:t>
+            </a:r>
+            <a:r>
+              <a:rPr lang="en-US" dirty="0" smtClean="0"/>
+              <a:t> e Casting</a:t>
+            </a:r>
+            <a:endParaRPr lang="en-US" dirty="0"/>
+          </a:p>
+        </p:txBody>
+      </p:sp>
+      <p:sp>
+        <p:nvSpPr>
+          <p:cNvPr id="3" name="Content Placeholder 2"/>
+          <p:cNvSpPr>
+            <a:spLocks noGrp="1"/>
+          </p:cNvSpPr>
+          <p:nvPr>
+            <p:ph idx="1"/>
+          </p:nvPr>
+        </p:nvSpPr>
+        <p:spPr/>
+        <p:txBody>
+          <a:bodyPr>
+            <a:normAutofit fontScale="77500" lnSpcReduction="20000"/>
+          </a:bodyPr>
+          <a:lstStyle/>
+          <a:p>
+            <a:r>
+              <a:rPr lang="en-US" dirty="0" smtClean="0"/>
+              <a:t>A </a:t>
+            </a:r>
+            <a:r>
+              <a:rPr lang="en-US" dirty="0" err="1" smtClean="0"/>
+              <a:t>linguagem</a:t>
+            </a:r>
+            <a:r>
+              <a:rPr lang="en-US" dirty="0" smtClean="0"/>
+              <a:t> java </a:t>
+            </a:r>
+            <a:r>
+              <a:rPr lang="en-US" dirty="0" err="1" smtClean="0"/>
+              <a:t>n</a:t>
+            </a:r>
+            <a:r>
+              <a:rPr lang="en-US" dirty="0" err="1" smtClean="0"/>
+              <a:t>ão</a:t>
+            </a:r>
+            <a:r>
+              <a:rPr lang="en-US" dirty="0" smtClean="0"/>
+              <a:t> </a:t>
+            </a:r>
+            <a:r>
+              <a:rPr lang="en-US" dirty="0" err="1" smtClean="0"/>
+              <a:t>suporta</a:t>
+            </a:r>
+            <a:r>
+              <a:rPr lang="en-US" dirty="0" smtClean="0"/>
+              <a:t> </a:t>
+            </a:r>
+            <a:r>
+              <a:rPr lang="en-US" dirty="0" err="1" smtClean="0"/>
+              <a:t>atribuições</a:t>
+            </a:r>
+            <a:r>
+              <a:rPr lang="en-US" dirty="0" smtClean="0"/>
+              <a:t> </a:t>
+            </a:r>
+            <a:r>
+              <a:rPr lang="en-US" dirty="0" err="1" smtClean="0"/>
+              <a:t>arbitrárias</a:t>
+            </a:r>
+            <a:r>
+              <a:rPr lang="en-US" dirty="0" smtClean="0"/>
+              <a:t> entre </a:t>
+            </a:r>
+            <a:r>
+              <a:rPr lang="en-US" dirty="0" err="1" smtClean="0"/>
+              <a:t>variaáveis</a:t>
+            </a:r>
+            <a:r>
+              <a:rPr lang="en-US" dirty="0" smtClean="0"/>
+              <a:t> de </a:t>
+            </a:r>
+            <a:r>
+              <a:rPr lang="en-US" dirty="0" err="1" smtClean="0"/>
+              <a:t>tipos</a:t>
+            </a:r>
+            <a:r>
+              <a:rPr lang="en-US" dirty="0" smtClean="0"/>
+              <a:t> </a:t>
+            </a:r>
+            <a:r>
+              <a:rPr lang="en-US" dirty="0" err="1" smtClean="0"/>
+              <a:t>diferentes</a:t>
+            </a:r>
+            <a:r>
+              <a:rPr lang="en-US" dirty="0" smtClean="0"/>
+              <a:t>. </a:t>
+            </a:r>
+            <a:r>
+              <a:rPr lang="en-US" dirty="0" err="1" smtClean="0"/>
+              <a:t>Por</a:t>
+            </a:r>
+            <a:r>
+              <a:rPr lang="en-US" dirty="0" smtClean="0"/>
+              <a:t> </a:t>
+            </a:r>
+            <a:r>
+              <a:rPr lang="en-US" dirty="0" err="1" smtClean="0"/>
+              <a:t>exemplo</a:t>
+            </a:r>
+            <a:r>
+              <a:rPr lang="en-US" dirty="0" smtClean="0"/>
+              <a:t>, </a:t>
+            </a:r>
+            <a:r>
+              <a:rPr lang="en-US" dirty="0" err="1" smtClean="0"/>
+              <a:t>você</a:t>
+            </a:r>
+            <a:r>
+              <a:rPr lang="en-US" dirty="0" smtClean="0"/>
+              <a:t> </a:t>
+            </a:r>
+            <a:r>
+              <a:rPr lang="en-US" dirty="0" err="1" smtClean="0"/>
+              <a:t>não</a:t>
+            </a:r>
+            <a:r>
+              <a:rPr lang="en-US" dirty="0" smtClean="0"/>
+              <a:t> </a:t>
+            </a:r>
+            <a:r>
+              <a:rPr lang="en-US" dirty="0" err="1" smtClean="0"/>
+              <a:t>pode</a:t>
+            </a:r>
+            <a:r>
+              <a:rPr lang="en-US" dirty="0" smtClean="0"/>
+              <a:t> </a:t>
+            </a:r>
+            <a:r>
+              <a:rPr lang="en-US" dirty="0" err="1" smtClean="0"/>
+              <a:t>inicializar</a:t>
+            </a:r>
+            <a:r>
+              <a:rPr lang="en-US" dirty="0" smtClean="0"/>
+              <a:t> </a:t>
+            </a:r>
+            <a:r>
+              <a:rPr lang="en-US" dirty="0" err="1" smtClean="0"/>
+              <a:t>uma</a:t>
+            </a:r>
+            <a:r>
+              <a:rPr lang="en-US" dirty="0" smtClean="0"/>
+              <a:t> </a:t>
+            </a:r>
+            <a:r>
+              <a:rPr lang="en-US" dirty="0" err="1" smtClean="0"/>
+              <a:t>variável</a:t>
+            </a:r>
+            <a:r>
+              <a:rPr lang="en-US" dirty="0" smtClean="0"/>
+              <a:t> </a:t>
+            </a:r>
+            <a:r>
+              <a:rPr lang="en-US" dirty="0" err="1" smtClean="0"/>
+              <a:t>inteira</a:t>
+            </a:r>
+            <a:r>
+              <a:rPr lang="en-US" dirty="0" smtClean="0"/>
+              <a:t> com um valor de </a:t>
+            </a:r>
+            <a:r>
+              <a:rPr lang="en-US" dirty="0" err="1" smtClean="0"/>
+              <a:t>ponto</a:t>
+            </a:r>
+            <a:r>
+              <a:rPr lang="en-US" dirty="0" smtClean="0"/>
+              <a:t> </a:t>
+            </a:r>
+            <a:r>
+              <a:rPr lang="en-US" dirty="0" err="1" smtClean="0"/>
+              <a:t>flutuante</a:t>
+            </a:r>
+            <a:r>
+              <a:rPr lang="en-US" dirty="0" smtClean="0"/>
+              <a:t> </a:t>
+            </a:r>
+            <a:r>
+              <a:rPr lang="en-US" dirty="0" err="1" smtClean="0"/>
+              <a:t>sem</a:t>
+            </a:r>
+            <a:r>
+              <a:rPr lang="en-US" dirty="0" smtClean="0"/>
+              <a:t> </a:t>
+            </a:r>
+            <a:r>
+              <a:rPr lang="en-US" dirty="0" err="1" smtClean="0"/>
+              <a:t>explicitar</a:t>
+            </a:r>
+            <a:r>
+              <a:rPr lang="en-US" dirty="0" smtClean="0"/>
+              <a:t> </a:t>
+            </a:r>
+            <a:r>
+              <a:rPr lang="en-US" dirty="0" err="1" smtClean="0"/>
+              <a:t>isso</a:t>
+            </a:r>
+            <a:r>
+              <a:rPr lang="en-US" dirty="0" smtClean="0"/>
+              <a:t> </a:t>
+            </a:r>
+            <a:r>
+              <a:rPr lang="en-US" dirty="0" err="1" smtClean="0"/>
+              <a:t>através</a:t>
+            </a:r>
+            <a:r>
+              <a:rPr lang="en-US" dirty="0" smtClean="0"/>
+              <a:t> de um </a:t>
+            </a:r>
+            <a:r>
+              <a:rPr lang="en-US" dirty="0" err="1" smtClean="0"/>
+              <a:t>processo</a:t>
+            </a:r>
+            <a:r>
+              <a:rPr lang="en-US" dirty="0" smtClean="0"/>
+              <a:t> de </a:t>
+            </a:r>
+            <a:r>
+              <a:rPr lang="en-US" b="1" i="1" dirty="0" smtClean="0"/>
+              <a:t>Casting</a:t>
+            </a:r>
+            <a:r>
+              <a:rPr lang="en-US" dirty="0" smtClean="0"/>
+              <a:t>.</a:t>
+            </a:r>
+          </a:p>
+          <a:p>
+            <a:r>
+              <a:rPr lang="en-US" dirty="0" err="1" smtClean="0"/>
+              <a:t>Quando</a:t>
+            </a:r>
+            <a:r>
+              <a:rPr lang="en-US" dirty="0" smtClean="0"/>
+              <a:t> </a:t>
+            </a:r>
+            <a:r>
+              <a:rPr lang="en-US" dirty="0" err="1" smtClean="0"/>
+              <a:t>atribuimos</a:t>
+            </a:r>
+            <a:r>
+              <a:rPr lang="en-US" dirty="0" smtClean="0"/>
+              <a:t> um valor a </a:t>
+            </a:r>
+            <a:r>
+              <a:rPr lang="en-US" dirty="0" err="1" smtClean="0"/>
+              <a:t>uma</a:t>
+            </a:r>
+            <a:r>
+              <a:rPr lang="en-US" dirty="0" smtClean="0"/>
+              <a:t> </a:t>
+            </a:r>
+            <a:r>
+              <a:rPr lang="en-US" dirty="0" err="1" smtClean="0"/>
+              <a:t>variável</a:t>
+            </a:r>
+            <a:r>
+              <a:rPr lang="en-US" dirty="0" smtClean="0"/>
+              <a:t>, e </a:t>
+            </a:r>
+            <a:r>
+              <a:rPr lang="en-US" dirty="0" err="1" smtClean="0"/>
+              <a:t>esse</a:t>
+            </a:r>
+            <a:r>
+              <a:rPr lang="en-US" dirty="0" smtClean="0"/>
+              <a:t> valor </a:t>
+            </a:r>
+            <a:r>
+              <a:rPr lang="en-US" dirty="0" err="1" smtClean="0"/>
+              <a:t>é</a:t>
+            </a:r>
+            <a:r>
+              <a:rPr lang="en-US" dirty="0" smtClean="0"/>
+              <a:t> </a:t>
+            </a:r>
+            <a:r>
+              <a:rPr lang="en-US" dirty="0" err="1" smtClean="0"/>
+              <a:t>incompatível</a:t>
+            </a:r>
+            <a:r>
+              <a:rPr lang="en-US" dirty="0" smtClean="0"/>
+              <a:t> com o </a:t>
+            </a:r>
+            <a:r>
+              <a:rPr lang="en-US" dirty="0" err="1" smtClean="0"/>
+              <a:t>tipo</a:t>
+            </a:r>
+            <a:r>
+              <a:rPr lang="en-US" dirty="0" smtClean="0"/>
+              <a:t> de dado </a:t>
+            </a:r>
+            <a:r>
+              <a:rPr lang="en-US" dirty="0" err="1" smtClean="0"/>
+              <a:t>definido</a:t>
+            </a:r>
+            <a:r>
+              <a:rPr lang="en-US" dirty="0" smtClean="0"/>
+              <a:t> </a:t>
+            </a:r>
+            <a:r>
+              <a:rPr lang="en-US" dirty="0" err="1" smtClean="0"/>
+              <a:t>para</a:t>
+            </a:r>
+            <a:r>
+              <a:rPr lang="en-US" dirty="0" smtClean="0"/>
+              <a:t> a </a:t>
+            </a:r>
+            <a:r>
+              <a:rPr lang="en-US" dirty="0" err="1" smtClean="0"/>
+              <a:t>variável</a:t>
+            </a:r>
+            <a:r>
+              <a:rPr lang="en-US" dirty="0" smtClean="0"/>
+              <a:t>, </a:t>
+            </a:r>
+            <a:r>
+              <a:rPr lang="en-US" dirty="0" err="1" smtClean="0"/>
+              <a:t>ocorrerá</a:t>
+            </a:r>
+            <a:r>
+              <a:rPr lang="en-US" dirty="0" smtClean="0"/>
+              <a:t> </a:t>
+            </a:r>
+            <a:r>
+              <a:rPr lang="en-US" dirty="0" err="1" smtClean="0"/>
+              <a:t>uma</a:t>
+            </a:r>
+            <a:r>
+              <a:rPr lang="en-US" dirty="0" smtClean="0"/>
+              <a:t> </a:t>
+            </a:r>
+            <a:r>
+              <a:rPr lang="en-US" dirty="0" err="1" smtClean="0"/>
+              <a:t>conversão</a:t>
+            </a:r>
+            <a:r>
+              <a:rPr lang="en-US" dirty="0" smtClean="0"/>
+              <a:t>. </a:t>
+            </a:r>
+            <a:r>
+              <a:rPr lang="en-US" dirty="0" err="1" smtClean="0"/>
+              <a:t>Em</a:t>
+            </a:r>
+            <a:r>
+              <a:rPr lang="en-US" dirty="0" smtClean="0"/>
+              <a:t> </a:t>
+            </a:r>
+            <a:r>
+              <a:rPr lang="en-US" dirty="0" err="1" smtClean="0"/>
+              <a:t>alguns</a:t>
+            </a:r>
+            <a:r>
+              <a:rPr lang="en-US" dirty="0" smtClean="0"/>
+              <a:t> </a:t>
+            </a:r>
+            <a:r>
+              <a:rPr lang="en-US" dirty="0" err="1" smtClean="0"/>
+              <a:t>casos</a:t>
+            </a:r>
+            <a:r>
+              <a:rPr lang="en-US" dirty="0" smtClean="0"/>
+              <a:t> </a:t>
+            </a:r>
+            <a:r>
+              <a:rPr lang="en-US" dirty="0" err="1" smtClean="0"/>
+              <a:t>essa</a:t>
+            </a:r>
+            <a:r>
+              <a:rPr lang="en-US" dirty="0" smtClean="0"/>
+              <a:t> </a:t>
+            </a:r>
+            <a:r>
+              <a:rPr lang="en-US" dirty="0" err="1" smtClean="0"/>
+              <a:t>conversão</a:t>
+            </a:r>
+            <a:r>
+              <a:rPr lang="en-US" dirty="0" smtClean="0"/>
+              <a:t> </a:t>
+            </a:r>
+            <a:r>
+              <a:rPr lang="en-US" dirty="0" err="1" smtClean="0"/>
+              <a:t>será</a:t>
+            </a:r>
+            <a:r>
+              <a:rPr lang="en-US" dirty="0" smtClean="0"/>
+              <a:t> </a:t>
+            </a:r>
+            <a:r>
+              <a:rPr lang="en-US" dirty="0" err="1" smtClean="0"/>
+              <a:t>automática</a:t>
+            </a:r>
+            <a:r>
+              <a:rPr lang="en-US" dirty="0" smtClean="0"/>
+              <a:t>, </a:t>
+            </a:r>
+            <a:r>
+              <a:rPr lang="en-US" dirty="0" err="1" smtClean="0"/>
+              <a:t>em</a:t>
+            </a:r>
+            <a:r>
+              <a:rPr lang="en-US" dirty="0" smtClean="0"/>
+              <a:t> outros </a:t>
+            </a:r>
+            <a:r>
+              <a:rPr lang="en-US" dirty="0" err="1" smtClean="0"/>
+              <a:t>casos</a:t>
+            </a:r>
+            <a:r>
+              <a:rPr lang="en-US" dirty="0" smtClean="0"/>
+              <a:t> o </a:t>
+            </a:r>
+            <a:r>
+              <a:rPr lang="en-US" dirty="0" err="1" smtClean="0"/>
+              <a:t>programador</a:t>
+            </a:r>
+            <a:r>
+              <a:rPr lang="en-US" dirty="0" smtClean="0"/>
+              <a:t> </a:t>
+            </a:r>
+            <a:r>
+              <a:rPr lang="en-US" dirty="0" err="1" smtClean="0"/>
+              <a:t>deve</a:t>
+            </a:r>
+            <a:r>
+              <a:rPr lang="en-US" dirty="0" smtClean="0"/>
+              <a:t> </a:t>
+            </a:r>
+            <a:r>
+              <a:rPr lang="en-US" dirty="0" err="1" smtClean="0"/>
+              <a:t>indicar</a:t>
+            </a:r>
+            <a:r>
+              <a:rPr lang="en-US" dirty="0" smtClean="0"/>
+              <a:t> de </a:t>
+            </a:r>
+            <a:r>
+              <a:rPr lang="en-US" dirty="0" err="1" smtClean="0"/>
+              <a:t>que</a:t>
+            </a:r>
+            <a:r>
+              <a:rPr lang="en-US" dirty="0" smtClean="0"/>
+              <a:t> forma o valor </a:t>
+            </a:r>
+            <a:r>
+              <a:rPr lang="en-US" dirty="0" err="1" smtClean="0"/>
+              <a:t>será</a:t>
+            </a:r>
+            <a:r>
+              <a:rPr lang="en-US" dirty="0" smtClean="0"/>
+              <a:t> </a:t>
+            </a:r>
+            <a:r>
+              <a:rPr lang="en-US" dirty="0" err="1" smtClean="0"/>
+              <a:t>convertido</a:t>
+            </a:r>
+            <a:r>
+              <a:rPr lang="en-US" dirty="0" smtClean="0"/>
+              <a:t> </a:t>
+            </a:r>
+            <a:r>
+              <a:rPr lang="en-US" dirty="0" err="1" smtClean="0"/>
+              <a:t>ao</a:t>
+            </a:r>
+            <a:r>
+              <a:rPr lang="en-US" dirty="0" smtClean="0"/>
+              <a:t> </a:t>
+            </a:r>
+            <a:r>
+              <a:rPr lang="en-US" dirty="0" err="1" smtClean="0"/>
+              <a:t>tipo</a:t>
+            </a:r>
+            <a:r>
+              <a:rPr lang="en-US" dirty="0" smtClean="0"/>
+              <a:t> da </a:t>
+            </a:r>
+            <a:r>
+              <a:rPr lang="en-US" dirty="0" err="1" smtClean="0"/>
+              <a:t>variável</a:t>
+            </a:r>
+            <a:r>
+              <a:rPr lang="en-US" dirty="0" smtClean="0"/>
+              <a:t>.</a:t>
+            </a:r>
+          </a:p>
+          <a:p>
+            <a:r>
+              <a:rPr lang="en-US" dirty="0" err="1" smtClean="0"/>
+              <a:t>Quando</a:t>
+            </a:r>
+            <a:r>
+              <a:rPr lang="en-US" dirty="0" smtClean="0"/>
+              <a:t> o </a:t>
+            </a:r>
+            <a:r>
+              <a:rPr lang="en-US" dirty="0" err="1" smtClean="0"/>
+              <a:t>processo</a:t>
+            </a:r>
+            <a:r>
+              <a:rPr lang="en-US" dirty="0" smtClean="0"/>
+              <a:t> de </a:t>
+            </a:r>
+            <a:r>
+              <a:rPr lang="en-US" dirty="0" err="1" smtClean="0"/>
+              <a:t>conversão</a:t>
+            </a:r>
+            <a:r>
+              <a:rPr lang="en-US" dirty="0" smtClean="0"/>
+              <a:t> for </a:t>
+            </a:r>
+            <a:r>
+              <a:rPr lang="en-US" dirty="0" err="1" smtClean="0"/>
+              <a:t>automático</a:t>
+            </a:r>
+            <a:r>
+              <a:rPr lang="en-US" dirty="0" smtClean="0"/>
+              <a:t>, </a:t>
+            </a:r>
+            <a:r>
+              <a:rPr lang="en-US" dirty="0" err="1" smtClean="0"/>
+              <a:t>dizemos</a:t>
+            </a:r>
+            <a:r>
+              <a:rPr lang="en-US" dirty="0" smtClean="0"/>
+              <a:t> </a:t>
+            </a:r>
+            <a:r>
+              <a:rPr lang="en-US" dirty="0" err="1" smtClean="0"/>
+              <a:t>que</a:t>
+            </a:r>
+            <a:r>
+              <a:rPr lang="en-US" dirty="0" smtClean="0"/>
+              <a:t> </a:t>
+            </a:r>
+            <a:r>
+              <a:rPr lang="en-US" dirty="0" err="1" smtClean="0"/>
+              <a:t>ocorreu</a:t>
+            </a:r>
+            <a:r>
+              <a:rPr lang="en-US" dirty="0" smtClean="0"/>
+              <a:t> </a:t>
+            </a:r>
+            <a:r>
+              <a:rPr lang="en-US" dirty="0" err="1" smtClean="0"/>
+              <a:t>uma</a:t>
+            </a:r>
+            <a:r>
+              <a:rPr lang="en-US" dirty="0" smtClean="0"/>
+              <a:t> </a:t>
+            </a:r>
+            <a:r>
+              <a:rPr lang="en-US" dirty="0" err="1" smtClean="0"/>
+              <a:t>promoção</a:t>
+            </a:r>
+            <a:r>
+              <a:rPr lang="en-US" dirty="0" smtClean="0"/>
+              <a:t>, </a:t>
+            </a:r>
+            <a:r>
+              <a:rPr lang="en-US" dirty="0" err="1" smtClean="0"/>
+              <a:t>ou</a:t>
+            </a:r>
+            <a:r>
+              <a:rPr lang="en-US" dirty="0" smtClean="0"/>
+              <a:t> </a:t>
+            </a:r>
+            <a:r>
+              <a:rPr lang="en-US" dirty="0" err="1" smtClean="0"/>
+              <a:t>seja</a:t>
+            </a:r>
+            <a:r>
+              <a:rPr lang="en-US" dirty="0" smtClean="0"/>
+              <a:t>, um valor com um </a:t>
+            </a:r>
+            <a:r>
+              <a:rPr lang="en-US" dirty="0" err="1" smtClean="0"/>
+              <a:t>tipo</a:t>
+            </a:r>
+            <a:r>
+              <a:rPr lang="en-US" dirty="0" smtClean="0"/>
+              <a:t> de dado </a:t>
+            </a:r>
+            <a:r>
+              <a:rPr lang="en-US" dirty="0" err="1" smtClean="0"/>
+              <a:t>foi</a:t>
+            </a:r>
+            <a:r>
+              <a:rPr lang="en-US" dirty="0" smtClean="0"/>
+              <a:t> </a:t>
+            </a:r>
+            <a:r>
+              <a:rPr lang="en-US" dirty="0" err="1" smtClean="0"/>
+              <a:t>promovido</a:t>
+            </a:r>
+            <a:r>
+              <a:rPr lang="en-US" dirty="0" smtClean="0"/>
+              <a:t> a outro </a:t>
+            </a:r>
+            <a:r>
+              <a:rPr lang="en-US" dirty="0" err="1" smtClean="0"/>
+              <a:t>tipo</a:t>
+            </a:r>
+            <a:r>
+              <a:rPr lang="en-US" dirty="0" smtClean="0"/>
+              <a:t> de dado.</a:t>
+            </a:r>
+            <a:endParaRPr lang="en-US" dirty="0"/>
+          </a:p>
+        </p:txBody>
+      </p:sp>
+    </p:spTree>
+    <p:extLst>
+      <p:ext uri="{BB962C8B-B14F-4D97-AF65-F5344CB8AC3E}">
+        <p14:creationId xmlns:p14="http://schemas.microsoft.com/office/powerpoint/2010/main" val="2795842726"/>
+      </p:ext>
+    </p:extLst>
+  </p:cSld>
+  <p:clrMapOvr>
+    <a:masterClrMapping/>
+  </p:clrMapOvr>
+</p:sld>
+</file>
+
+<file path=ppt/slides/slide28.xml><?xml version="1.0" encoding="utf-8"?>
+<p:sld xmlns:a="http://schemas.openxmlformats.org/drawingml/2006/main" xmlns:r="http://schemas.openxmlformats.org/officeDocument/2006/relationships" xmlns:p="http://schemas.openxmlformats.org/presentationml/2006/main">
+  <p:cSld>
+    <p:spTree>
+      <p:nvGrpSpPr>
+        <p:cNvPr id="1" name=""/>
+        <p:cNvGrpSpPr/>
+        <p:nvPr/>
+      </p:nvGrpSpPr>
+      <p:grpSpPr>
+        <a:xfrm>
+          <a:off x="0" y="0"/>
+          <a:ext cx="0" cy="0"/>
+          <a:chOff x="0" y="0"/>
+          <a:chExt cx="0" cy="0"/>
+        </a:xfrm>
+      </p:grpSpPr>
+      <p:sp>
+        <p:nvSpPr>
+          <p:cNvPr id="2" name="Title 1"/>
+          <p:cNvSpPr>
+            <a:spLocks noGrp="1"/>
+          </p:cNvSpPr>
+          <p:nvPr>
+            <p:ph type="title"/>
+          </p:nvPr>
+        </p:nvSpPr>
+        <p:spPr/>
+        <p:txBody>
+          <a:bodyPr/>
+          <a:lstStyle/>
+          <a:p>
+            <a:r>
+              <a:rPr lang="en-US" dirty="0" err="1" smtClean="0"/>
+              <a:t>Promo</a:t>
+            </a:r>
+            <a:r>
+              <a:rPr lang="en-US" dirty="0" err="1" smtClean="0"/>
+              <a:t>ção</a:t>
+            </a:r>
+            <a:r>
+              <a:rPr lang="en-US" dirty="0" smtClean="0"/>
+              <a:t> e Casting</a:t>
+            </a:r>
+            <a:endParaRPr lang="en-US" dirty="0"/>
+          </a:p>
+        </p:txBody>
+      </p:sp>
+      <p:pic>
+        <p:nvPicPr>
+          <p:cNvPr id="5" name="Picture 4"/>
+          <p:cNvPicPr>
+            <a:picLocks noChangeAspect="1"/>
+          </p:cNvPicPr>
+          <p:nvPr/>
+        </p:nvPicPr>
+        <p:blipFill>
+          <a:blip r:embed="rId2"/>
+          <a:stretch>
+            <a:fillRect/>
+          </a:stretch>
+        </p:blipFill>
+        <p:spPr>
+          <a:xfrm>
+            <a:off x="321698" y="1587239"/>
+            <a:ext cx="8668373" cy="4438207"/>
+          </a:xfrm>
+          <a:prstGeom prst="rect">
+            <a:avLst/>
+          </a:prstGeom>
+        </p:spPr>
+      </p:pic>
+    </p:spTree>
+    <p:extLst>
+      <p:ext uri="{BB962C8B-B14F-4D97-AF65-F5344CB8AC3E}">
+        <p14:creationId xmlns:p14="http://schemas.microsoft.com/office/powerpoint/2010/main" val="51401858"/>
+      </p:ext>
+    </p:extLst>
+  </p:cSld>
+  <p:clrMapOvr>
+    <a:masterClrMapping/>
+  </p:clrMapOvr>
+</p:sld>
+</file>
+
+<file path=ppt/slides/slide29.xml><?xml version="1.0" encoding="utf-8"?>
+<p:sld xmlns:a="http://schemas.openxmlformats.org/drawingml/2006/main" xmlns:r="http://schemas.openxmlformats.org/officeDocument/2006/relationships" xmlns:p="http://schemas.openxmlformats.org/presentationml/2006/main">
+  <p:cSld>
+    <p:spTree>
+      <p:nvGrpSpPr>
+        <p:cNvPr id="1" name=""/>
+        <p:cNvGrpSpPr/>
+        <p:nvPr/>
+      </p:nvGrpSpPr>
+      <p:grpSpPr>
+        <a:xfrm>
+          <a:off x="0" y="0"/>
+          <a:ext cx="0" cy="0"/>
+          <a:chOff x="0" y="0"/>
+          <a:chExt cx="0" cy="0"/>
+        </a:xfrm>
+      </p:grpSpPr>
+      <p:sp>
+        <p:nvSpPr>
+          <p:cNvPr id="2" name="Title 1"/>
+          <p:cNvSpPr>
+            <a:spLocks noGrp="1"/>
+          </p:cNvSpPr>
+          <p:nvPr>
+            <p:ph type="title"/>
+          </p:nvPr>
+        </p:nvSpPr>
+        <p:spPr/>
+        <p:txBody>
+          <a:bodyPr/>
+          <a:lstStyle/>
+          <a:p>
+            <a:r>
+              <a:rPr lang="en-US" dirty="0" err="1" smtClean="0"/>
+              <a:t>Ramifica</a:t>
+            </a:r>
+            <a:r>
+              <a:rPr lang="en-US" dirty="0" err="1" smtClean="0"/>
+              <a:t>ção</a:t>
+            </a:r>
+            <a:r>
+              <a:rPr lang="en-US" dirty="0" smtClean="0"/>
+              <a:t> If, else</a:t>
+            </a:r>
+            <a:endParaRPr lang="en-US" dirty="0"/>
+          </a:p>
+        </p:txBody>
+      </p:sp>
+      <p:sp>
+        <p:nvSpPr>
+          <p:cNvPr id="3" name="Content Placeholder 2"/>
+          <p:cNvSpPr>
+            <a:spLocks noGrp="1"/>
+          </p:cNvSpPr>
+          <p:nvPr>
+            <p:ph idx="1"/>
+          </p:nvPr>
+        </p:nvSpPr>
+        <p:spPr/>
+        <p:txBody>
+          <a:bodyPr>
+            <a:normAutofit fontScale="85000" lnSpcReduction="20000"/>
+          </a:bodyPr>
+          <a:lstStyle/>
+          <a:p>
+            <a:r>
+              <a:rPr lang="en-US" dirty="0" smtClean="0"/>
+              <a:t>A </a:t>
+            </a:r>
+            <a:r>
+              <a:rPr lang="en-US" dirty="0" err="1" smtClean="0"/>
+              <a:t>sintaxe</a:t>
+            </a:r>
+            <a:r>
+              <a:rPr lang="en-US" dirty="0" smtClean="0"/>
+              <a:t> </a:t>
+            </a:r>
+            <a:r>
+              <a:rPr lang="en-US" dirty="0" err="1" smtClean="0"/>
+              <a:t>b</a:t>
+            </a:r>
+            <a:r>
+              <a:rPr lang="en-US" dirty="0" err="1" smtClean="0"/>
+              <a:t>ásica</a:t>
+            </a:r>
+            <a:r>
+              <a:rPr lang="en-US" dirty="0" smtClean="0"/>
+              <a:t> </a:t>
+            </a:r>
+            <a:r>
+              <a:rPr lang="en-US" dirty="0" err="1" smtClean="0"/>
+              <a:t>para</a:t>
+            </a:r>
+            <a:r>
+              <a:rPr lang="en-US" dirty="0" smtClean="0"/>
+              <a:t> </a:t>
+            </a:r>
+            <a:r>
+              <a:rPr lang="en-US" dirty="0" err="1" smtClean="0"/>
+              <a:t>declaracões</a:t>
+            </a:r>
+            <a:r>
+              <a:rPr lang="en-US" dirty="0" smtClean="0"/>
+              <a:t> if, else </a:t>
+            </a:r>
+            <a:r>
+              <a:rPr lang="en-US" dirty="0" err="1" smtClean="0"/>
+              <a:t>é</a:t>
+            </a:r>
+            <a:r>
+              <a:rPr lang="en-US" dirty="0" smtClean="0"/>
+              <a:t> a </a:t>
+            </a:r>
+            <a:r>
+              <a:rPr lang="en-US" dirty="0" err="1" smtClean="0"/>
+              <a:t>seguinte</a:t>
+            </a:r>
+            <a:r>
+              <a:rPr lang="en-US" dirty="0" smtClean="0"/>
+              <a:t>:</a:t>
+            </a:r>
+          </a:p>
+          <a:p>
+            <a:pPr marL="0" indent="0">
+              <a:buNone/>
+            </a:pPr>
+            <a:endParaRPr lang="en-US" dirty="0" smtClean="0"/>
+          </a:p>
+          <a:p>
+            <a:pPr marL="0" indent="0">
+              <a:buNone/>
+            </a:pPr>
+            <a:r>
+              <a:rPr lang="en-US" dirty="0" smtClean="0"/>
+              <a:t>if ( </a:t>
+            </a:r>
+            <a:r>
+              <a:rPr lang="en-US" dirty="0" err="1" smtClean="0"/>
+              <a:t>expressao_booleana</a:t>
+            </a:r>
+            <a:r>
+              <a:rPr lang="en-US" dirty="0" smtClean="0"/>
+              <a:t> )</a:t>
+            </a:r>
+          </a:p>
+          <a:p>
+            <a:pPr marL="0" indent="0">
+              <a:buNone/>
+            </a:pPr>
+            <a:r>
+              <a:rPr lang="en-US" dirty="0" smtClean="0"/>
+              <a:t>{</a:t>
+            </a:r>
+          </a:p>
+          <a:p>
+            <a:pPr marL="0" indent="0">
+              <a:buNone/>
+            </a:pPr>
+            <a:r>
+              <a:rPr lang="en-US" dirty="0"/>
+              <a:t>	</a:t>
+            </a:r>
+            <a:r>
+              <a:rPr lang="en-US" dirty="0" smtClean="0"/>
+              <a:t>// </a:t>
+            </a:r>
+            <a:r>
+              <a:rPr lang="en-US" dirty="0" err="1" smtClean="0"/>
+              <a:t>bloco</a:t>
+            </a:r>
+            <a:r>
+              <a:rPr lang="en-US" dirty="0" smtClean="0"/>
+              <a:t> de </a:t>
+            </a:r>
+            <a:r>
+              <a:rPr lang="en-US" dirty="0" err="1" smtClean="0"/>
+              <a:t>comandos</a:t>
+            </a:r>
+            <a:endParaRPr lang="en-US" dirty="0" smtClean="0"/>
+          </a:p>
+          <a:p>
+            <a:pPr marL="0" indent="0">
+              <a:buNone/>
+            </a:pPr>
+            <a:r>
+              <a:rPr lang="en-US" dirty="0" smtClean="0"/>
+              <a:t>}</a:t>
+            </a:r>
+          </a:p>
+          <a:p>
+            <a:pPr marL="0" indent="0">
+              <a:buNone/>
+            </a:pPr>
+            <a:r>
+              <a:rPr lang="en-US" dirty="0" smtClean="0"/>
+              <a:t>else</a:t>
+            </a:r>
+          </a:p>
+          <a:p>
+            <a:pPr marL="0" indent="0">
+              <a:buNone/>
+            </a:pPr>
+            <a:r>
+              <a:rPr lang="en-US" dirty="0" smtClean="0"/>
+              <a:t>{</a:t>
+            </a:r>
+          </a:p>
+          <a:p>
+            <a:pPr marL="0" indent="0">
+              <a:buNone/>
+            </a:pPr>
+            <a:r>
+              <a:rPr lang="en-US" dirty="0"/>
+              <a:t>	</a:t>
+            </a:r>
+            <a:r>
+              <a:rPr lang="en-US" dirty="0" smtClean="0"/>
+              <a:t>// </a:t>
+            </a:r>
+            <a:r>
+              <a:rPr lang="en-US" dirty="0" err="1" smtClean="0"/>
+              <a:t>bloco</a:t>
+            </a:r>
+            <a:r>
+              <a:rPr lang="en-US" dirty="0" smtClean="0"/>
+              <a:t> de </a:t>
+            </a:r>
+            <a:r>
+              <a:rPr lang="en-US" dirty="0" err="1" smtClean="0"/>
+              <a:t>comandos</a:t>
+            </a:r>
+            <a:endParaRPr lang="en-US" dirty="0" smtClean="0"/>
+          </a:p>
+          <a:p>
+            <a:pPr marL="0" indent="0">
+              <a:buNone/>
+            </a:pPr>
+            <a:r>
+              <a:rPr lang="en-US" dirty="0"/>
+              <a:t>}</a:t>
+            </a:r>
+            <a:endParaRPr lang="en-US" dirty="0" smtClean="0"/>
+          </a:p>
+        </p:txBody>
+      </p:sp>
+    </p:spTree>
+    <p:extLst>
+      <p:ext uri="{BB962C8B-B14F-4D97-AF65-F5344CB8AC3E}">
+        <p14:creationId xmlns:p14="http://schemas.microsoft.com/office/powerpoint/2010/main" val="2053084799"/>
+      </p:ext>
+    </p:extLst>
+  </p:cSld>
+  <p:clrMapOvr>
+    <a:masterClrMapping/>
+  </p:clrMapOvr>
+</p:sld>
+</file>
+
 <file path=ppt/slides/slide3.xml><?xml version="1.0" encoding="utf-8"?>
 <p:sld xmlns:a="http://schemas.openxmlformats.org/drawingml/2006/main" xmlns:r="http://schemas.openxmlformats.org/officeDocument/2006/relationships" xmlns:p="http://schemas.openxmlformats.org/presentationml/2006/main">
   <p:cSld>
@@ -10736,6 +11771,2105 @@
       </p:par>
     </p:tnLst>
   </p:timing>
+</p:sld>
+</file>
+
+<file path=ppt/slides/slide30.xml><?xml version="1.0" encoding="utf-8"?>
+<p:sld xmlns:a="http://schemas.openxmlformats.org/drawingml/2006/main" xmlns:r="http://schemas.openxmlformats.org/officeDocument/2006/relationships" xmlns:p="http://schemas.openxmlformats.org/presentationml/2006/main">
+  <p:cSld>
+    <p:spTree>
+      <p:nvGrpSpPr>
+        <p:cNvPr id="1" name=""/>
+        <p:cNvGrpSpPr/>
+        <p:nvPr/>
+      </p:nvGrpSpPr>
+      <p:grpSpPr>
+        <a:xfrm>
+          <a:off x="0" y="0"/>
+          <a:ext cx="0" cy="0"/>
+          <a:chOff x="0" y="0"/>
+          <a:chExt cx="0" cy="0"/>
+        </a:xfrm>
+      </p:grpSpPr>
+      <p:sp>
+        <p:nvSpPr>
+          <p:cNvPr id="2" name="Title 1"/>
+          <p:cNvSpPr>
+            <a:spLocks noGrp="1"/>
+          </p:cNvSpPr>
+          <p:nvPr>
+            <p:ph type="title"/>
+          </p:nvPr>
+        </p:nvSpPr>
+        <p:spPr/>
+        <p:txBody>
+          <a:bodyPr/>
+          <a:lstStyle/>
+          <a:p>
+            <a:r>
+              <a:rPr lang="en-US" dirty="0" err="1" smtClean="0"/>
+              <a:t>Ramifica</a:t>
+            </a:r>
+            <a:r>
+              <a:rPr lang="en-US" dirty="0" err="1" smtClean="0"/>
+              <a:t>ções</a:t>
+            </a:r>
+            <a:r>
+              <a:rPr lang="en-US" dirty="0" smtClean="0"/>
+              <a:t> Switch</a:t>
+            </a:r>
+            <a:endParaRPr lang="en-US" dirty="0"/>
+          </a:p>
+        </p:txBody>
+      </p:sp>
+      <p:sp>
+        <p:nvSpPr>
+          <p:cNvPr id="3" name="Content Placeholder 2"/>
+          <p:cNvSpPr>
+            <a:spLocks noGrp="1"/>
+          </p:cNvSpPr>
+          <p:nvPr>
+            <p:ph idx="1"/>
+          </p:nvPr>
+        </p:nvSpPr>
+        <p:spPr/>
+        <p:txBody>
+          <a:bodyPr/>
+          <a:lstStyle/>
+          <a:p>
+            <a:r>
+              <a:rPr lang="en-US" dirty="0" smtClean="0"/>
+              <a:t>Switch </a:t>
+            </a:r>
+            <a:r>
+              <a:rPr lang="en-US" dirty="0" err="1" smtClean="0"/>
+              <a:t>é</a:t>
+            </a:r>
+            <a:r>
+              <a:rPr lang="en-US" dirty="0" smtClean="0"/>
+              <a:t> </a:t>
+            </a:r>
+            <a:r>
+              <a:rPr lang="en-US" dirty="0" err="1" smtClean="0"/>
+              <a:t>uma</a:t>
+            </a:r>
+            <a:r>
+              <a:rPr lang="en-US" dirty="0" smtClean="0"/>
+              <a:t> </a:t>
+            </a:r>
+            <a:r>
+              <a:rPr lang="en-US" dirty="0" err="1" smtClean="0"/>
+              <a:t>declaração</a:t>
+            </a:r>
+            <a:r>
+              <a:rPr lang="en-US" dirty="0" smtClean="0"/>
+              <a:t> </a:t>
+            </a:r>
+            <a:r>
+              <a:rPr lang="en-US" dirty="0" err="1" smtClean="0"/>
+              <a:t>semelhante</a:t>
+            </a:r>
+            <a:r>
+              <a:rPr lang="en-US" dirty="0" smtClean="0"/>
+              <a:t> </a:t>
+            </a:r>
+            <a:r>
+              <a:rPr lang="en-US" dirty="0" err="1" smtClean="0"/>
+              <a:t>ao</a:t>
+            </a:r>
+            <a:r>
+              <a:rPr lang="en-US" dirty="0" smtClean="0"/>
+              <a:t> if, mas </a:t>
+            </a:r>
+            <a:r>
+              <a:rPr lang="en-US" dirty="0" err="1" smtClean="0"/>
+              <a:t>que</a:t>
+            </a:r>
+            <a:r>
+              <a:rPr lang="en-US" dirty="0" smtClean="0"/>
+              <a:t> </a:t>
+            </a:r>
+            <a:r>
+              <a:rPr lang="en-US" dirty="0" err="1" smtClean="0"/>
+              <a:t>usa</a:t>
+            </a:r>
+            <a:r>
+              <a:rPr lang="en-US" dirty="0" smtClean="0"/>
+              <a:t> </a:t>
+            </a:r>
+            <a:r>
+              <a:rPr lang="en-US" dirty="0" err="1" smtClean="0"/>
+              <a:t>valores</a:t>
+            </a:r>
+            <a:r>
+              <a:rPr lang="en-US" dirty="0" smtClean="0"/>
+              <a:t> </a:t>
+            </a:r>
+            <a:r>
+              <a:rPr lang="en-US" dirty="0" err="1" smtClean="0"/>
+              <a:t>inteiros</a:t>
+            </a:r>
+            <a:r>
+              <a:rPr lang="en-US" dirty="0"/>
+              <a:t> </a:t>
+            </a:r>
+            <a:r>
+              <a:rPr lang="en-US" dirty="0" err="1" smtClean="0"/>
+              <a:t>para</a:t>
+            </a:r>
+            <a:r>
+              <a:rPr lang="en-US" dirty="0" smtClean="0"/>
+              <a:t> a </a:t>
+            </a:r>
+            <a:r>
+              <a:rPr lang="en-US" dirty="0" err="1" smtClean="0"/>
+              <a:t>tomada</a:t>
+            </a:r>
+            <a:r>
+              <a:rPr lang="en-US" dirty="0" smtClean="0"/>
+              <a:t> de </a:t>
+            </a:r>
+            <a:r>
+              <a:rPr lang="en-US" dirty="0" err="1" smtClean="0"/>
+              <a:t>decisões</a:t>
+            </a:r>
+            <a:r>
+              <a:rPr lang="en-US" dirty="0" smtClean="0"/>
+              <a:t> </a:t>
+            </a:r>
+            <a:r>
+              <a:rPr lang="en-US" dirty="0" err="1" smtClean="0"/>
+              <a:t>ao</a:t>
+            </a:r>
+            <a:r>
+              <a:rPr lang="en-US" dirty="0" smtClean="0"/>
+              <a:t> </a:t>
+            </a:r>
+            <a:r>
+              <a:rPr lang="en-US" dirty="0" err="1" smtClean="0"/>
+              <a:t>invés</a:t>
+            </a:r>
+            <a:r>
+              <a:rPr lang="en-US" dirty="0" smtClean="0"/>
+              <a:t> de </a:t>
+            </a:r>
+            <a:r>
+              <a:rPr lang="en-US" dirty="0" err="1" smtClean="0"/>
+              <a:t>expressões</a:t>
+            </a:r>
+            <a:r>
+              <a:rPr lang="en-US" dirty="0" smtClean="0"/>
+              <a:t> </a:t>
+            </a:r>
+            <a:r>
+              <a:rPr lang="en-US" dirty="0" err="1" smtClean="0"/>
+              <a:t>booleanas</a:t>
+            </a:r>
+            <a:r>
+              <a:rPr lang="en-US" dirty="0" smtClean="0"/>
+              <a:t>.</a:t>
+            </a:r>
+          </a:p>
+          <a:p>
+            <a:r>
+              <a:rPr lang="en-US" dirty="0" err="1" smtClean="0"/>
+              <a:t>Pode</a:t>
+            </a:r>
+            <a:r>
+              <a:rPr lang="en-US" dirty="0" smtClean="0"/>
+              <a:t> </a:t>
+            </a:r>
+            <a:r>
+              <a:rPr lang="en-US" dirty="0" err="1" smtClean="0"/>
+              <a:t>ser</a:t>
+            </a:r>
+            <a:r>
+              <a:rPr lang="en-US" dirty="0" smtClean="0"/>
+              <a:t> </a:t>
+            </a:r>
+            <a:r>
+              <a:rPr lang="en-US" dirty="0" err="1" smtClean="0"/>
+              <a:t>utilizado</a:t>
+            </a:r>
+            <a:r>
+              <a:rPr lang="en-US" dirty="0" smtClean="0"/>
+              <a:t> com </a:t>
+            </a:r>
+            <a:r>
+              <a:rPr lang="en-US" dirty="0" err="1" smtClean="0"/>
+              <a:t>os</a:t>
+            </a:r>
+            <a:r>
+              <a:rPr lang="en-US" dirty="0" smtClean="0"/>
+              <a:t> </a:t>
+            </a:r>
+            <a:r>
+              <a:rPr lang="en-US" dirty="0" err="1" smtClean="0"/>
+              <a:t>tipos</a:t>
+            </a:r>
+            <a:r>
+              <a:rPr lang="en-US" dirty="0" smtClean="0"/>
+              <a:t> de dados: short, </a:t>
+            </a:r>
+            <a:r>
+              <a:rPr lang="en-US" dirty="0" err="1" smtClean="0"/>
+              <a:t>int</a:t>
+            </a:r>
+            <a:r>
+              <a:rPr lang="en-US" dirty="0" smtClean="0"/>
+              <a:t>, byte, char e String (novo Java 1.7)</a:t>
+            </a:r>
+            <a:endParaRPr lang="en-US" dirty="0"/>
+          </a:p>
+        </p:txBody>
+      </p:sp>
+    </p:spTree>
+    <p:extLst>
+      <p:ext uri="{BB962C8B-B14F-4D97-AF65-F5344CB8AC3E}">
+        <p14:creationId xmlns:p14="http://schemas.microsoft.com/office/powerpoint/2010/main" val="1645147363"/>
+      </p:ext>
+    </p:extLst>
+  </p:cSld>
+  <p:clrMapOvr>
+    <a:masterClrMapping/>
+  </p:clrMapOvr>
+</p:sld>
+</file>
+
+<file path=ppt/slides/slide31.xml><?xml version="1.0" encoding="utf-8"?>
+<p:sld xmlns:a="http://schemas.openxmlformats.org/drawingml/2006/main" xmlns:r="http://schemas.openxmlformats.org/officeDocument/2006/relationships" xmlns:p="http://schemas.openxmlformats.org/presentationml/2006/main">
+  <p:cSld>
+    <p:spTree>
+      <p:nvGrpSpPr>
+        <p:cNvPr id="1" name=""/>
+        <p:cNvGrpSpPr/>
+        <p:nvPr/>
+      </p:nvGrpSpPr>
+      <p:grpSpPr>
+        <a:xfrm>
+          <a:off x="0" y="0"/>
+          <a:ext cx="0" cy="0"/>
+          <a:chOff x="0" y="0"/>
+          <a:chExt cx="0" cy="0"/>
+        </a:xfrm>
+      </p:grpSpPr>
+      <p:sp>
+        <p:nvSpPr>
+          <p:cNvPr id="2" name="Title 1"/>
+          <p:cNvSpPr>
+            <a:spLocks noGrp="1"/>
+          </p:cNvSpPr>
+          <p:nvPr>
+            <p:ph type="title"/>
+          </p:nvPr>
+        </p:nvSpPr>
+        <p:spPr/>
+        <p:txBody>
+          <a:bodyPr/>
+          <a:lstStyle/>
+          <a:p>
+            <a:r>
+              <a:rPr lang="en-US" dirty="0" err="1" smtClean="0"/>
+              <a:t>Ramifica</a:t>
+            </a:r>
+            <a:r>
+              <a:rPr lang="en-US" dirty="0" err="1" smtClean="0"/>
+              <a:t>ções</a:t>
+            </a:r>
+            <a:r>
+              <a:rPr lang="en-US" dirty="0" smtClean="0"/>
+              <a:t> Switch</a:t>
+            </a:r>
+            <a:endParaRPr lang="en-US" dirty="0"/>
+          </a:p>
+        </p:txBody>
+      </p:sp>
+      <p:sp>
+        <p:nvSpPr>
+          <p:cNvPr id="3" name="Content Placeholder 2"/>
+          <p:cNvSpPr>
+            <a:spLocks noGrp="1"/>
+          </p:cNvSpPr>
+          <p:nvPr>
+            <p:ph idx="1"/>
+          </p:nvPr>
+        </p:nvSpPr>
+        <p:spPr/>
+        <p:txBody>
+          <a:bodyPr/>
+          <a:lstStyle/>
+          <a:p>
+            <a:pPr marL="0" indent="0">
+              <a:buNone/>
+            </a:pPr>
+            <a:r>
+              <a:rPr lang="en-US" dirty="0" smtClean="0"/>
+              <a:t>Switch (</a:t>
+            </a:r>
+            <a:r>
+              <a:rPr lang="en-US" dirty="0" err="1" smtClean="0"/>
+              <a:t>variavel</a:t>
+            </a:r>
+            <a:r>
+              <a:rPr lang="en-US" dirty="0" smtClean="0"/>
+              <a:t>) {</a:t>
+            </a:r>
+          </a:p>
+          <a:p>
+            <a:pPr marL="0" indent="0">
+              <a:buNone/>
+            </a:pPr>
+            <a:r>
+              <a:rPr lang="en-US" dirty="0" smtClean="0"/>
+              <a:t>	case constante1: </a:t>
+            </a:r>
+            <a:r>
+              <a:rPr lang="en-US" dirty="0" err="1" smtClean="0"/>
+              <a:t>bloco</a:t>
+            </a:r>
+            <a:r>
+              <a:rPr lang="en-US" dirty="0" smtClean="0"/>
+              <a:t> de </a:t>
+            </a:r>
+            <a:r>
+              <a:rPr lang="en-US" dirty="0" err="1" smtClean="0"/>
+              <a:t>codigo</a:t>
+            </a:r>
+            <a:r>
+              <a:rPr lang="en-US" dirty="0" smtClean="0"/>
+              <a:t>;</a:t>
+            </a:r>
+          </a:p>
+          <a:p>
+            <a:pPr marL="0" indent="0">
+              <a:buNone/>
+            </a:pPr>
+            <a:r>
+              <a:rPr lang="en-US" dirty="0" smtClean="0"/>
+              <a:t>	case constante2: </a:t>
+            </a:r>
+            <a:r>
+              <a:rPr lang="en-US" dirty="0" err="1" smtClean="0"/>
+              <a:t>bloco</a:t>
+            </a:r>
+            <a:r>
+              <a:rPr lang="en-US" dirty="0" smtClean="0"/>
+              <a:t> de </a:t>
+            </a:r>
+            <a:r>
+              <a:rPr lang="en-US" dirty="0" err="1" smtClean="0"/>
+              <a:t>codigo</a:t>
+            </a:r>
+            <a:r>
+              <a:rPr lang="en-US" dirty="0" smtClean="0"/>
+              <a:t>;</a:t>
+            </a:r>
+          </a:p>
+          <a:p>
+            <a:pPr marL="0" indent="0">
+              <a:buNone/>
+            </a:pPr>
+            <a:r>
+              <a:rPr lang="en-US" dirty="0" smtClean="0"/>
+              <a:t> </a:t>
+            </a:r>
+            <a:r>
+              <a:rPr lang="en-US" dirty="0"/>
+              <a:t>	</a:t>
+            </a:r>
+            <a:r>
+              <a:rPr lang="en-US" dirty="0" smtClean="0"/>
+              <a:t>default: </a:t>
+            </a:r>
+            <a:r>
+              <a:rPr lang="en-US" dirty="0" err="1" smtClean="0"/>
+              <a:t>bloco</a:t>
+            </a:r>
+            <a:r>
+              <a:rPr lang="en-US" dirty="0" smtClean="0"/>
+              <a:t> de </a:t>
+            </a:r>
+            <a:r>
+              <a:rPr lang="en-US" dirty="0" err="1" smtClean="0"/>
+              <a:t>codigo</a:t>
+            </a:r>
+            <a:r>
+              <a:rPr lang="en-US" dirty="0"/>
+              <a:t>;</a:t>
+            </a:r>
+            <a:endParaRPr lang="en-US" dirty="0" smtClean="0"/>
+          </a:p>
+          <a:p>
+            <a:pPr marL="0" indent="0">
+              <a:buNone/>
+            </a:pPr>
+            <a:r>
+              <a:rPr lang="en-US" dirty="0" smtClean="0"/>
+              <a:t>}</a:t>
+            </a:r>
+            <a:endParaRPr lang="en-US" dirty="0"/>
+          </a:p>
+        </p:txBody>
+      </p:sp>
+    </p:spTree>
+    <p:extLst>
+      <p:ext uri="{BB962C8B-B14F-4D97-AF65-F5344CB8AC3E}">
+        <p14:creationId xmlns:p14="http://schemas.microsoft.com/office/powerpoint/2010/main" val="711891223"/>
+      </p:ext>
+    </p:extLst>
+  </p:cSld>
+  <p:clrMapOvr>
+    <a:masterClrMapping/>
+  </p:clrMapOvr>
+</p:sld>
+</file>
+
+<file path=ppt/slides/slide32.xml><?xml version="1.0" encoding="utf-8"?>
+<p:sld xmlns:a="http://schemas.openxmlformats.org/drawingml/2006/main" xmlns:r="http://schemas.openxmlformats.org/officeDocument/2006/relationships" xmlns:p="http://schemas.openxmlformats.org/presentationml/2006/main">
+  <p:cSld>
+    <p:spTree>
+      <p:nvGrpSpPr>
+        <p:cNvPr id="1" name=""/>
+        <p:cNvGrpSpPr/>
+        <p:nvPr/>
+      </p:nvGrpSpPr>
+      <p:grpSpPr>
+        <a:xfrm>
+          <a:off x="0" y="0"/>
+          <a:ext cx="0" cy="0"/>
+          <a:chOff x="0" y="0"/>
+          <a:chExt cx="0" cy="0"/>
+        </a:xfrm>
+      </p:grpSpPr>
+      <p:sp>
+        <p:nvSpPr>
+          <p:cNvPr id="2" name="Title 1"/>
+          <p:cNvSpPr>
+            <a:spLocks noGrp="1"/>
+          </p:cNvSpPr>
+          <p:nvPr>
+            <p:ph type="title"/>
+          </p:nvPr>
+        </p:nvSpPr>
+        <p:spPr/>
+        <p:txBody>
+          <a:bodyPr/>
+          <a:lstStyle/>
+          <a:p>
+            <a:r>
+              <a:rPr lang="en-US" dirty="0" err="1" smtClean="0"/>
+              <a:t>Exercicios</a:t>
+            </a:r>
+            <a:endParaRPr lang="en-US" dirty="0"/>
+          </a:p>
+        </p:txBody>
+      </p:sp>
+      <p:sp>
+        <p:nvSpPr>
+          <p:cNvPr id="3" name="Content Placeholder 2"/>
+          <p:cNvSpPr>
+            <a:spLocks noGrp="1"/>
+          </p:cNvSpPr>
+          <p:nvPr>
+            <p:ph idx="1"/>
+          </p:nvPr>
+        </p:nvSpPr>
+        <p:spPr/>
+        <p:txBody>
+          <a:bodyPr/>
+          <a:lstStyle/>
+          <a:p>
+            <a:r>
+              <a:rPr lang="en-US" dirty="0" err="1" smtClean="0"/>
+              <a:t>Exercicios</a:t>
+            </a:r>
+            <a:r>
+              <a:rPr lang="en-US" dirty="0" smtClean="0"/>
+              <a:t> </a:t>
+            </a:r>
+            <a:r>
+              <a:rPr lang="en-US" dirty="0" err="1" smtClean="0"/>
+              <a:t>est</a:t>
+            </a:r>
+            <a:r>
+              <a:rPr lang="en-US" dirty="0" err="1" smtClean="0"/>
+              <a:t>ão</a:t>
+            </a:r>
+            <a:r>
+              <a:rPr lang="en-US" dirty="0" smtClean="0"/>
+              <a:t> no </a:t>
+            </a:r>
+            <a:r>
+              <a:rPr lang="en-US" dirty="0" err="1" smtClean="0"/>
+              <a:t>projeto</a:t>
+            </a:r>
+            <a:r>
+              <a:rPr lang="en-US" dirty="0" smtClean="0"/>
+              <a:t> do </a:t>
+            </a:r>
+            <a:r>
+              <a:rPr lang="en-US" dirty="0" err="1" smtClean="0"/>
+              <a:t>Github</a:t>
+            </a:r>
+            <a:r>
+              <a:rPr lang="en-US" dirty="0" smtClean="0"/>
+              <a:t> </a:t>
+            </a:r>
+            <a:r>
+              <a:rPr lang="en-US" dirty="0" err="1" smtClean="0"/>
+              <a:t>na</a:t>
+            </a:r>
+            <a:r>
+              <a:rPr lang="en-US" dirty="0" smtClean="0"/>
+              <a:t> pasta </a:t>
+            </a:r>
+            <a:r>
+              <a:rPr lang="en-US" dirty="0" err="1" smtClean="0"/>
+              <a:t>Semana</a:t>
+            </a:r>
+            <a:r>
+              <a:rPr lang="en-US" dirty="0" smtClean="0"/>
+              <a:t> 01;</a:t>
+            </a:r>
+          </a:p>
+          <a:p>
+            <a:r>
+              <a:rPr lang="en-US" dirty="0" err="1" smtClean="0"/>
+              <a:t>Basta</a:t>
+            </a:r>
+            <a:r>
+              <a:rPr lang="en-US" dirty="0" smtClean="0"/>
+              <a:t> </a:t>
+            </a:r>
+            <a:r>
+              <a:rPr lang="en-US" dirty="0" err="1" smtClean="0"/>
+              <a:t>importar</a:t>
+            </a:r>
+            <a:r>
+              <a:rPr lang="en-US" dirty="0" smtClean="0"/>
+              <a:t> </a:t>
+            </a:r>
+            <a:r>
+              <a:rPr lang="en-US" dirty="0" err="1" smtClean="0"/>
+              <a:t>para</a:t>
+            </a:r>
+            <a:r>
+              <a:rPr lang="en-US" dirty="0" smtClean="0"/>
+              <a:t> o eclipse o </a:t>
+            </a:r>
+            <a:r>
+              <a:rPr lang="en-US" dirty="0" err="1" smtClean="0"/>
+              <a:t>projeto</a:t>
+            </a:r>
+            <a:r>
+              <a:rPr lang="en-US" dirty="0" smtClean="0"/>
+              <a:t> java </a:t>
+            </a:r>
+            <a:r>
+              <a:rPr lang="en-US" dirty="0" err="1" smtClean="0"/>
+              <a:t>que</a:t>
+            </a:r>
+            <a:r>
+              <a:rPr lang="en-US" dirty="0" smtClean="0"/>
+              <a:t> </a:t>
+            </a:r>
+            <a:r>
+              <a:rPr lang="en-US" dirty="0" err="1" smtClean="0"/>
+              <a:t>está</a:t>
+            </a:r>
+            <a:r>
+              <a:rPr lang="en-US" dirty="0" smtClean="0"/>
+              <a:t> </a:t>
+            </a:r>
+            <a:r>
+              <a:rPr lang="en-US" dirty="0" err="1" smtClean="0"/>
+              <a:t>dentro</a:t>
+            </a:r>
+            <a:r>
+              <a:rPr lang="en-US" dirty="0" smtClean="0"/>
+              <a:t> </a:t>
+            </a:r>
+            <a:r>
+              <a:rPr lang="en-US" dirty="0" err="1" smtClean="0"/>
+              <a:t>desta</a:t>
+            </a:r>
+            <a:r>
+              <a:rPr lang="en-US" dirty="0" smtClean="0"/>
+              <a:t> pasta;</a:t>
+            </a:r>
+            <a:endParaRPr lang="en-US" dirty="0"/>
+          </a:p>
+        </p:txBody>
+      </p:sp>
+    </p:spTree>
+    <p:extLst>
+      <p:ext uri="{BB962C8B-B14F-4D97-AF65-F5344CB8AC3E}">
+        <p14:creationId xmlns:p14="http://schemas.microsoft.com/office/powerpoint/2010/main" val="2770274213"/>
+      </p:ext>
+    </p:extLst>
+  </p:cSld>
+  <p:clrMapOvr>
+    <a:masterClrMapping/>
+  </p:clrMapOvr>
+</p:sld>
+</file>
+
+<file path=ppt/slides/slide33.xml><?xml version="1.0" encoding="utf-8"?>
+<p:sld xmlns:a="http://schemas.openxmlformats.org/drawingml/2006/main" xmlns:r="http://schemas.openxmlformats.org/officeDocument/2006/relationships" xmlns:p="http://schemas.openxmlformats.org/presentationml/2006/main">
+  <p:cSld>
+    <p:spTree>
+      <p:nvGrpSpPr>
+        <p:cNvPr id="1" name=""/>
+        <p:cNvGrpSpPr/>
+        <p:nvPr/>
+      </p:nvGrpSpPr>
+      <p:grpSpPr>
+        <a:xfrm>
+          <a:off x="0" y="0"/>
+          <a:ext cx="0" cy="0"/>
+          <a:chOff x="0" y="0"/>
+          <a:chExt cx="0" cy="0"/>
+        </a:xfrm>
+      </p:grpSpPr>
+      <p:sp>
+        <p:nvSpPr>
+          <p:cNvPr id="2" name="Title 1"/>
+          <p:cNvSpPr>
+            <a:spLocks noGrp="1"/>
+          </p:cNvSpPr>
+          <p:nvPr>
+            <p:ph type="title"/>
+          </p:nvPr>
+        </p:nvSpPr>
+        <p:spPr/>
+        <p:txBody>
+          <a:bodyPr/>
+          <a:lstStyle/>
+          <a:p>
+            <a:r>
+              <a:rPr lang="en-US" dirty="0" smtClean="0"/>
+              <a:t>Loops e </a:t>
+            </a:r>
+            <a:r>
+              <a:rPr lang="en-US" dirty="0" err="1" smtClean="0"/>
+              <a:t>Iteradores</a:t>
+            </a:r>
+            <a:r>
+              <a:rPr lang="en-US" dirty="0" smtClean="0"/>
+              <a:t> - FOR</a:t>
+            </a:r>
+            <a:endParaRPr lang="en-US" dirty="0"/>
+          </a:p>
+        </p:txBody>
+      </p:sp>
+      <p:sp>
+        <p:nvSpPr>
+          <p:cNvPr id="3" name="Content Placeholder 2"/>
+          <p:cNvSpPr>
+            <a:spLocks noGrp="1"/>
+          </p:cNvSpPr>
+          <p:nvPr>
+            <p:ph idx="1"/>
+          </p:nvPr>
+        </p:nvSpPr>
+        <p:spPr/>
+        <p:txBody>
+          <a:bodyPr/>
+          <a:lstStyle/>
+          <a:p>
+            <a:r>
+              <a:rPr lang="en-US" dirty="0" smtClean="0"/>
+              <a:t>A </a:t>
+            </a:r>
+            <a:r>
+              <a:rPr lang="en-US" dirty="0" err="1" smtClean="0"/>
+              <a:t>declara</a:t>
+            </a:r>
+            <a:r>
+              <a:rPr lang="en-US" dirty="0" err="1" smtClean="0"/>
+              <a:t>ção</a:t>
+            </a:r>
+            <a:r>
+              <a:rPr lang="en-US" dirty="0" smtClean="0"/>
+              <a:t> for </a:t>
+            </a:r>
+            <a:r>
+              <a:rPr lang="en-US" dirty="0" err="1" smtClean="0"/>
+              <a:t>é</a:t>
+            </a:r>
+            <a:r>
+              <a:rPr lang="en-US" dirty="0" smtClean="0"/>
+              <a:t> </a:t>
+            </a:r>
+            <a:r>
+              <a:rPr lang="en-US" dirty="0" err="1" smtClean="0"/>
+              <a:t>utilizada</a:t>
+            </a:r>
+            <a:r>
+              <a:rPr lang="en-US" dirty="0" smtClean="0"/>
+              <a:t> </a:t>
+            </a:r>
+            <a:r>
+              <a:rPr lang="en-US" dirty="0" err="1" smtClean="0"/>
+              <a:t>para</a:t>
+            </a:r>
+            <a:r>
+              <a:rPr lang="en-US" dirty="0" smtClean="0"/>
+              <a:t> </a:t>
+            </a:r>
+            <a:r>
+              <a:rPr lang="en-US" dirty="0" err="1" smtClean="0"/>
+              <a:t>definir</a:t>
+            </a:r>
+            <a:r>
+              <a:rPr lang="en-US" dirty="0" smtClean="0"/>
+              <a:t> </a:t>
+            </a:r>
+            <a:r>
+              <a:rPr lang="en-US" dirty="0" err="1" smtClean="0"/>
+              <a:t>que</a:t>
+            </a:r>
+            <a:r>
+              <a:rPr lang="en-US" dirty="0" smtClean="0"/>
+              <a:t> um </a:t>
+            </a:r>
+            <a:r>
+              <a:rPr lang="en-US" dirty="0" err="1" smtClean="0"/>
+              <a:t>bloco</a:t>
+            </a:r>
+            <a:r>
+              <a:rPr lang="en-US" dirty="0" smtClean="0"/>
+              <a:t> de </a:t>
+            </a:r>
+            <a:r>
+              <a:rPr lang="en-US" dirty="0" err="1" smtClean="0"/>
+              <a:t>comandos</a:t>
+            </a:r>
+            <a:r>
+              <a:rPr lang="en-US" dirty="0" smtClean="0"/>
+              <a:t> deva </a:t>
+            </a:r>
+            <a:r>
+              <a:rPr lang="en-US" dirty="0" err="1" smtClean="0"/>
+              <a:t>ser</a:t>
+            </a:r>
+            <a:r>
+              <a:rPr lang="en-US" dirty="0" smtClean="0"/>
+              <a:t> </a:t>
+            </a:r>
+            <a:r>
+              <a:rPr lang="en-US" dirty="0" err="1" smtClean="0"/>
+              <a:t>executado</a:t>
+            </a:r>
+            <a:r>
+              <a:rPr lang="en-US" dirty="0" smtClean="0"/>
+              <a:t> ‘n’ </a:t>
+            </a:r>
+            <a:r>
+              <a:rPr lang="en-US" dirty="0" err="1" smtClean="0"/>
+              <a:t>vezes</a:t>
+            </a:r>
+            <a:r>
+              <a:rPr lang="en-US" dirty="0" smtClean="0"/>
+              <a:t>. </a:t>
+            </a:r>
+            <a:r>
+              <a:rPr lang="en-US" dirty="0" err="1" smtClean="0"/>
+              <a:t>Onde</a:t>
+            </a:r>
+            <a:r>
+              <a:rPr lang="en-US" dirty="0" smtClean="0"/>
+              <a:t> ‘n’ </a:t>
+            </a:r>
+            <a:r>
+              <a:rPr lang="en-US" dirty="0" err="1" smtClean="0"/>
+              <a:t>é</a:t>
+            </a:r>
+            <a:r>
+              <a:rPr lang="en-US" dirty="0" smtClean="0"/>
+              <a:t> um </a:t>
+            </a:r>
+            <a:r>
+              <a:rPr lang="en-US" dirty="0" err="1" smtClean="0"/>
+              <a:t>número</a:t>
+            </a:r>
+            <a:r>
+              <a:rPr lang="en-US" dirty="0" smtClean="0"/>
+              <a:t> </a:t>
+            </a:r>
+            <a:r>
+              <a:rPr lang="en-US" dirty="0" err="1" smtClean="0"/>
+              <a:t>inteiro</a:t>
+            </a:r>
+            <a:r>
+              <a:rPr lang="en-US" dirty="0" smtClean="0"/>
+              <a:t>.</a:t>
+            </a:r>
+          </a:p>
+          <a:p>
+            <a:pPr marL="0" indent="0">
+              <a:buNone/>
+            </a:pPr>
+            <a:endParaRPr lang="en-US" dirty="0" smtClean="0"/>
+          </a:p>
+          <a:p>
+            <a:pPr marL="0" indent="0">
+              <a:buNone/>
+            </a:pPr>
+            <a:r>
+              <a:rPr lang="en-US" dirty="0" smtClean="0">
+                <a:solidFill>
+                  <a:schemeClr val="tx2"/>
+                </a:solidFill>
+              </a:rPr>
+              <a:t>for ( </a:t>
+            </a:r>
+            <a:r>
+              <a:rPr lang="en-US" dirty="0" err="1" smtClean="0">
+                <a:solidFill>
+                  <a:schemeClr val="tx2"/>
+                </a:solidFill>
+              </a:rPr>
+              <a:t>int</a:t>
+            </a:r>
+            <a:r>
+              <a:rPr lang="en-US" dirty="0" smtClean="0">
+                <a:solidFill>
+                  <a:schemeClr val="tx2"/>
+                </a:solidFill>
+              </a:rPr>
+              <a:t> I = 0; I &lt; 10; </a:t>
+            </a:r>
+            <a:r>
+              <a:rPr lang="en-US" dirty="0" err="1" smtClean="0">
+                <a:solidFill>
+                  <a:schemeClr val="tx2"/>
+                </a:solidFill>
+              </a:rPr>
+              <a:t>i</a:t>
+            </a:r>
+            <a:r>
+              <a:rPr lang="en-US" dirty="0" smtClean="0">
+                <a:solidFill>
+                  <a:schemeClr val="tx2"/>
+                </a:solidFill>
+              </a:rPr>
+              <a:t>++ ) {</a:t>
+            </a:r>
+          </a:p>
+          <a:p>
+            <a:pPr marL="0" indent="0">
+              <a:buNone/>
+            </a:pPr>
+            <a:r>
+              <a:rPr lang="en-US" dirty="0">
+                <a:solidFill>
+                  <a:schemeClr val="tx2"/>
+                </a:solidFill>
+              </a:rPr>
+              <a:t>	</a:t>
+            </a:r>
+            <a:r>
+              <a:rPr lang="en-US" dirty="0" smtClean="0">
+                <a:solidFill>
+                  <a:schemeClr val="tx2"/>
+                </a:solidFill>
+              </a:rPr>
+              <a:t>// </a:t>
+            </a:r>
+            <a:r>
+              <a:rPr lang="en-US" dirty="0" err="1" smtClean="0">
+                <a:solidFill>
+                  <a:schemeClr val="tx2"/>
+                </a:solidFill>
+              </a:rPr>
+              <a:t>bloco</a:t>
+            </a:r>
+            <a:r>
+              <a:rPr lang="en-US" dirty="0" smtClean="0">
+                <a:solidFill>
+                  <a:schemeClr val="tx2"/>
+                </a:solidFill>
+              </a:rPr>
+              <a:t> de </a:t>
+            </a:r>
+            <a:r>
+              <a:rPr lang="en-US" dirty="0" err="1" smtClean="0">
+                <a:solidFill>
+                  <a:schemeClr val="tx2"/>
+                </a:solidFill>
+              </a:rPr>
+              <a:t>comandos</a:t>
+            </a:r>
+            <a:endParaRPr lang="en-US" dirty="0" smtClean="0">
+              <a:solidFill>
+                <a:schemeClr val="tx2"/>
+              </a:solidFill>
+            </a:endParaRPr>
+          </a:p>
+          <a:p>
+            <a:pPr marL="0" indent="0">
+              <a:buNone/>
+            </a:pPr>
+            <a:r>
+              <a:rPr lang="en-US" dirty="0">
+                <a:solidFill>
+                  <a:schemeClr val="tx2"/>
+                </a:solidFill>
+              </a:rPr>
+              <a:t>}</a:t>
+            </a:r>
+            <a:endParaRPr lang="en-US" dirty="0">
+              <a:solidFill>
+                <a:schemeClr val="tx2"/>
+              </a:solidFill>
+            </a:endParaRPr>
+          </a:p>
+        </p:txBody>
+      </p:sp>
+    </p:spTree>
+    <p:extLst>
+      <p:ext uri="{BB962C8B-B14F-4D97-AF65-F5344CB8AC3E}">
+        <p14:creationId xmlns:p14="http://schemas.microsoft.com/office/powerpoint/2010/main" val="3438630837"/>
+      </p:ext>
+    </p:extLst>
+  </p:cSld>
+  <p:clrMapOvr>
+    <a:masterClrMapping/>
+  </p:clrMapOvr>
+</p:sld>
+</file>
+
+<file path=ppt/slides/slide34.xml><?xml version="1.0" encoding="utf-8"?>
+<p:sld xmlns:a="http://schemas.openxmlformats.org/drawingml/2006/main" xmlns:r="http://schemas.openxmlformats.org/officeDocument/2006/relationships" xmlns:p="http://schemas.openxmlformats.org/presentationml/2006/main">
+  <p:cSld>
+    <p:spTree>
+      <p:nvGrpSpPr>
+        <p:cNvPr id="1" name=""/>
+        <p:cNvGrpSpPr/>
+        <p:nvPr/>
+      </p:nvGrpSpPr>
+      <p:grpSpPr>
+        <a:xfrm>
+          <a:off x="0" y="0"/>
+          <a:ext cx="0" cy="0"/>
+          <a:chOff x="0" y="0"/>
+          <a:chExt cx="0" cy="0"/>
+        </a:xfrm>
+      </p:grpSpPr>
+      <p:sp>
+        <p:nvSpPr>
+          <p:cNvPr id="2" name="Title 1"/>
+          <p:cNvSpPr>
+            <a:spLocks noGrp="1"/>
+          </p:cNvSpPr>
+          <p:nvPr>
+            <p:ph type="title"/>
+          </p:nvPr>
+        </p:nvSpPr>
+        <p:spPr/>
+        <p:txBody>
+          <a:bodyPr>
+            <a:normAutofit fontScale="90000"/>
+          </a:bodyPr>
+          <a:lstStyle/>
+          <a:p>
+            <a:r>
+              <a:rPr lang="en-US" dirty="0" smtClean="0"/>
+              <a:t>Loops e </a:t>
+            </a:r>
+            <a:r>
+              <a:rPr lang="en-US" dirty="0" err="1" smtClean="0"/>
+              <a:t>Iteradores</a:t>
+            </a:r>
+            <a:r>
+              <a:rPr lang="en-US" dirty="0" smtClean="0"/>
+              <a:t> – FOR </a:t>
+            </a:r>
+            <a:r>
+              <a:rPr lang="en-US" dirty="0" err="1" smtClean="0"/>
+              <a:t>aprimorado</a:t>
+            </a:r>
+            <a:endParaRPr lang="en-US" dirty="0"/>
+          </a:p>
+        </p:txBody>
+      </p:sp>
+      <p:sp>
+        <p:nvSpPr>
+          <p:cNvPr id="3" name="Content Placeholder 2"/>
+          <p:cNvSpPr>
+            <a:spLocks noGrp="1"/>
+          </p:cNvSpPr>
+          <p:nvPr>
+            <p:ph idx="1"/>
+          </p:nvPr>
+        </p:nvSpPr>
+        <p:spPr/>
+        <p:txBody>
+          <a:bodyPr>
+            <a:normAutofit fontScale="85000" lnSpcReduction="10000"/>
+          </a:bodyPr>
+          <a:lstStyle/>
+          <a:p>
+            <a:r>
+              <a:rPr lang="en-US" dirty="0" err="1" smtClean="0"/>
+              <a:t>Introduzido</a:t>
+            </a:r>
+            <a:r>
+              <a:rPr lang="en-US" dirty="0" smtClean="0"/>
+              <a:t> </a:t>
+            </a:r>
+            <a:r>
+              <a:rPr lang="en-US" dirty="0" err="1" smtClean="0"/>
+              <a:t>na</a:t>
+            </a:r>
+            <a:r>
+              <a:rPr lang="en-US" dirty="0" smtClean="0"/>
+              <a:t> </a:t>
+            </a:r>
+            <a:r>
+              <a:rPr lang="en-US" dirty="0" err="1" smtClean="0"/>
+              <a:t>vers</a:t>
+            </a:r>
+            <a:r>
+              <a:rPr lang="en-US" dirty="0" err="1" smtClean="0"/>
+              <a:t>ão</a:t>
+            </a:r>
+            <a:r>
+              <a:rPr lang="en-US" dirty="0" smtClean="0"/>
+              <a:t> 5 do java, </a:t>
+            </a:r>
+            <a:r>
+              <a:rPr lang="en-US" dirty="0" err="1" smtClean="0"/>
+              <a:t>simplifica</a:t>
+            </a:r>
+            <a:r>
+              <a:rPr lang="en-US" dirty="0"/>
+              <a:t> </a:t>
+            </a:r>
+            <a:r>
+              <a:rPr lang="en-US" dirty="0" smtClean="0"/>
+              <a:t>a </a:t>
+            </a:r>
+            <a:r>
+              <a:rPr lang="en-US" dirty="0" err="1" smtClean="0"/>
+              <a:t>tarefa</a:t>
+            </a:r>
+            <a:r>
+              <a:rPr lang="en-US" dirty="0" smtClean="0"/>
+              <a:t> de </a:t>
+            </a:r>
+            <a:r>
+              <a:rPr lang="en-US" dirty="0" err="1" smtClean="0"/>
+              <a:t>fazer</a:t>
+            </a:r>
+            <a:r>
+              <a:rPr lang="en-US" dirty="0" smtClean="0"/>
+              <a:t> loop </a:t>
+            </a:r>
+            <a:r>
+              <a:rPr lang="en-US" dirty="0" err="1" smtClean="0"/>
+              <a:t>através</a:t>
+            </a:r>
+            <a:r>
+              <a:rPr lang="en-US" dirty="0" smtClean="0"/>
+              <a:t> de um array </a:t>
+            </a:r>
+            <a:r>
+              <a:rPr lang="en-US" dirty="0" err="1" smtClean="0"/>
+              <a:t>ou</a:t>
+            </a:r>
+            <a:r>
+              <a:rPr lang="en-US" dirty="0" smtClean="0"/>
+              <a:t> </a:t>
+            </a:r>
+            <a:r>
+              <a:rPr lang="en-US" dirty="0" err="1" smtClean="0"/>
+              <a:t>conjunto</a:t>
+            </a:r>
+            <a:r>
+              <a:rPr lang="en-US" dirty="0" smtClean="0"/>
+              <a:t>.</a:t>
+            </a:r>
+          </a:p>
+          <a:p>
+            <a:r>
+              <a:rPr lang="en-US" dirty="0" smtClean="0"/>
+              <a:t>A </a:t>
+            </a:r>
+            <a:r>
+              <a:rPr lang="en-US" dirty="0" err="1" smtClean="0"/>
+              <a:t>primeira</a:t>
+            </a:r>
+            <a:r>
+              <a:rPr lang="en-US" dirty="0" smtClean="0"/>
+              <a:t> parte do for </a:t>
+            </a:r>
+            <a:r>
+              <a:rPr lang="en-US" dirty="0" err="1" smtClean="0"/>
+              <a:t>deve</a:t>
+            </a:r>
+            <a:r>
+              <a:rPr lang="en-US" dirty="0" smtClean="0"/>
+              <a:t> </a:t>
+            </a:r>
+            <a:r>
+              <a:rPr lang="en-US" dirty="0" err="1" smtClean="0"/>
+              <a:t>ser</a:t>
+            </a:r>
+            <a:r>
+              <a:rPr lang="en-US" dirty="0" smtClean="0"/>
+              <a:t> a </a:t>
+            </a:r>
+            <a:r>
+              <a:rPr lang="en-US" dirty="0" err="1" smtClean="0"/>
+              <a:t>declaração</a:t>
+            </a:r>
+            <a:r>
+              <a:rPr lang="en-US" dirty="0" smtClean="0"/>
+              <a:t> de </a:t>
+            </a:r>
+            <a:r>
+              <a:rPr lang="en-US" dirty="0" err="1" smtClean="0"/>
+              <a:t>uma</a:t>
+            </a:r>
+            <a:r>
+              <a:rPr lang="en-US" dirty="0" smtClean="0"/>
+              <a:t> </a:t>
+            </a:r>
+            <a:r>
+              <a:rPr lang="en-US" dirty="0" err="1" smtClean="0"/>
+              <a:t>variavel</a:t>
+            </a:r>
+            <a:r>
+              <a:rPr lang="en-US" dirty="0" smtClean="0"/>
+              <a:t> do </a:t>
+            </a:r>
+            <a:r>
+              <a:rPr lang="en-US" dirty="0" err="1" smtClean="0"/>
+              <a:t>tipo</a:t>
+            </a:r>
+            <a:r>
+              <a:rPr lang="en-US" dirty="0" smtClean="0"/>
+              <a:t> </a:t>
+            </a:r>
+            <a:r>
+              <a:rPr lang="en-US" dirty="0" err="1" smtClean="0"/>
+              <a:t>compativel</a:t>
+            </a:r>
+            <a:r>
+              <a:rPr lang="en-US" dirty="0" smtClean="0"/>
+              <a:t> com </a:t>
+            </a:r>
+            <a:r>
+              <a:rPr lang="en-US" dirty="0" err="1" smtClean="0"/>
+              <a:t>os</a:t>
+            </a:r>
+            <a:r>
+              <a:rPr lang="en-US" dirty="0" smtClean="0"/>
+              <a:t> </a:t>
+            </a:r>
+            <a:r>
+              <a:rPr lang="en-US" dirty="0" err="1" smtClean="0"/>
+              <a:t>elementos</a:t>
+            </a:r>
+            <a:r>
+              <a:rPr lang="en-US" dirty="0" smtClean="0"/>
+              <a:t> </a:t>
+            </a:r>
+            <a:r>
+              <a:rPr lang="en-US" dirty="0" err="1" smtClean="0"/>
+              <a:t>contidos</a:t>
+            </a:r>
+            <a:r>
+              <a:rPr lang="en-US" dirty="0" smtClean="0"/>
+              <a:t> </a:t>
+            </a:r>
+            <a:r>
+              <a:rPr lang="en-US" dirty="0" err="1" smtClean="0"/>
+              <a:t>na</a:t>
+            </a:r>
+            <a:r>
+              <a:rPr lang="en-US" dirty="0" smtClean="0"/>
+              <a:t> </a:t>
+            </a:r>
+            <a:r>
+              <a:rPr lang="en-US" dirty="0" err="1" smtClean="0"/>
+              <a:t>lista</a:t>
+            </a:r>
+            <a:r>
+              <a:rPr lang="en-US" dirty="0" smtClean="0"/>
+              <a:t>/array.</a:t>
+            </a:r>
+          </a:p>
+          <a:p>
+            <a:r>
+              <a:rPr lang="en-US" dirty="0" smtClean="0"/>
+              <a:t>A </a:t>
+            </a:r>
+            <a:r>
+              <a:rPr lang="en-US" dirty="0" err="1" smtClean="0"/>
+              <a:t>segunda</a:t>
+            </a:r>
+            <a:r>
+              <a:rPr lang="en-US" dirty="0" smtClean="0"/>
+              <a:t> parte </a:t>
+            </a:r>
+            <a:r>
+              <a:rPr lang="en-US" dirty="0" err="1" smtClean="0"/>
+              <a:t>é</a:t>
+            </a:r>
+            <a:r>
+              <a:rPr lang="en-US" dirty="0" smtClean="0"/>
+              <a:t> o </a:t>
+            </a:r>
+            <a:r>
+              <a:rPr lang="en-US" dirty="0" err="1" smtClean="0"/>
+              <a:t>conjunto</a:t>
+            </a:r>
+            <a:r>
+              <a:rPr lang="en-US" dirty="0" smtClean="0"/>
+              <a:t> a </a:t>
+            </a:r>
+            <a:r>
+              <a:rPr lang="en-US" smtClean="0"/>
+              <a:t>iterar</a:t>
+            </a:r>
+            <a:endParaRPr lang="en-US" dirty="0" smtClean="0"/>
+          </a:p>
+          <a:p>
+            <a:pPr marL="0" indent="0">
+              <a:buNone/>
+            </a:pPr>
+            <a:endParaRPr lang="en-US" dirty="0" smtClean="0"/>
+          </a:p>
+          <a:p>
+            <a:pPr marL="0" indent="0">
+              <a:buNone/>
+            </a:pPr>
+            <a:r>
+              <a:rPr lang="en-US" dirty="0" smtClean="0">
+                <a:solidFill>
+                  <a:schemeClr val="tx2"/>
+                </a:solidFill>
+              </a:rPr>
+              <a:t>for ( </a:t>
+            </a:r>
+            <a:r>
+              <a:rPr lang="en-US" dirty="0" err="1" smtClean="0">
+                <a:solidFill>
+                  <a:schemeClr val="tx2"/>
+                </a:solidFill>
+              </a:rPr>
+              <a:t>declaração</a:t>
+            </a:r>
+            <a:r>
+              <a:rPr lang="en-US" dirty="0" smtClean="0">
+                <a:solidFill>
+                  <a:schemeClr val="tx2"/>
+                </a:solidFill>
+              </a:rPr>
+              <a:t> : </a:t>
+            </a:r>
+            <a:r>
+              <a:rPr lang="en-US" dirty="0" err="1" smtClean="0">
+                <a:solidFill>
+                  <a:schemeClr val="tx2"/>
+                </a:solidFill>
+              </a:rPr>
+              <a:t>expressão</a:t>
+            </a:r>
+            <a:r>
+              <a:rPr lang="en-US" dirty="0" smtClean="0">
+                <a:solidFill>
+                  <a:schemeClr val="tx2"/>
+                </a:solidFill>
+              </a:rPr>
+              <a:t> ) {</a:t>
+            </a:r>
+          </a:p>
+          <a:p>
+            <a:pPr marL="0" indent="0">
+              <a:buNone/>
+            </a:pPr>
+            <a:r>
+              <a:rPr lang="en-US" dirty="0">
+                <a:solidFill>
+                  <a:schemeClr val="tx2"/>
+                </a:solidFill>
+              </a:rPr>
+              <a:t>	</a:t>
+            </a:r>
+            <a:r>
+              <a:rPr lang="en-US" dirty="0" smtClean="0">
+                <a:solidFill>
+                  <a:schemeClr val="tx2"/>
+                </a:solidFill>
+              </a:rPr>
+              <a:t>// </a:t>
+            </a:r>
+            <a:r>
+              <a:rPr lang="en-US" dirty="0" err="1" smtClean="0">
+                <a:solidFill>
+                  <a:schemeClr val="tx2"/>
+                </a:solidFill>
+              </a:rPr>
+              <a:t>bloco</a:t>
+            </a:r>
+            <a:r>
+              <a:rPr lang="en-US" dirty="0" smtClean="0">
+                <a:solidFill>
+                  <a:schemeClr val="tx2"/>
+                </a:solidFill>
+              </a:rPr>
+              <a:t> de </a:t>
+            </a:r>
+            <a:r>
+              <a:rPr lang="en-US" dirty="0" err="1" smtClean="0">
+                <a:solidFill>
+                  <a:schemeClr val="tx2"/>
+                </a:solidFill>
+              </a:rPr>
+              <a:t>comandos</a:t>
+            </a:r>
+            <a:endParaRPr lang="en-US" dirty="0" smtClean="0">
+              <a:solidFill>
+                <a:schemeClr val="tx2"/>
+              </a:solidFill>
+            </a:endParaRPr>
+          </a:p>
+          <a:p>
+            <a:pPr marL="0" indent="0">
+              <a:buNone/>
+            </a:pPr>
+            <a:r>
+              <a:rPr lang="en-US" dirty="0">
+                <a:solidFill>
+                  <a:schemeClr val="tx2"/>
+                </a:solidFill>
+              </a:rPr>
+              <a:t>}</a:t>
+            </a:r>
+            <a:endParaRPr lang="en-US" dirty="0">
+              <a:solidFill>
+                <a:schemeClr val="tx2"/>
+              </a:solidFill>
+            </a:endParaRPr>
+          </a:p>
+        </p:txBody>
+      </p:sp>
+    </p:spTree>
+    <p:extLst>
+      <p:ext uri="{BB962C8B-B14F-4D97-AF65-F5344CB8AC3E}">
+        <p14:creationId xmlns:p14="http://schemas.microsoft.com/office/powerpoint/2010/main" val="618840000"/>
+      </p:ext>
+    </p:extLst>
+  </p:cSld>
+  <p:clrMapOvr>
+    <a:masterClrMapping/>
+  </p:clrMapOvr>
+</p:sld>
+</file>
+
+<file path=ppt/slides/slide35.xml><?xml version="1.0" encoding="utf-8"?>
+<p:sld xmlns:a="http://schemas.openxmlformats.org/drawingml/2006/main" xmlns:r="http://schemas.openxmlformats.org/officeDocument/2006/relationships" xmlns:p="http://schemas.openxmlformats.org/presentationml/2006/main">
+  <p:cSld>
+    <p:spTree>
+      <p:nvGrpSpPr>
+        <p:cNvPr id="1" name=""/>
+        <p:cNvGrpSpPr/>
+        <p:nvPr/>
+      </p:nvGrpSpPr>
+      <p:grpSpPr>
+        <a:xfrm>
+          <a:off x="0" y="0"/>
+          <a:ext cx="0" cy="0"/>
+          <a:chOff x="0" y="0"/>
+          <a:chExt cx="0" cy="0"/>
+        </a:xfrm>
+      </p:grpSpPr>
+      <p:sp>
+        <p:nvSpPr>
+          <p:cNvPr id="2" name="Title 1"/>
+          <p:cNvSpPr>
+            <a:spLocks noGrp="1"/>
+          </p:cNvSpPr>
+          <p:nvPr>
+            <p:ph type="title"/>
+          </p:nvPr>
+        </p:nvSpPr>
+        <p:spPr/>
+        <p:txBody>
+          <a:bodyPr/>
+          <a:lstStyle/>
+          <a:p>
+            <a:r>
+              <a:rPr lang="en-US" dirty="0" smtClean="0"/>
+              <a:t>Loops e </a:t>
+            </a:r>
+            <a:r>
+              <a:rPr lang="en-US" dirty="0" err="1" smtClean="0"/>
+              <a:t>Iteradores</a:t>
+            </a:r>
+            <a:r>
+              <a:rPr lang="en-US" dirty="0" smtClean="0"/>
+              <a:t> - WHILE</a:t>
+            </a:r>
+            <a:endParaRPr lang="en-US" dirty="0"/>
+          </a:p>
+        </p:txBody>
+      </p:sp>
+      <p:sp>
+        <p:nvSpPr>
+          <p:cNvPr id="3" name="Content Placeholder 2"/>
+          <p:cNvSpPr>
+            <a:spLocks noGrp="1"/>
+          </p:cNvSpPr>
+          <p:nvPr>
+            <p:ph idx="1"/>
+          </p:nvPr>
+        </p:nvSpPr>
+        <p:spPr/>
+        <p:txBody>
+          <a:bodyPr/>
+          <a:lstStyle/>
+          <a:p>
+            <a:r>
+              <a:rPr lang="en-US" dirty="0" smtClean="0"/>
+              <a:t>A </a:t>
+            </a:r>
+            <a:r>
+              <a:rPr lang="en-US" dirty="0" err="1" smtClean="0"/>
+              <a:t>declara</a:t>
+            </a:r>
+            <a:r>
+              <a:rPr lang="en-US" dirty="0" err="1" smtClean="0"/>
+              <a:t>ção</a:t>
+            </a:r>
+            <a:r>
+              <a:rPr lang="en-US" dirty="0" smtClean="0"/>
+              <a:t> while </a:t>
+            </a:r>
+            <a:r>
+              <a:rPr lang="en-US" dirty="0" err="1" smtClean="0"/>
+              <a:t>é</a:t>
+            </a:r>
+            <a:r>
+              <a:rPr lang="en-US" dirty="0" smtClean="0"/>
+              <a:t> </a:t>
+            </a:r>
+            <a:r>
+              <a:rPr lang="en-US" dirty="0" err="1" smtClean="0"/>
+              <a:t>utilizada</a:t>
+            </a:r>
+            <a:r>
+              <a:rPr lang="en-US" dirty="0" smtClean="0"/>
+              <a:t> </a:t>
+            </a:r>
+            <a:r>
+              <a:rPr lang="en-US" dirty="0" err="1" smtClean="0"/>
+              <a:t>para</a:t>
+            </a:r>
+            <a:r>
+              <a:rPr lang="en-US" dirty="0" smtClean="0"/>
+              <a:t> </a:t>
+            </a:r>
+            <a:r>
+              <a:rPr lang="en-US" dirty="0" err="1" smtClean="0"/>
+              <a:t>definir</a:t>
+            </a:r>
+            <a:r>
+              <a:rPr lang="en-US" dirty="0"/>
+              <a:t> </a:t>
+            </a:r>
+            <a:r>
+              <a:rPr lang="en-US" dirty="0" err="1" smtClean="0"/>
+              <a:t>que</a:t>
+            </a:r>
+            <a:r>
+              <a:rPr lang="en-US" dirty="0" smtClean="0"/>
+              <a:t> um </a:t>
+            </a:r>
+            <a:r>
+              <a:rPr lang="en-US" dirty="0" err="1" smtClean="0"/>
+              <a:t>bloco</a:t>
+            </a:r>
+            <a:r>
+              <a:rPr lang="en-US" dirty="0" smtClean="0"/>
+              <a:t> de </a:t>
+            </a:r>
+            <a:r>
+              <a:rPr lang="en-US" dirty="0" err="1" smtClean="0"/>
+              <a:t>comandos</a:t>
+            </a:r>
+            <a:r>
+              <a:rPr lang="en-US" dirty="0" smtClean="0"/>
+              <a:t> deva </a:t>
+            </a:r>
+            <a:r>
+              <a:rPr lang="en-US" dirty="0" err="1" smtClean="0"/>
+              <a:t>ser</a:t>
+            </a:r>
+            <a:r>
+              <a:rPr lang="en-US" dirty="0" smtClean="0"/>
+              <a:t> </a:t>
+            </a:r>
+            <a:r>
+              <a:rPr lang="en-US" dirty="0" err="1" smtClean="0"/>
+              <a:t>executado</a:t>
+            </a:r>
+            <a:r>
+              <a:rPr lang="en-US" dirty="0" smtClean="0"/>
+              <a:t> </a:t>
+            </a:r>
+            <a:r>
+              <a:rPr lang="en-US" dirty="0" err="1" smtClean="0"/>
+              <a:t>enquanto</a:t>
+            </a:r>
+            <a:r>
+              <a:rPr lang="en-US" dirty="0" smtClean="0"/>
+              <a:t> </a:t>
+            </a:r>
+            <a:r>
+              <a:rPr lang="en-US" dirty="0" err="1" smtClean="0"/>
+              <a:t>uma</a:t>
+            </a:r>
+            <a:r>
+              <a:rPr lang="en-US" dirty="0" smtClean="0"/>
+              <a:t> </a:t>
+            </a:r>
+            <a:r>
+              <a:rPr lang="en-US" dirty="0" err="1" smtClean="0"/>
+              <a:t>expressão</a:t>
+            </a:r>
+            <a:r>
+              <a:rPr lang="en-US" dirty="0" smtClean="0"/>
+              <a:t> </a:t>
+            </a:r>
+            <a:r>
+              <a:rPr lang="en-US" dirty="0" err="1" smtClean="0"/>
+              <a:t>booleana</a:t>
+            </a:r>
+            <a:r>
+              <a:rPr lang="en-US" dirty="0" smtClean="0"/>
+              <a:t> (</a:t>
+            </a:r>
+            <a:r>
+              <a:rPr lang="en-US" dirty="0" err="1" smtClean="0"/>
+              <a:t>condição</a:t>
+            </a:r>
+            <a:r>
+              <a:rPr lang="en-US" dirty="0" smtClean="0"/>
+              <a:t> de </a:t>
+            </a:r>
+            <a:r>
+              <a:rPr lang="en-US" dirty="0" err="1" smtClean="0"/>
+              <a:t>parada</a:t>
+            </a:r>
+            <a:r>
+              <a:rPr lang="en-US" dirty="0" smtClean="0"/>
+              <a:t>) </a:t>
+            </a:r>
+            <a:r>
+              <a:rPr lang="en-US" dirty="0" err="1" smtClean="0"/>
+              <a:t>não</a:t>
+            </a:r>
+            <a:r>
+              <a:rPr lang="en-US" dirty="0" smtClean="0"/>
+              <a:t> </a:t>
+            </a:r>
+            <a:r>
+              <a:rPr lang="en-US" dirty="0" err="1" smtClean="0"/>
+              <a:t>seja</a:t>
+            </a:r>
+            <a:r>
+              <a:rPr lang="en-US" dirty="0" smtClean="0"/>
+              <a:t> </a:t>
+            </a:r>
+            <a:r>
+              <a:rPr lang="en-US" dirty="0" err="1" smtClean="0"/>
+              <a:t>verdade</a:t>
+            </a:r>
+            <a:r>
+              <a:rPr lang="en-US" dirty="0"/>
+              <a:t>.</a:t>
+            </a:r>
+            <a:endParaRPr lang="en-US" dirty="0" smtClean="0"/>
+          </a:p>
+          <a:p>
+            <a:pPr marL="0" indent="0">
+              <a:buNone/>
+            </a:pPr>
+            <a:endParaRPr lang="en-US" dirty="0" smtClean="0"/>
+          </a:p>
+          <a:p>
+            <a:pPr marL="0" indent="0">
+              <a:buNone/>
+            </a:pPr>
+            <a:r>
+              <a:rPr lang="en-US" dirty="0" smtClean="0">
+                <a:solidFill>
+                  <a:srgbClr val="1F497D"/>
+                </a:solidFill>
+              </a:rPr>
+              <a:t>while (</a:t>
+            </a:r>
+            <a:r>
+              <a:rPr lang="en-US" dirty="0" err="1" smtClean="0">
+                <a:solidFill>
+                  <a:srgbClr val="1F497D"/>
+                </a:solidFill>
+              </a:rPr>
+              <a:t>expressao_booleana</a:t>
+            </a:r>
+            <a:r>
+              <a:rPr lang="en-US" dirty="0" smtClean="0">
+                <a:solidFill>
+                  <a:srgbClr val="1F497D"/>
+                </a:solidFill>
+              </a:rPr>
+              <a:t>)</a:t>
+            </a:r>
+          </a:p>
+          <a:p>
+            <a:pPr marL="0" indent="0">
+              <a:buNone/>
+            </a:pPr>
+            <a:r>
+              <a:rPr lang="en-US" dirty="0">
+                <a:solidFill>
+                  <a:srgbClr val="1F497D"/>
+                </a:solidFill>
+              </a:rPr>
+              <a:t>	</a:t>
+            </a:r>
+            <a:r>
+              <a:rPr lang="en-US" dirty="0" smtClean="0">
+                <a:solidFill>
+                  <a:srgbClr val="1F497D"/>
+                </a:solidFill>
+              </a:rPr>
+              <a:t>// </a:t>
+            </a:r>
+            <a:r>
+              <a:rPr lang="en-US" dirty="0" err="1" smtClean="0">
+                <a:solidFill>
+                  <a:srgbClr val="1F497D"/>
+                </a:solidFill>
+              </a:rPr>
+              <a:t>bloco</a:t>
+            </a:r>
+            <a:r>
+              <a:rPr lang="en-US" dirty="0" smtClean="0">
+                <a:solidFill>
+                  <a:srgbClr val="1F497D"/>
+                </a:solidFill>
+              </a:rPr>
+              <a:t> de </a:t>
+            </a:r>
+            <a:r>
+              <a:rPr lang="en-US" dirty="0" err="1" smtClean="0">
+                <a:solidFill>
+                  <a:srgbClr val="1F497D"/>
+                </a:solidFill>
+              </a:rPr>
+              <a:t>comandos</a:t>
+            </a:r>
+            <a:endParaRPr lang="en-US" dirty="0" smtClean="0">
+              <a:solidFill>
+                <a:srgbClr val="1F497D"/>
+              </a:solidFill>
+            </a:endParaRPr>
+          </a:p>
+          <a:p>
+            <a:pPr marL="0" indent="0">
+              <a:buNone/>
+            </a:pPr>
+            <a:r>
+              <a:rPr lang="en-US" dirty="0">
+                <a:solidFill>
+                  <a:srgbClr val="1F497D"/>
+                </a:solidFill>
+              </a:rPr>
+              <a:t>}</a:t>
+            </a:r>
+            <a:endParaRPr lang="en-US" dirty="0">
+              <a:solidFill>
+                <a:srgbClr val="1F497D"/>
+              </a:solidFill>
+            </a:endParaRPr>
+          </a:p>
+        </p:txBody>
+      </p:sp>
+    </p:spTree>
+    <p:extLst>
+      <p:ext uri="{BB962C8B-B14F-4D97-AF65-F5344CB8AC3E}">
+        <p14:creationId xmlns:p14="http://schemas.microsoft.com/office/powerpoint/2010/main" val="2450850909"/>
+      </p:ext>
+    </p:extLst>
+  </p:cSld>
+  <p:clrMapOvr>
+    <a:masterClrMapping/>
+  </p:clrMapOvr>
+</p:sld>
+</file>
+
+<file path=ppt/slides/slide36.xml><?xml version="1.0" encoding="utf-8"?>
+<p:sld xmlns:a="http://schemas.openxmlformats.org/drawingml/2006/main" xmlns:r="http://schemas.openxmlformats.org/officeDocument/2006/relationships" xmlns:p="http://schemas.openxmlformats.org/presentationml/2006/main">
+  <p:cSld>
+    <p:spTree>
+      <p:nvGrpSpPr>
+        <p:cNvPr id="1" name=""/>
+        <p:cNvGrpSpPr/>
+        <p:nvPr/>
+      </p:nvGrpSpPr>
+      <p:grpSpPr>
+        <a:xfrm>
+          <a:off x="0" y="0"/>
+          <a:ext cx="0" cy="0"/>
+          <a:chOff x="0" y="0"/>
+          <a:chExt cx="0" cy="0"/>
+        </a:xfrm>
+      </p:grpSpPr>
+      <p:sp>
+        <p:nvSpPr>
+          <p:cNvPr id="2" name="Title 1"/>
+          <p:cNvSpPr>
+            <a:spLocks noGrp="1"/>
+          </p:cNvSpPr>
+          <p:nvPr>
+            <p:ph type="title"/>
+          </p:nvPr>
+        </p:nvSpPr>
+        <p:spPr/>
+        <p:txBody>
+          <a:bodyPr/>
+          <a:lstStyle/>
+          <a:p>
+            <a:r>
+              <a:rPr lang="en-US" dirty="0" smtClean="0"/>
+              <a:t>Loops e </a:t>
+            </a:r>
+            <a:r>
+              <a:rPr lang="en-US" dirty="0" err="1" smtClean="0"/>
+              <a:t>Iteradores</a:t>
+            </a:r>
+            <a:r>
+              <a:rPr lang="en-US" dirty="0" smtClean="0"/>
+              <a:t> – DO WHILE</a:t>
+            </a:r>
+            <a:endParaRPr lang="en-US" dirty="0"/>
+          </a:p>
+        </p:txBody>
+      </p:sp>
+      <p:sp>
+        <p:nvSpPr>
+          <p:cNvPr id="3" name="Content Placeholder 2"/>
+          <p:cNvSpPr>
+            <a:spLocks noGrp="1"/>
+          </p:cNvSpPr>
+          <p:nvPr>
+            <p:ph idx="1"/>
+          </p:nvPr>
+        </p:nvSpPr>
+        <p:spPr/>
+        <p:txBody>
+          <a:bodyPr/>
+          <a:lstStyle/>
+          <a:p>
+            <a:r>
+              <a:rPr lang="en-US" dirty="0" smtClean="0"/>
+              <a:t>A </a:t>
+            </a:r>
+            <a:r>
+              <a:rPr lang="en-US" dirty="0" err="1" smtClean="0"/>
+              <a:t>declaração</a:t>
+            </a:r>
+            <a:r>
+              <a:rPr lang="en-US" dirty="0" smtClean="0"/>
+              <a:t> do while </a:t>
+            </a:r>
+            <a:r>
+              <a:rPr lang="en-US" dirty="0" err="1" smtClean="0"/>
+              <a:t>é</a:t>
+            </a:r>
+            <a:r>
+              <a:rPr lang="en-US" dirty="0" smtClean="0"/>
+              <a:t> </a:t>
+            </a:r>
+            <a:r>
+              <a:rPr lang="en-US" dirty="0" err="1" smtClean="0"/>
+              <a:t>semelhante</a:t>
+            </a:r>
+            <a:r>
+              <a:rPr lang="en-US" dirty="0" smtClean="0"/>
+              <a:t> a while, a </a:t>
+            </a:r>
+            <a:r>
+              <a:rPr lang="en-US" dirty="0" err="1" smtClean="0"/>
+              <a:t>diferença</a:t>
+            </a:r>
+            <a:r>
+              <a:rPr lang="en-US" dirty="0" smtClean="0"/>
+              <a:t> </a:t>
+            </a:r>
+            <a:r>
+              <a:rPr lang="en-US" dirty="0" err="1" smtClean="0"/>
+              <a:t>é</a:t>
+            </a:r>
+            <a:r>
+              <a:rPr lang="en-US" dirty="0" smtClean="0"/>
+              <a:t> </a:t>
+            </a:r>
+            <a:r>
+              <a:rPr lang="en-US" dirty="0" err="1" smtClean="0"/>
+              <a:t>que</a:t>
+            </a:r>
+            <a:r>
+              <a:rPr lang="en-US" dirty="0" smtClean="0"/>
+              <a:t> a </a:t>
+            </a:r>
+            <a:r>
+              <a:rPr lang="en-US" dirty="0" err="1" smtClean="0"/>
+              <a:t>expressão</a:t>
+            </a:r>
+            <a:r>
+              <a:rPr lang="en-US" dirty="0" smtClean="0"/>
+              <a:t> </a:t>
+            </a:r>
+            <a:r>
+              <a:rPr lang="en-US" dirty="0" err="1" smtClean="0"/>
+              <a:t>booleana</a:t>
+            </a:r>
+            <a:r>
+              <a:rPr lang="en-US" dirty="0" smtClean="0"/>
+              <a:t> </a:t>
+            </a:r>
+            <a:r>
+              <a:rPr lang="en-US" dirty="0" err="1" smtClean="0"/>
+              <a:t>fica</a:t>
+            </a:r>
+            <a:r>
+              <a:rPr lang="en-US" dirty="0" smtClean="0"/>
+              <a:t> no </a:t>
+            </a:r>
+            <a:r>
+              <a:rPr lang="en-US" dirty="0" err="1" smtClean="0"/>
+              <a:t>fim</a:t>
+            </a:r>
+            <a:r>
+              <a:rPr lang="en-US" dirty="0" smtClean="0"/>
+              <a:t>, </a:t>
+            </a:r>
+            <a:r>
+              <a:rPr lang="en-US" dirty="0" err="1" smtClean="0"/>
+              <a:t>fazendo</a:t>
+            </a:r>
+            <a:r>
+              <a:rPr lang="en-US" dirty="0"/>
+              <a:t> </a:t>
+            </a:r>
+            <a:r>
+              <a:rPr lang="en-US" dirty="0" err="1" smtClean="0"/>
+              <a:t>assim</a:t>
+            </a:r>
+            <a:r>
+              <a:rPr lang="en-US" dirty="0" smtClean="0"/>
+              <a:t> com </a:t>
+            </a:r>
+            <a:r>
+              <a:rPr lang="en-US" dirty="0" err="1" smtClean="0"/>
+              <a:t>que</a:t>
+            </a:r>
+            <a:r>
+              <a:rPr lang="en-US" dirty="0" smtClean="0"/>
+              <a:t> o </a:t>
+            </a:r>
+            <a:r>
+              <a:rPr lang="en-US" dirty="0" err="1" smtClean="0"/>
+              <a:t>código</a:t>
+            </a:r>
+            <a:r>
+              <a:rPr lang="en-US" dirty="0" smtClean="0"/>
+              <a:t> </a:t>
+            </a:r>
+            <a:r>
+              <a:rPr lang="en-US" dirty="0" err="1" smtClean="0"/>
+              <a:t>seja</a:t>
+            </a:r>
+            <a:r>
+              <a:rPr lang="en-US" dirty="0" smtClean="0"/>
+              <a:t> </a:t>
+            </a:r>
+            <a:r>
+              <a:rPr lang="en-US" dirty="0" err="1" smtClean="0"/>
+              <a:t>executado</a:t>
+            </a:r>
+            <a:r>
+              <a:rPr lang="en-US" dirty="0" smtClean="0"/>
+              <a:t> </a:t>
+            </a:r>
+            <a:r>
+              <a:rPr lang="en-US" dirty="0" err="1" smtClean="0"/>
+              <a:t>pelo</a:t>
+            </a:r>
+            <a:r>
+              <a:rPr lang="en-US" dirty="0" smtClean="0"/>
+              <a:t> </a:t>
+            </a:r>
+            <a:r>
+              <a:rPr lang="en-US" dirty="0" err="1" smtClean="0"/>
+              <a:t>menos</a:t>
+            </a:r>
+            <a:r>
+              <a:rPr lang="en-US" dirty="0" smtClean="0"/>
+              <a:t> </a:t>
+            </a:r>
+            <a:r>
+              <a:rPr lang="en-US" dirty="0" err="1" smtClean="0"/>
+              <a:t>uma</a:t>
+            </a:r>
+            <a:r>
+              <a:rPr lang="en-US" dirty="0" smtClean="0"/>
+              <a:t> </a:t>
+            </a:r>
+            <a:r>
+              <a:rPr lang="en-US" dirty="0" err="1" smtClean="0"/>
+              <a:t>vez</a:t>
+            </a:r>
+            <a:r>
+              <a:rPr lang="en-US" dirty="0" smtClean="0"/>
+              <a:t>.</a:t>
+            </a:r>
+          </a:p>
+          <a:p>
+            <a:pPr marL="0" indent="0">
+              <a:buNone/>
+            </a:pPr>
+            <a:r>
+              <a:rPr lang="en-US" dirty="0" smtClean="0">
+                <a:solidFill>
+                  <a:srgbClr val="1F497D"/>
+                </a:solidFill>
+              </a:rPr>
+              <a:t>do {</a:t>
+            </a:r>
+            <a:r>
+              <a:rPr lang="en-US" dirty="0">
+                <a:solidFill>
+                  <a:srgbClr val="1F497D"/>
+                </a:solidFill>
+              </a:rPr>
+              <a:t>	</a:t>
+            </a:r>
+            <a:endParaRPr lang="en-US" dirty="0" smtClean="0">
+              <a:solidFill>
+                <a:srgbClr val="1F497D"/>
+              </a:solidFill>
+            </a:endParaRPr>
+          </a:p>
+          <a:p>
+            <a:pPr marL="0" indent="0">
+              <a:buNone/>
+            </a:pPr>
+            <a:r>
+              <a:rPr lang="en-US" dirty="0" smtClean="0">
+                <a:solidFill>
+                  <a:srgbClr val="1F497D"/>
+                </a:solidFill>
+              </a:rPr>
+              <a:t>	// </a:t>
+            </a:r>
+            <a:r>
+              <a:rPr lang="en-US" dirty="0" err="1" smtClean="0">
+                <a:solidFill>
+                  <a:srgbClr val="1F497D"/>
+                </a:solidFill>
+              </a:rPr>
+              <a:t>bloco</a:t>
+            </a:r>
+            <a:r>
+              <a:rPr lang="en-US" dirty="0" smtClean="0">
+                <a:solidFill>
+                  <a:srgbClr val="1F497D"/>
+                </a:solidFill>
+              </a:rPr>
+              <a:t> de </a:t>
+            </a:r>
+            <a:r>
+              <a:rPr lang="en-US" dirty="0" err="1" smtClean="0">
+                <a:solidFill>
+                  <a:srgbClr val="1F497D"/>
+                </a:solidFill>
+              </a:rPr>
+              <a:t>comandos</a:t>
+            </a:r>
+            <a:endParaRPr lang="en-US" dirty="0" smtClean="0">
+              <a:solidFill>
+                <a:srgbClr val="1F497D"/>
+              </a:solidFill>
+            </a:endParaRPr>
+          </a:p>
+          <a:p>
+            <a:pPr marL="0" indent="0">
+              <a:buNone/>
+            </a:pPr>
+            <a:r>
+              <a:rPr lang="en-US" dirty="0" smtClean="0">
+                <a:solidFill>
+                  <a:srgbClr val="1F497D"/>
+                </a:solidFill>
+              </a:rPr>
+              <a:t>}</a:t>
+            </a:r>
+            <a:r>
+              <a:rPr lang="en-US" dirty="0">
+                <a:solidFill>
+                  <a:srgbClr val="1F497D"/>
+                </a:solidFill>
+              </a:rPr>
+              <a:t> (</a:t>
+            </a:r>
+            <a:r>
+              <a:rPr lang="en-US" dirty="0" err="1">
+                <a:solidFill>
+                  <a:srgbClr val="1F497D"/>
+                </a:solidFill>
+              </a:rPr>
+              <a:t>expressao_booleana</a:t>
+            </a:r>
+            <a:r>
+              <a:rPr lang="en-US" dirty="0" smtClean="0">
+                <a:solidFill>
+                  <a:srgbClr val="1F497D"/>
+                </a:solidFill>
+              </a:rPr>
+              <a:t>);</a:t>
+            </a:r>
+            <a:endParaRPr lang="en-US" dirty="0">
+              <a:solidFill>
+                <a:srgbClr val="1F497D"/>
+              </a:solidFill>
+            </a:endParaRPr>
+          </a:p>
+          <a:p>
+            <a:pPr marL="0" indent="0">
+              <a:buNone/>
+            </a:pPr>
+            <a:endParaRPr lang="en-US" dirty="0"/>
+          </a:p>
+        </p:txBody>
+      </p:sp>
+    </p:spTree>
+    <p:extLst>
+      <p:ext uri="{BB962C8B-B14F-4D97-AF65-F5344CB8AC3E}">
+        <p14:creationId xmlns:p14="http://schemas.microsoft.com/office/powerpoint/2010/main" val="803404319"/>
+      </p:ext>
+    </p:extLst>
+  </p:cSld>
+  <p:clrMapOvr>
+    <a:masterClrMapping/>
+  </p:clrMapOvr>
 </p:sld>
 </file>
 

</xml_diff>

<commit_message>
Resolucao exercicios semana 1 e novos exercicios semana 2
</commit_message>
<xml_diff>
--- a/Documentos/Curso Java.pptx
+++ b/Documentos/Curso Java.pptx
@@ -5,7 +5,7 @@
     <p:sldMasterId id="2147483802" r:id="rId1"/>
   </p:sldMasterIdLst>
   <p:notesMasterIdLst>
-    <p:notesMasterId r:id="rId38"/>
+    <p:notesMasterId r:id="rId51"/>
   </p:notesMasterIdLst>
   <p:sldIdLst>
     <p:sldId id="256" r:id="rId2"/>
@@ -41,9 +41,22 @@
     <p:sldId id="289" r:id="rId32"/>
     <p:sldId id="294" r:id="rId33"/>
     <p:sldId id="290" r:id="rId34"/>
-    <p:sldId id="295" r:id="rId35"/>
-    <p:sldId id="292" r:id="rId36"/>
-    <p:sldId id="293" r:id="rId37"/>
+    <p:sldId id="296" r:id="rId35"/>
+    <p:sldId id="295" r:id="rId36"/>
+    <p:sldId id="297" r:id="rId37"/>
+    <p:sldId id="292" r:id="rId38"/>
+    <p:sldId id="298" r:id="rId39"/>
+    <p:sldId id="293" r:id="rId40"/>
+    <p:sldId id="299" r:id="rId41"/>
+    <p:sldId id="300" r:id="rId42"/>
+    <p:sldId id="301" r:id="rId43"/>
+    <p:sldId id="302" r:id="rId44"/>
+    <p:sldId id="303" r:id="rId45"/>
+    <p:sldId id="304" r:id="rId46"/>
+    <p:sldId id="305" r:id="rId47"/>
+    <p:sldId id="306" r:id="rId48"/>
+    <p:sldId id="307" r:id="rId49"/>
+    <p:sldId id="308" r:id="rId50"/>
   </p:sldIdLst>
   <p:sldSz cx="9144000" cy="6858000" type="screen4x3"/>
   <p:notesSz cx="6858000" cy="9144000"/>
@@ -12769,9 +12782,7 @@
         </p:nvSpPr>
         <p:spPr/>
         <p:txBody>
-          <a:bodyPr>
-            <a:normAutofit fontScale="90000"/>
-          </a:bodyPr>
+          <a:bodyPr/>
           <a:lstStyle/>
           <a:p>
             <a:r>
@@ -12784,384 +12795,40 @@
             </a:r>
             <a:r>
               <a:rPr lang="en-US" dirty="0" smtClean="0"/>
-              <a:t> – FOR </a:t>
-            </a:r>
-            <a:r>
-              <a:rPr lang="en-US" dirty="0" err="1" smtClean="0"/>
-              <a:t>aprimorado</a:t>
+              <a:t> - FOR</a:t>
             </a:r>
             <a:endParaRPr lang="en-US" dirty="0"/>
           </a:p>
         </p:txBody>
       </p:sp>
-      <p:sp>
-        <p:nvSpPr>
-          <p:cNvPr id="3" name="Content Placeholder 2"/>
-          <p:cNvSpPr>
-            <a:spLocks noGrp="1"/>
-          </p:cNvSpPr>
-          <p:nvPr>
-            <p:ph idx="1"/>
-          </p:nvPr>
-        </p:nvSpPr>
-        <p:spPr/>
-        <p:txBody>
-          <a:bodyPr>
-            <a:normAutofit fontScale="85000" lnSpcReduction="10000"/>
-          </a:bodyPr>
-          <a:lstStyle/>
-          <a:p>
-            <a:r>
-              <a:rPr lang="en-US" dirty="0" err="1" smtClean="0"/>
-              <a:t>Introduzido</a:t>
-            </a:r>
-            <a:r>
-              <a:rPr lang="en-US" dirty="0" smtClean="0"/>
-              <a:t> </a:t>
-            </a:r>
-            <a:r>
-              <a:rPr lang="en-US" dirty="0" err="1" smtClean="0"/>
-              <a:t>na</a:t>
-            </a:r>
-            <a:r>
-              <a:rPr lang="en-US" dirty="0" smtClean="0"/>
-              <a:t> </a:t>
-            </a:r>
-            <a:r>
-              <a:rPr lang="en-US" dirty="0" err="1" smtClean="0"/>
-              <a:t>vers</a:t>
-            </a:r>
-            <a:r>
-              <a:rPr lang="en-US" dirty="0" err="1" smtClean="0"/>
-              <a:t>ão</a:t>
-            </a:r>
-            <a:r>
-              <a:rPr lang="en-US" dirty="0" smtClean="0"/>
-              <a:t> 5 do java, </a:t>
-            </a:r>
-            <a:r>
-              <a:rPr lang="en-US" dirty="0" err="1" smtClean="0"/>
-              <a:t>simplifica</a:t>
-            </a:r>
-            <a:r>
-              <a:rPr lang="en-US" dirty="0"/>
-              <a:t> </a:t>
-            </a:r>
-            <a:r>
-              <a:rPr lang="en-US" dirty="0" smtClean="0"/>
-              <a:t>a </a:t>
-            </a:r>
-            <a:r>
-              <a:rPr lang="en-US" dirty="0" err="1" smtClean="0"/>
-              <a:t>tarefa</a:t>
-            </a:r>
-            <a:r>
-              <a:rPr lang="en-US" dirty="0" smtClean="0"/>
-              <a:t> de </a:t>
-            </a:r>
-            <a:r>
-              <a:rPr lang="en-US" dirty="0" err="1" smtClean="0"/>
-              <a:t>fazer</a:t>
-            </a:r>
-            <a:r>
-              <a:rPr lang="en-US" dirty="0" smtClean="0"/>
-              <a:t> loop </a:t>
-            </a:r>
-            <a:r>
-              <a:rPr lang="en-US" dirty="0" err="1" smtClean="0"/>
-              <a:t>através</a:t>
-            </a:r>
-            <a:r>
-              <a:rPr lang="en-US" dirty="0" smtClean="0"/>
-              <a:t> de um array </a:t>
-            </a:r>
-            <a:r>
-              <a:rPr lang="en-US" dirty="0" err="1" smtClean="0"/>
-              <a:t>ou</a:t>
-            </a:r>
-            <a:r>
-              <a:rPr lang="en-US" dirty="0" smtClean="0"/>
-              <a:t> </a:t>
-            </a:r>
-            <a:r>
-              <a:rPr lang="en-US" dirty="0" err="1" smtClean="0"/>
-              <a:t>conjunto</a:t>
-            </a:r>
-            <a:r>
-              <a:rPr lang="en-US" dirty="0" smtClean="0"/>
-              <a:t>.</a:t>
-            </a:r>
-          </a:p>
-          <a:p>
-            <a:r>
-              <a:rPr lang="en-US" dirty="0" smtClean="0"/>
-              <a:t>A </a:t>
-            </a:r>
-            <a:r>
-              <a:rPr lang="en-US" dirty="0" err="1" smtClean="0"/>
-              <a:t>primeira</a:t>
-            </a:r>
-            <a:r>
-              <a:rPr lang="en-US" dirty="0" smtClean="0"/>
-              <a:t> parte do for </a:t>
-            </a:r>
-            <a:r>
-              <a:rPr lang="en-US" dirty="0" err="1" smtClean="0"/>
-              <a:t>deve</a:t>
-            </a:r>
-            <a:r>
-              <a:rPr lang="en-US" dirty="0" smtClean="0"/>
-              <a:t> </a:t>
-            </a:r>
-            <a:r>
-              <a:rPr lang="en-US" dirty="0" err="1" smtClean="0"/>
-              <a:t>ser</a:t>
-            </a:r>
-            <a:r>
-              <a:rPr lang="en-US" dirty="0" smtClean="0"/>
-              <a:t> a </a:t>
-            </a:r>
-            <a:r>
-              <a:rPr lang="en-US" dirty="0" err="1" smtClean="0"/>
-              <a:t>declaração</a:t>
-            </a:r>
-            <a:r>
-              <a:rPr lang="en-US" dirty="0" smtClean="0"/>
-              <a:t> de </a:t>
-            </a:r>
-            <a:r>
-              <a:rPr lang="en-US" dirty="0" err="1" smtClean="0"/>
-              <a:t>uma</a:t>
-            </a:r>
-            <a:r>
-              <a:rPr lang="en-US" dirty="0" smtClean="0"/>
-              <a:t> </a:t>
-            </a:r>
-            <a:r>
-              <a:rPr lang="en-US" dirty="0" err="1" smtClean="0"/>
-              <a:t>variavel</a:t>
-            </a:r>
-            <a:r>
-              <a:rPr lang="en-US" dirty="0" smtClean="0"/>
-              <a:t> do </a:t>
-            </a:r>
-            <a:r>
-              <a:rPr lang="en-US" dirty="0" err="1" smtClean="0"/>
-              <a:t>tipo</a:t>
-            </a:r>
-            <a:r>
-              <a:rPr lang="en-US" dirty="0" smtClean="0"/>
-              <a:t> </a:t>
-            </a:r>
-            <a:r>
-              <a:rPr lang="en-US" dirty="0" err="1" smtClean="0"/>
-              <a:t>compativel</a:t>
-            </a:r>
-            <a:r>
-              <a:rPr lang="en-US" dirty="0" smtClean="0"/>
-              <a:t> com </a:t>
-            </a:r>
-            <a:r>
-              <a:rPr lang="en-US" dirty="0" err="1" smtClean="0"/>
-              <a:t>os</a:t>
-            </a:r>
-            <a:r>
-              <a:rPr lang="en-US" dirty="0" smtClean="0"/>
-              <a:t> </a:t>
-            </a:r>
-            <a:r>
-              <a:rPr lang="en-US" dirty="0" err="1" smtClean="0"/>
-              <a:t>elementos</a:t>
-            </a:r>
-            <a:r>
-              <a:rPr lang="en-US" dirty="0" smtClean="0"/>
-              <a:t> </a:t>
-            </a:r>
-            <a:r>
-              <a:rPr lang="en-US" dirty="0" err="1" smtClean="0"/>
-              <a:t>contidos</a:t>
-            </a:r>
-            <a:r>
-              <a:rPr lang="en-US" dirty="0" smtClean="0"/>
-              <a:t> </a:t>
-            </a:r>
-            <a:r>
-              <a:rPr lang="en-US" dirty="0" err="1" smtClean="0"/>
-              <a:t>na</a:t>
-            </a:r>
-            <a:r>
-              <a:rPr lang="en-US" dirty="0" smtClean="0"/>
-              <a:t> </a:t>
-            </a:r>
-            <a:r>
-              <a:rPr lang="en-US" dirty="0" err="1" smtClean="0"/>
-              <a:t>lista</a:t>
-            </a:r>
-            <a:r>
-              <a:rPr lang="en-US" dirty="0" smtClean="0"/>
-              <a:t>/array.</a:t>
-            </a:r>
-          </a:p>
-          <a:p>
-            <a:r>
-              <a:rPr lang="en-US" dirty="0" smtClean="0"/>
-              <a:t>A </a:t>
-            </a:r>
-            <a:r>
-              <a:rPr lang="en-US" dirty="0" err="1" smtClean="0"/>
-              <a:t>segunda</a:t>
-            </a:r>
-            <a:r>
-              <a:rPr lang="en-US" dirty="0" smtClean="0"/>
-              <a:t> parte </a:t>
-            </a:r>
-            <a:r>
-              <a:rPr lang="en-US" dirty="0" err="1" smtClean="0"/>
-              <a:t>é</a:t>
-            </a:r>
-            <a:r>
-              <a:rPr lang="en-US" dirty="0" smtClean="0"/>
-              <a:t> o </a:t>
-            </a:r>
-            <a:r>
-              <a:rPr lang="en-US" dirty="0" err="1" smtClean="0"/>
-              <a:t>conjunto</a:t>
-            </a:r>
-            <a:r>
-              <a:rPr lang="en-US" dirty="0" smtClean="0"/>
-              <a:t> a </a:t>
-            </a:r>
-            <a:r>
-              <a:rPr lang="en-US" smtClean="0"/>
-              <a:t>iterar</a:t>
-            </a:r>
-            <a:endParaRPr lang="en-US" dirty="0" smtClean="0"/>
-          </a:p>
-          <a:p>
-            <a:pPr marL="0" indent="0">
-              <a:buNone/>
-            </a:pPr>
-            <a:endParaRPr lang="en-US" dirty="0" smtClean="0"/>
-          </a:p>
-          <a:p>
-            <a:pPr marL="0" indent="0">
-              <a:buNone/>
-            </a:pPr>
-            <a:r>
-              <a:rPr lang="en-US" dirty="0" smtClean="0">
-                <a:solidFill>
-                  <a:schemeClr val="tx2"/>
-                </a:solidFill>
-              </a:rPr>
-              <a:t>for ( </a:t>
-            </a:r>
-            <a:r>
-              <a:rPr lang="en-US" dirty="0" err="1" smtClean="0">
-                <a:solidFill>
-                  <a:schemeClr val="tx2"/>
-                </a:solidFill>
-              </a:rPr>
-              <a:t>declaração</a:t>
-            </a:r>
-            <a:r>
-              <a:rPr lang="en-US" dirty="0" smtClean="0">
-                <a:solidFill>
-                  <a:schemeClr val="tx2"/>
-                </a:solidFill>
-              </a:rPr>
-              <a:t> : </a:t>
-            </a:r>
-            <a:r>
-              <a:rPr lang="en-US" dirty="0" err="1" smtClean="0">
-                <a:solidFill>
-                  <a:schemeClr val="tx2"/>
-                </a:solidFill>
-              </a:rPr>
-              <a:t>expressão</a:t>
-            </a:r>
-            <a:r>
-              <a:rPr lang="en-US" dirty="0" smtClean="0">
-                <a:solidFill>
-                  <a:schemeClr val="tx2"/>
-                </a:solidFill>
-              </a:rPr>
-              <a:t> ) {</a:t>
-            </a:r>
-          </a:p>
-          <a:p>
-            <a:pPr marL="0" indent="0">
-              <a:buNone/>
-            </a:pPr>
-            <a:r>
-              <a:rPr lang="en-US" dirty="0">
-                <a:solidFill>
-                  <a:schemeClr val="tx2"/>
-                </a:solidFill>
-              </a:rPr>
-              <a:t>	</a:t>
-            </a:r>
-            <a:r>
-              <a:rPr lang="en-US" dirty="0" smtClean="0">
-                <a:solidFill>
-                  <a:schemeClr val="tx2"/>
-                </a:solidFill>
-              </a:rPr>
-              <a:t>// </a:t>
-            </a:r>
-            <a:r>
-              <a:rPr lang="en-US" dirty="0" err="1" smtClean="0">
-                <a:solidFill>
-                  <a:schemeClr val="tx2"/>
-                </a:solidFill>
-              </a:rPr>
-              <a:t>bloco</a:t>
-            </a:r>
-            <a:r>
-              <a:rPr lang="en-US" dirty="0" smtClean="0">
-                <a:solidFill>
-                  <a:schemeClr val="tx2"/>
-                </a:solidFill>
-              </a:rPr>
-              <a:t> de </a:t>
-            </a:r>
-            <a:r>
-              <a:rPr lang="en-US" dirty="0" err="1" smtClean="0">
-                <a:solidFill>
-                  <a:schemeClr val="tx2"/>
-                </a:solidFill>
-              </a:rPr>
-              <a:t>comandos</a:t>
-            </a:r>
-            <a:endParaRPr lang="en-US" dirty="0" smtClean="0">
-              <a:solidFill>
-                <a:schemeClr val="tx2"/>
-              </a:solidFill>
-            </a:endParaRPr>
-          </a:p>
-          <a:p>
-            <a:pPr marL="0" indent="0">
-              <a:buNone/>
-            </a:pPr>
-            <a:r>
-              <a:rPr lang="en-US" dirty="0">
-                <a:solidFill>
-                  <a:schemeClr val="tx2"/>
-                </a:solidFill>
-              </a:rPr>
-              <a:t>}</a:t>
-            </a:r>
-            <a:endParaRPr lang="en-US" dirty="0">
-              <a:solidFill>
-                <a:schemeClr val="tx2"/>
-              </a:solidFill>
-            </a:endParaRPr>
-          </a:p>
-        </p:txBody>
-      </p:sp>
+      <p:pic>
+        <p:nvPicPr>
+          <p:cNvPr id="5" name="Picture 4"/>
+          <p:cNvPicPr>
+            <a:picLocks noChangeAspect="1"/>
+          </p:cNvPicPr>
+          <p:nvPr/>
+        </p:nvPicPr>
+        <p:blipFill>
+          <a:blip r:embed="rId2"/>
+          <a:stretch>
+            <a:fillRect/>
+          </a:stretch>
+        </p:blipFill>
+        <p:spPr>
+          <a:xfrm>
+            <a:off x="1195536" y="2140370"/>
+            <a:ext cx="6879848" cy="2709710"/>
+          </a:xfrm>
+          <a:prstGeom prst="rect">
+            <a:avLst/>
+          </a:prstGeom>
+        </p:spPr>
+      </p:pic>
     </p:spTree>
     <p:extLst>
       <p:ext uri="{BB962C8B-B14F-4D97-AF65-F5344CB8AC3E}">
-        <p14:creationId xmlns:p14="http://schemas.microsoft.com/office/powerpoint/2010/main" val="618840000"/>
+        <p14:creationId xmlns:p14="http://schemas.microsoft.com/office/powerpoint/2010/main" val="3321534320"/>
       </p:ext>
     </p:extLst>
   </p:cSld>
@@ -13200,6 +12867,528 @@
         </p:nvSpPr>
         <p:spPr/>
         <p:txBody>
+          <a:bodyPr>
+            <a:normAutofit fontScale="90000"/>
+          </a:bodyPr>
+          <a:lstStyle/>
+          <a:p>
+            <a:r>
+              <a:rPr lang="en-US" dirty="0" smtClean="0"/>
+              <a:t>Loops e </a:t>
+            </a:r>
+            <a:r>
+              <a:rPr lang="en-US" dirty="0" err="1" smtClean="0"/>
+              <a:t>Iteradores</a:t>
+            </a:r>
+            <a:r>
+              <a:rPr lang="en-US" dirty="0" smtClean="0"/>
+              <a:t> – FOR </a:t>
+            </a:r>
+            <a:r>
+              <a:rPr lang="en-US" dirty="0" err="1" smtClean="0"/>
+              <a:t>aprimorado</a:t>
+            </a:r>
+            <a:endParaRPr lang="en-US" dirty="0"/>
+          </a:p>
+        </p:txBody>
+      </p:sp>
+      <p:sp>
+        <p:nvSpPr>
+          <p:cNvPr id="3" name="Content Placeholder 2"/>
+          <p:cNvSpPr>
+            <a:spLocks noGrp="1"/>
+          </p:cNvSpPr>
+          <p:nvPr>
+            <p:ph idx="1"/>
+          </p:nvPr>
+        </p:nvSpPr>
+        <p:spPr/>
+        <p:txBody>
+          <a:bodyPr>
+            <a:normAutofit fontScale="85000" lnSpcReduction="10000"/>
+          </a:bodyPr>
+          <a:lstStyle/>
+          <a:p>
+            <a:r>
+              <a:rPr lang="en-US" dirty="0" err="1" smtClean="0"/>
+              <a:t>Introduzido</a:t>
+            </a:r>
+            <a:r>
+              <a:rPr lang="en-US" dirty="0" smtClean="0"/>
+              <a:t> </a:t>
+            </a:r>
+            <a:r>
+              <a:rPr lang="en-US" dirty="0" err="1" smtClean="0"/>
+              <a:t>na</a:t>
+            </a:r>
+            <a:r>
+              <a:rPr lang="en-US" dirty="0" smtClean="0"/>
+              <a:t> </a:t>
+            </a:r>
+            <a:r>
+              <a:rPr lang="en-US" dirty="0" err="1" smtClean="0"/>
+              <a:t>vers</a:t>
+            </a:r>
+            <a:r>
+              <a:rPr lang="en-US" dirty="0" err="1" smtClean="0"/>
+              <a:t>ão</a:t>
+            </a:r>
+            <a:r>
+              <a:rPr lang="en-US" dirty="0" smtClean="0"/>
+              <a:t> 5 do java, </a:t>
+            </a:r>
+            <a:r>
+              <a:rPr lang="en-US" dirty="0" err="1" smtClean="0"/>
+              <a:t>simplifica</a:t>
+            </a:r>
+            <a:r>
+              <a:rPr lang="en-US" dirty="0"/>
+              <a:t> </a:t>
+            </a:r>
+            <a:r>
+              <a:rPr lang="en-US" dirty="0" smtClean="0"/>
+              <a:t>a </a:t>
+            </a:r>
+            <a:r>
+              <a:rPr lang="en-US" dirty="0" err="1" smtClean="0"/>
+              <a:t>tarefa</a:t>
+            </a:r>
+            <a:r>
+              <a:rPr lang="en-US" dirty="0" smtClean="0"/>
+              <a:t> de </a:t>
+            </a:r>
+            <a:r>
+              <a:rPr lang="en-US" dirty="0" err="1" smtClean="0"/>
+              <a:t>fazer</a:t>
+            </a:r>
+            <a:r>
+              <a:rPr lang="en-US" dirty="0" smtClean="0"/>
+              <a:t> loop </a:t>
+            </a:r>
+            <a:r>
+              <a:rPr lang="en-US" dirty="0" err="1" smtClean="0"/>
+              <a:t>através</a:t>
+            </a:r>
+            <a:r>
+              <a:rPr lang="en-US" dirty="0" smtClean="0"/>
+              <a:t> de um array </a:t>
+            </a:r>
+            <a:r>
+              <a:rPr lang="en-US" dirty="0" err="1" smtClean="0"/>
+              <a:t>ou</a:t>
+            </a:r>
+            <a:r>
+              <a:rPr lang="en-US" dirty="0" smtClean="0"/>
+              <a:t> </a:t>
+            </a:r>
+            <a:r>
+              <a:rPr lang="en-US" dirty="0" err="1" smtClean="0"/>
+              <a:t>conjunto</a:t>
+            </a:r>
+            <a:r>
+              <a:rPr lang="en-US" dirty="0" smtClean="0"/>
+              <a:t>.</a:t>
+            </a:r>
+          </a:p>
+          <a:p>
+            <a:r>
+              <a:rPr lang="en-US" dirty="0" smtClean="0"/>
+              <a:t>A </a:t>
+            </a:r>
+            <a:r>
+              <a:rPr lang="en-US" dirty="0" err="1" smtClean="0"/>
+              <a:t>primeira</a:t>
+            </a:r>
+            <a:r>
+              <a:rPr lang="en-US" dirty="0" smtClean="0"/>
+              <a:t> parte do for </a:t>
+            </a:r>
+            <a:r>
+              <a:rPr lang="en-US" dirty="0" err="1" smtClean="0"/>
+              <a:t>deve</a:t>
+            </a:r>
+            <a:r>
+              <a:rPr lang="en-US" dirty="0" smtClean="0"/>
+              <a:t> </a:t>
+            </a:r>
+            <a:r>
+              <a:rPr lang="en-US" dirty="0" err="1" smtClean="0"/>
+              <a:t>ser</a:t>
+            </a:r>
+            <a:r>
+              <a:rPr lang="en-US" dirty="0" smtClean="0"/>
+              <a:t> a </a:t>
+            </a:r>
+            <a:r>
+              <a:rPr lang="en-US" dirty="0" err="1" smtClean="0"/>
+              <a:t>declaração</a:t>
+            </a:r>
+            <a:r>
+              <a:rPr lang="en-US" dirty="0" smtClean="0"/>
+              <a:t> de </a:t>
+            </a:r>
+            <a:r>
+              <a:rPr lang="en-US" dirty="0" err="1" smtClean="0"/>
+              <a:t>uma</a:t>
+            </a:r>
+            <a:r>
+              <a:rPr lang="en-US" dirty="0" smtClean="0"/>
+              <a:t> </a:t>
+            </a:r>
+            <a:r>
+              <a:rPr lang="en-US" dirty="0" err="1" smtClean="0"/>
+              <a:t>variavel</a:t>
+            </a:r>
+            <a:r>
+              <a:rPr lang="en-US" dirty="0" smtClean="0"/>
+              <a:t> do </a:t>
+            </a:r>
+            <a:r>
+              <a:rPr lang="en-US" dirty="0" err="1" smtClean="0"/>
+              <a:t>tipo</a:t>
+            </a:r>
+            <a:r>
+              <a:rPr lang="en-US" dirty="0" smtClean="0"/>
+              <a:t> </a:t>
+            </a:r>
+            <a:r>
+              <a:rPr lang="en-US" dirty="0" err="1" smtClean="0"/>
+              <a:t>compativel</a:t>
+            </a:r>
+            <a:r>
+              <a:rPr lang="en-US" dirty="0" smtClean="0"/>
+              <a:t> com </a:t>
+            </a:r>
+            <a:r>
+              <a:rPr lang="en-US" dirty="0" err="1" smtClean="0"/>
+              <a:t>os</a:t>
+            </a:r>
+            <a:r>
+              <a:rPr lang="en-US" dirty="0" smtClean="0"/>
+              <a:t> </a:t>
+            </a:r>
+            <a:r>
+              <a:rPr lang="en-US" dirty="0" err="1" smtClean="0"/>
+              <a:t>elementos</a:t>
+            </a:r>
+            <a:r>
+              <a:rPr lang="en-US" dirty="0" smtClean="0"/>
+              <a:t> </a:t>
+            </a:r>
+            <a:r>
+              <a:rPr lang="en-US" dirty="0" err="1" smtClean="0"/>
+              <a:t>contidos</a:t>
+            </a:r>
+            <a:r>
+              <a:rPr lang="en-US" dirty="0" smtClean="0"/>
+              <a:t> </a:t>
+            </a:r>
+            <a:r>
+              <a:rPr lang="en-US" dirty="0" err="1" smtClean="0"/>
+              <a:t>na</a:t>
+            </a:r>
+            <a:r>
+              <a:rPr lang="en-US" dirty="0" smtClean="0"/>
+              <a:t> </a:t>
+            </a:r>
+            <a:r>
+              <a:rPr lang="en-US" dirty="0" err="1" smtClean="0"/>
+              <a:t>lista</a:t>
+            </a:r>
+            <a:r>
+              <a:rPr lang="en-US" dirty="0" smtClean="0"/>
+              <a:t>/array.</a:t>
+            </a:r>
+          </a:p>
+          <a:p>
+            <a:r>
+              <a:rPr lang="en-US" dirty="0" smtClean="0"/>
+              <a:t>A </a:t>
+            </a:r>
+            <a:r>
+              <a:rPr lang="en-US" dirty="0" err="1" smtClean="0"/>
+              <a:t>segunda</a:t>
+            </a:r>
+            <a:r>
+              <a:rPr lang="en-US" dirty="0" smtClean="0"/>
+              <a:t> parte </a:t>
+            </a:r>
+            <a:r>
+              <a:rPr lang="en-US" dirty="0" err="1" smtClean="0"/>
+              <a:t>é</a:t>
+            </a:r>
+            <a:r>
+              <a:rPr lang="en-US" dirty="0" smtClean="0"/>
+              <a:t> o </a:t>
+            </a:r>
+            <a:r>
+              <a:rPr lang="en-US" dirty="0" err="1" smtClean="0"/>
+              <a:t>conjunto</a:t>
+            </a:r>
+            <a:r>
+              <a:rPr lang="en-US" dirty="0" smtClean="0"/>
+              <a:t> a </a:t>
+            </a:r>
+            <a:r>
+              <a:rPr lang="en-US" dirty="0" err="1" smtClean="0"/>
+              <a:t>iterar</a:t>
+            </a:r>
+            <a:endParaRPr lang="en-US" dirty="0" smtClean="0"/>
+          </a:p>
+          <a:p>
+            <a:pPr marL="0" indent="0">
+              <a:buNone/>
+            </a:pPr>
+            <a:endParaRPr lang="en-US" dirty="0" smtClean="0"/>
+          </a:p>
+          <a:p>
+            <a:pPr marL="0" indent="0">
+              <a:buNone/>
+            </a:pPr>
+            <a:r>
+              <a:rPr lang="en-US" dirty="0" smtClean="0">
+                <a:solidFill>
+                  <a:schemeClr val="tx2"/>
+                </a:solidFill>
+              </a:rPr>
+              <a:t>for ( </a:t>
+            </a:r>
+            <a:r>
+              <a:rPr lang="en-US" dirty="0" err="1" smtClean="0">
+                <a:solidFill>
+                  <a:schemeClr val="tx2"/>
+                </a:solidFill>
+              </a:rPr>
+              <a:t>declaração</a:t>
+            </a:r>
+            <a:r>
+              <a:rPr lang="en-US" dirty="0" smtClean="0">
+                <a:solidFill>
+                  <a:schemeClr val="tx2"/>
+                </a:solidFill>
+              </a:rPr>
+              <a:t> : </a:t>
+            </a:r>
+            <a:r>
+              <a:rPr lang="en-US" dirty="0" err="1" smtClean="0">
+                <a:solidFill>
+                  <a:schemeClr val="tx2"/>
+                </a:solidFill>
+              </a:rPr>
+              <a:t>expressão</a:t>
+            </a:r>
+            <a:r>
+              <a:rPr lang="en-US" dirty="0" smtClean="0">
+                <a:solidFill>
+                  <a:schemeClr val="tx2"/>
+                </a:solidFill>
+              </a:rPr>
+              <a:t> ) {</a:t>
+            </a:r>
+          </a:p>
+          <a:p>
+            <a:pPr marL="0" indent="0">
+              <a:buNone/>
+            </a:pPr>
+            <a:r>
+              <a:rPr lang="en-US" dirty="0">
+                <a:solidFill>
+                  <a:schemeClr val="tx2"/>
+                </a:solidFill>
+              </a:rPr>
+              <a:t>	</a:t>
+            </a:r>
+            <a:r>
+              <a:rPr lang="en-US" dirty="0" smtClean="0">
+                <a:solidFill>
+                  <a:schemeClr val="tx2"/>
+                </a:solidFill>
+              </a:rPr>
+              <a:t>// </a:t>
+            </a:r>
+            <a:r>
+              <a:rPr lang="en-US" dirty="0" err="1" smtClean="0">
+                <a:solidFill>
+                  <a:schemeClr val="tx2"/>
+                </a:solidFill>
+              </a:rPr>
+              <a:t>bloco</a:t>
+            </a:r>
+            <a:r>
+              <a:rPr lang="en-US" dirty="0" smtClean="0">
+                <a:solidFill>
+                  <a:schemeClr val="tx2"/>
+                </a:solidFill>
+              </a:rPr>
+              <a:t> de </a:t>
+            </a:r>
+            <a:r>
+              <a:rPr lang="en-US" dirty="0" err="1" smtClean="0">
+                <a:solidFill>
+                  <a:schemeClr val="tx2"/>
+                </a:solidFill>
+              </a:rPr>
+              <a:t>comandos</a:t>
+            </a:r>
+            <a:endParaRPr lang="en-US" dirty="0" smtClean="0">
+              <a:solidFill>
+                <a:schemeClr val="tx2"/>
+              </a:solidFill>
+            </a:endParaRPr>
+          </a:p>
+          <a:p>
+            <a:pPr marL="0" indent="0">
+              <a:buNone/>
+            </a:pPr>
+            <a:r>
+              <a:rPr lang="en-US" dirty="0">
+                <a:solidFill>
+                  <a:schemeClr val="tx2"/>
+                </a:solidFill>
+              </a:rPr>
+              <a:t>}</a:t>
+            </a:r>
+            <a:endParaRPr lang="en-US" dirty="0">
+              <a:solidFill>
+                <a:schemeClr val="tx2"/>
+              </a:solidFill>
+            </a:endParaRPr>
+          </a:p>
+        </p:txBody>
+      </p:sp>
+    </p:spTree>
+    <p:extLst>
+      <p:ext uri="{BB962C8B-B14F-4D97-AF65-F5344CB8AC3E}">
+        <p14:creationId xmlns:p14="http://schemas.microsoft.com/office/powerpoint/2010/main" val="618840000"/>
+      </p:ext>
+    </p:extLst>
+  </p:cSld>
+  <p:clrMapOvr>
+    <a:masterClrMapping/>
+  </p:clrMapOvr>
+</p:sld>
+</file>
+
+<file path=ppt/slides/slide36.xml><?xml version="1.0" encoding="utf-8"?>
+<p:sld xmlns:a="http://schemas.openxmlformats.org/drawingml/2006/main" xmlns:r="http://schemas.openxmlformats.org/officeDocument/2006/relationships" xmlns:p="http://schemas.openxmlformats.org/presentationml/2006/main">
+  <p:cSld>
+    <p:spTree>
+      <p:nvGrpSpPr>
+        <p:cNvPr id="1" name=""/>
+        <p:cNvGrpSpPr/>
+        <p:nvPr/>
+      </p:nvGrpSpPr>
+      <p:grpSpPr>
+        <a:xfrm>
+          <a:off x="0" y="0"/>
+          <a:ext cx="0" cy="0"/>
+          <a:chOff x="0" y="0"/>
+          <a:chExt cx="0" cy="0"/>
+        </a:xfrm>
+      </p:grpSpPr>
+      <p:sp>
+        <p:nvSpPr>
+          <p:cNvPr id="2" name="Title 1"/>
+          <p:cNvSpPr>
+            <a:spLocks noGrp="1"/>
+          </p:cNvSpPr>
+          <p:nvPr>
+            <p:ph type="title"/>
+          </p:nvPr>
+        </p:nvSpPr>
+        <p:spPr/>
+        <p:txBody>
+          <a:bodyPr>
+            <a:normAutofit fontScale="90000"/>
+          </a:bodyPr>
+          <a:lstStyle/>
+          <a:p>
+            <a:r>
+              <a:rPr lang="en-US" dirty="0" smtClean="0"/>
+              <a:t>Loops e </a:t>
+            </a:r>
+            <a:r>
+              <a:rPr lang="en-US" dirty="0" err="1" smtClean="0"/>
+              <a:t>Iteradores</a:t>
+            </a:r>
+            <a:r>
+              <a:rPr lang="en-US" dirty="0" smtClean="0"/>
+              <a:t> – FOR </a:t>
+            </a:r>
+            <a:r>
+              <a:rPr lang="en-US" dirty="0" err="1" smtClean="0"/>
+              <a:t>aprimorado</a:t>
+            </a:r>
+            <a:endParaRPr lang="en-US" dirty="0"/>
+          </a:p>
+        </p:txBody>
+      </p:sp>
+      <p:pic>
+        <p:nvPicPr>
+          <p:cNvPr id="5" name="Picture 4"/>
+          <p:cNvPicPr>
+            <a:picLocks noChangeAspect="1"/>
+          </p:cNvPicPr>
+          <p:nvPr/>
+        </p:nvPicPr>
+        <p:blipFill>
+          <a:blip r:embed="rId2"/>
+          <a:stretch>
+            <a:fillRect/>
+          </a:stretch>
+        </p:blipFill>
+        <p:spPr>
+          <a:xfrm>
+            <a:off x="1334066" y="1574800"/>
+            <a:ext cx="6397846" cy="4612768"/>
+          </a:xfrm>
+          <a:prstGeom prst="rect">
+            <a:avLst/>
+          </a:prstGeom>
+        </p:spPr>
+      </p:pic>
+    </p:spTree>
+    <p:extLst>
+      <p:ext uri="{BB962C8B-B14F-4D97-AF65-F5344CB8AC3E}">
+        <p14:creationId xmlns:p14="http://schemas.microsoft.com/office/powerpoint/2010/main" val="3180050963"/>
+      </p:ext>
+    </p:extLst>
+  </p:cSld>
+  <p:clrMapOvr>
+    <a:masterClrMapping/>
+  </p:clrMapOvr>
+</p:sld>
+</file>
+
+<file path=ppt/slides/slide37.xml><?xml version="1.0" encoding="utf-8"?>
+<p:sld xmlns:a="http://schemas.openxmlformats.org/drawingml/2006/main" xmlns:r="http://schemas.openxmlformats.org/officeDocument/2006/relationships" xmlns:p="http://schemas.openxmlformats.org/presentationml/2006/main">
+  <p:cSld>
+    <p:spTree>
+      <p:nvGrpSpPr>
+        <p:cNvPr id="1" name=""/>
+        <p:cNvGrpSpPr/>
+        <p:nvPr/>
+      </p:nvGrpSpPr>
+      <p:grpSpPr>
+        <a:xfrm>
+          <a:off x="0" y="0"/>
+          <a:ext cx="0" cy="0"/>
+          <a:chOff x="0" y="0"/>
+          <a:chExt cx="0" cy="0"/>
+        </a:xfrm>
+      </p:grpSpPr>
+      <p:sp>
+        <p:nvSpPr>
+          <p:cNvPr id="2" name="Title 1"/>
+          <p:cNvSpPr>
+            <a:spLocks noGrp="1"/>
+          </p:cNvSpPr>
+          <p:nvPr>
+            <p:ph type="title"/>
+          </p:nvPr>
+        </p:nvSpPr>
+        <p:spPr/>
+        <p:txBody>
           <a:bodyPr/>
           <a:lstStyle/>
           <a:p>
@@ -13514,7 +13703,92 @@
 </p:sld>
 </file>
 
-<file path=ppt/slides/slide36.xml><?xml version="1.0" encoding="utf-8"?>
+<file path=ppt/slides/slide38.xml><?xml version="1.0" encoding="utf-8"?>
+<p:sld xmlns:a="http://schemas.openxmlformats.org/drawingml/2006/main" xmlns:r="http://schemas.openxmlformats.org/officeDocument/2006/relationships" xmlns:p="http://schemas.openxmlformats.org/presentationml/2006/main">
+  <p:cSld>
+    <p:spTree>
+      <p:nvGrpSpPr>
+        <p:cNvPr id="1" name=""/>
+        <p:cNvGrpSpPr/>
+        <p:nvPr/>
+      </p:nvGrpSpPr>
+      <p:grpSpPr>
+        <a:xfrm>
+          <a:off x="0" y="0"/>
+          <a:ext cx="0" cy="0"/>
+          <a:chOff x="0" y="0"/>
+          <a:chExt cx="0" cy="0"/>
+        </a:xfrm>
+      </p:grpSpPr>
+      <p:sp>
+        <p:nvSpPr>
+          <p:cNvPr id="2" name="Title 1"/>
+          <p:cNvSpPr>
+            <a:spLocks noGrp="1"/>
+          </p:cNvSpPr>
+          <p:nvPr>
+            <p:ph type="title"/>
+          </p:nvPr>
+        </p:nvSpPr>
+        <p:spPr/>
+        <p:txBody>
+          <a:bodyPr/>
+          <a:lstStyle/>
+          <a:p>
+            <a:r>
+              <a:rPr lang="en-US" dirty="0" smtClean="0"/>
+              <a:t>Loops e </a:t>
+            </a:r>
+            <a:r>
+              <a:rPr lang="en-US" dirty="0" err="1" smtClean="0"/>
+              <a:t>Iteradores</a:t>
+            </a:r>
+            <a:r>
+              <a:rPr lang="en-US" dirty="0" smtClean="0"/>
+              <a:t> - WHILE</a:t>
+            </a:r>
+            <a:endParaRPr lang="en-US" dirty="0"/>
+          </a:p>
+        </p:txBody>
+      </p:sp>
+      <p:pic>
+        <p:nvPicPr>
+          <p:cNvPr id="5" name="Picture 4"/>
+          <p:cNvPicPr>
+            <a:picLocks noChangeAspect="1"/>
+          </p:cNvPicPr>
+          <p:nvPr/>
+        </p:nvPicPr>
+        <p:blipFill>
+          <a:blip r:embed="rId2"/>
+          <a:stretch>
+            <a:fillRect/>
+          </a:stretch>
+        </p:blipFill>
+        <p:spPr>
+          <a:xfrm>
+            <a:off x="859442" y="1714790"/>
+            <a:ext cx="7463726" cy="3914139"/>
+          </a:xfrm>
+          <a:prstGeom prst="rect">
+            <a:avLst/>
+          </a:prstGeom>
+        </p:spPr>
+      </p:pic>
+    </p:spTree>
+    <p:extLst>
+      <p:ext uri="{BB962C8B-B14F-4D97-AF65-F5344CB8AC3E}">
+        <p14:creationId xmlns:p14="http://schemas.microsoft.com/office/powerpoint/2010/main" val="214441444"/>
+      </p:ext>
+    </p:extLst>
+  </p:cSld>
+  <p:clrMapOvr>
+    <a:masterClrMapping/>
+  </p:clrMapOvr>
+</p:sld>
+</file>
+
+<file path=ppt/slides/slide39.xml><?xml version="1.0" encoding="utf-8"?>
 <p:sld xmlns:a="http://schemas.openxmlformats.org/drawingml/2006/main" xmlns:r="http://schemas.openxmlformats.org/officeDocument/2006/relationships" xmlns:p="http://schemas.openxmlformats.org/presentationml/2006/main">
   <p:cSld>
     <p:spTree>
@@ -14082,6 +14356,1912 @@
       </p:par>
     </p:tnLst>
   </p:timing>
+</p:sld>
+</file>
+
+<file path=ppt/slides/slide40.xml><?xml version="1.0" encoding="utf-8"?>
+<p:sld xmlns:a="http://schemas.openxmlformats.org/drawingml/2006/main" xmlns:r="http://schemas.openxmlformats.org/officeDocument/2006/relationships" xmlns:p="http://schemas.openxmlformats.org/presentationml/2006/main">
+  <p:cSld>
+    <p:spTree>
+      <p:nvGrpSpPr>
+        <p:cNvPr id="1" name=""/>
+        <p:cNvGrpSpPr/>
+        <p:nvPr/>
+      </p:nvGrpSpPr>
+      <p:grpSpPr>
+        <a:xfrm>
+          <a:off x="0" y="0"/>
+          <a:ext cx="0" cy="0"/>
+          <a:chOff x="0" y="0"/>
+          <a:chExt cx="0" cy="0"/>
+        </a:xfrm>
+      </p:grpSpPr>
+      <p:sp>
+        <p:nvSpPr>
+          <p:cNvPr id="2" name="Title 1"/>
+          <p:cNvSpPr>
+            <a:spLocks noGrp="1"/>
+          </p:cNvSpPr>
+          <p:nvPr>
+            <p:ph type="title"/>
+          </p:nvPr>
+        </p:nvSpPr>
+        <p:spPr/>
+        <p:txBody>
+          <a:bodyPr/>
+          <a:lstStyle/>
+          <a:p>
+            <a:r>
+              <a:rPr lang="en-US" dirty="0" smtClean="0"/>
+              <a:t>Loops e </a:t>
+            </a:r>
+            <a:r>
+              <a:rPr lang="en-US" dirty="0" err="1" smtClean="0"/>
+              <a:t>Iteradores</a:t>
+            </a:r>
+            <a:r>
+              <a:rPr lang="en-US" dirty="0" smtClean="0"/>
+              <a:t> – DO WHILE</a:t>
+            </a:r>
+            <a:endParaRPr lang="en-US" dirty="0"/>
+          </a:p>
+        </p:txBody>
+      </p:sp>
+      <p:pic>
+        <p:nvPicPr>
+          <p:cNvPr id="5" name="Picture 4"/>
+          <p:cNvPicPr>
+            <a:picLocks noChangeAspect="1"/>
+          </p:cNvPicPr>
+          <p:nvPr/>
+        </p:nvPicPr>
+        <p:blipFill>
+          <a:blip r:embed="rId2"/>
+          <a:stretch>
+            <a:fillRect/>
+          </a:stretch>
+        </p:blipFill>
+        <p:spPr>
+          <a:xfrm>
+            <a:off x="900374" y="1755321"/>
+            <a:ext cx="7203660" cy="3797278"/>
+          </a:xfrm>
+          <a:prstGeom prst="rect">
+            <a:avLst/>
+          </a:prstGeom>
+        </p:spPr>
+      </p:pic>
+    </p:spTree>
+    <p:extLst>
+      <p:ext uri="{BB962C8B-B14F-4D97-AF65-F5344CB8AC3E}">
+        <p14:creationId xmlns:p14="http://schemas.microsoft.com/office/powerpoint/2010/main" val="4014506739"/>
+      </p:ext>
+    </p:extLst>
+  </p:cSld>
+  <p:clrMapOvr>
+    <a:masterClrMapping/>
+  </p:clrMapOvr>
+</p:sld>
+</file>
+
+<file path=ppt/slides/slide41.xml><?xml version="1.0" encoding="utf-8"?>
+<p:sld xmlns:a="http://schemas.openxmlformats.org/drawingml/2006/main" xmlns:r="http://schemas.openxmlformats.org/officeDocument/2006/relationships" xmlns:p="http://schemas.openxmlformats.org/presentationml/2006/main">
+  <p:cSld>
+    <p:spTree>
+      <p:nvGrpSpPr>
+        <p:cNvPr id="1" name=""/>
+        <p:cNvGrpSpPr/>
+        <p:nvPr/>
+      </p:nvGrpSpPr>
+      <p:grpSpPr>
+        <a:xfrm>
+          <a:off x="0" y="0"/>
+          <a:ext cx="0" cy="0"/>
+          <a:chOff x="0" y="0"/>
+          <a:chExt cx="0" cy="0"/>
+        </a:xfrm>
+      </p:grpSpPr>
+      <p:sp>
+        <p:nvSpPr>
+          <p:cNvPr id="2" name="Title 1"/>
+          <p:cNvSpPr>
+            <a:spLocks noGrp="1"/>
+          </p:cNvSpPr>
+          <p:nvPr>
+            <p:ph type="title"/>
+          </p:nvPr>
+        </p:nvSpPr>
+        <p:spPr/>
+        <p:txBody>
+          <a:bodyPr/>
+          <a:lstStyle/>
+          <a:p>
+            <a:r>
+              <a:rPr lang="en-US" dirty="0" err="1" smtClean="0"/>
+              <a:t>Controle</a:t>
+            </a:r>
+            <a:r>
+              <a:rPr lang="en-US" dirty="0" smtClean="0"/>
+              <a:t> de </a:t>
+            </a:r>
+            <a:r>
+              <a:rPr lang="en-US" dirty="0" err="1" smtClean="0"/>
+              <a:t>Fluxo</a:t>
+            </a:r>
+            <a:endParaRPr lang="en-US" dirty="0"/>
+          </a:p>
+        </p:txBody>
+      </p:sp>
+      <p:sp>
+        <p:nvSpPr>
+          <p:cNvPr id="3" name="Content Placeholder 2"/>
+          <p:cNvSpPr>
+            <a:spLocks noGrp="1"/>
+          </p:cNvSpPr>
+          <p:nvPr>
+            <p:ph idx="1"/>
+          </p:nvPr>
+        </p:nvSpPr>
+        <p:spPr/>
+        <p:txBody>
+          <a:bodyPr/>
+          <a:lstStyle/>
+          <a:p>
+            <a:r>
+              <a:rPr lang="en-US" dirty="0" err="1" smtClean="0"/>
+              <a:t>Os</a:t>
+            </a:r>
+            <a:r>
+              <a:rPr lang="en-US" dirty="0" smtClean="0"/>
+              <a:t> </a:t>
+            </a:r>
+            <a:r>
+              <a:rPr lang="en-US" dirty="0" err="1" smtClean="0"/>
+              <a:t>comandos</a:t>
+            </a:r>
+            <a:r>
+              <a:rPr lang="en-US" dirty="0" smtClean="0"/>
+              <a:t> de </a:t>
+            </a:r>
+            <a:r>
+              <a:rPr lang="en-US" dirty="0" err="1" smtClean="0"/>
+              <a:t>repeti</a:t>
+            </a:r>
+            <a:r>
+              <a:rPr lang="en-US" dirty="0" err="1" smtClean="0"/>
+              <a:t>ção</a:t>
+            </a:r>
+            <a:r>
+              <a:rPr lang="en-US" dirty="0" smtClean="0"/>
+              <a:t> </a:t>
+            </a:r>
+            <a:r>
+              <a:rPr lang="en-US" dirty="0" err="1" smtClean="0"/>
+              <a:t>em</a:t>
+            </a:r>
+            <a:r>
+              <a:rPr lang="en-US" dirty="0" smtClean="0"/>
+              <a:t> java </a:t>
+            </a:r>
+            <a:r>
+              <a:rPr lang="en-US" dirty="0" err="1" smtClean="0"/>
+              <a:t>suportam</a:t>
+            </a:r>
+            <a:r>
+              <a:rPr lang="en-US" dirty="0" smtClean="0"/>
+              <a:t> </a:t>
+            </a:r>
+            <a:r>
+              <a:rPr lang="en-US" dirty="0" err="1" smtClean="0"/>
+              <a:t>dois</a:t>
+            </a:r>
+            <a:r>
+              <a:rPr lang="en-US" dirty="0" smtClean="0"/>
+              <a:t> </a:t>
+            </a:r>
+            <a:r>
+              <a:rPr lang="en-US" dirty="0" err="1" smtClean="0"/>
+              <a:t>tipos</a:t>
+            </a:r>
+            <a:r>
+              <a:rPr lang="en-US" dirty="0" smtClean="0"/>
+              <a:t> de </a:t>
+            </a:r>
+            <a:r>
+              <a:rPr lang="en-US" dirty="0" err="1" smtClean="0"/>
+              <a:t>desvios</a:t>
+            </a:r>
+            <a:r>
+              <a:rPr lang="en-US" dirty="0" smtClean="0"/>
+              <a:t>: o </a:t>
+            </a:r>
+            <a:r>
+              <a:rPr lang="en-US" b="1" dirty="0" smtClean="0"/>
+              <a:t>break</a:t>
+            </a:r>
+            <a:r>
+              <a:rPr lang="en-US" dirty="0" smtClean="0"/>
+              <a:t> e o </a:t>
+            </a:r>
+            <a:r>
+              <a:rPr lang="en-US" b="1" dirty="0" smtClean="0"/>
+              <a:t>continue</a:t>
+            </a:r>
+            <a:r>
+              <a:rPr lang="en-US" dirty="0" smtClean="0"/>
+              <a:t>. O break </a:t>
+            </a:r>
+            <a:r>
+              <a:rPr lang="en-US" dirty="0" err="1" smtClean="0"/>
+              <a:t>faz</a:t>
+            </a:r>
+            <a:r>
+              <a:rPr lang="en-US" dirty="0" smtClean="0"/>
+              <a:t> com </a:t>
+            </a:r>
+            <a:r>
+              <a:rPr lang="en-US" dirty="0" err="1" smtClean="0"/>
+              <a:t>que</a:t>
+            </a:r>
+            <a:r>
+              <a:rPr lang="en-US" dirty="0" smtClean="0"/>
+              <a:t> um </a:t>
+            </a:r>
+            <a:r>
+              <a:rPr lang="en-US" dirty="0" err="1" smtClean="0"/>
+              <a:t>laço</a:t>
+            </a:r>
+            <a:r>
+              <a:rPr lang="en-US" dirty="0" smtClean="0"/>
+              <a:t> </a:t>
+            </a:r>
+            <a:r>
+              <a:rPr lang="en-US" dirty="0" err="1" smtClean="0"/>
+              <a:t>seja</a:t>
+            </a:r>
+            <a:r>
+              <a:rPr lang="en-US" dirty="0" smtClean="0"/>
+              <a:t> </a:t>
+            </a:r>
+            <a:r>
+              <a:rPr lang="en-US" dirty="0" err="1" smtClean="0"/>
+              <a:t>interrompido</a:t>
+            </a:r>
+            <a:r>
+              <a:rPr lang="en-US" dirty="0" smtClean="0"/>
+              <a:t>, </a:t>
+            </a:r>
+            <a:r>
+              <a:rPr lang="en-US" dirty="0" err="1" smtClean="0"/>
+              <a:t>enquanto</a:t>
+            </a:r>
+            <a:r>
+              <a:rPr lang="en-US" dirty="0" smtClean="0"/>
+              <a:t> o continue </a:t>
+            </a:r>
+            <a:r>
+              <a:rPr lang="en-US" dirty="0" err="1" smtClean="0"/>
+              <a:t>é</a:t>
+            </a:r>
+            <a:r>
+              <a:rPr lang="en-US" dirty="0" smtClean="0"/>
+              <a:t> </a:t>
+            </a:r>
+            <a:r>
+              <a:rPr lang="en-US" dirty="0" err="1" smtClean="0"/>
+              <a:t>usado</a:t>
+            </a:r>
+            <a:r>
+              <a:rPr lang="en-US" dirty="0" smtClean="0"/>
+              <a:t> </a:t>
+            </a:r>
+            <a:r>
+              <a:rPr lang="en-US" dirty="0" err="1" smtClean="0"/>
+              <a:t>para</a:t>
+            </a:r>
+            <a:r>
+              <a:rPr lang="en-US" dirty="0" smtClean="0"/>
+              <a:t> “</a:t>
+            </a:r>
+            <a:r>
+              <a:rPr lang="en-US" dirty="0" err="1" smtClean="0"/>
+              <a:t>pular</a:t>
+            </a:r>
+            <a:r>
+              <a:rPr lang="en-US" dirty="0" smtClean="0"/>
+              <a:t>” </a:t>
+            </a:r>
+            <a:r>
+              <a:rPr lang="en-US" dirty="0" err="1" smtClean="0"/>
+              <a:t>uma</a:t>
+            </a:r>
+            <a:r>
+              <a:rPr lang="en-US" dirty="0" smtClean="0"/>
+              <a:t> </a:t>
+            </a:r>
+            <a:r>
+              <a:rPr lang="en-US" dirty="0" err="1" smtClean="0"/>
+              <a:t>execução</a:t>
+            </a:r>
+            <a:r>
+              <a:rPr lang="en-US" dirty="0" smtClean="0"/>
+              <a:t> e </a:t>
+            </a:r>
+            <a:r>
+              <a:rPr lang="en-US" dirty="0" err="1" smtClean="0"/>
+              <a:t>continuar</a:t>
+            </a:r>
+            <a:r>
+              <a:rPr lang="en-US" dirty="0" smtClean="0"/>
+              <a:t> a </a:t>
+            </a:r>
+            <a:r>
+              <a:rPr lang="en-US" dirty="0" err="1" smtClean="0"/>
+              <a:t>partir</a:t>
+            </a:r>
+            <a:r>
+              <a:rPr lang="en-US" dirty="0" smtClean="0"/>
+              <a:t> da </a:t>
+            </a:r>
+            <a:r>
+              <a:rPr lang="en-US" dirty="0" err="1" smtClean="0"/>
+              <a:t>próxima</a:t>
+            </a:r>
+            <a:r>
+              <a:rPr lang="en-US" dirty="0" smtClean="0"/>
+              <a:t>.</a:t>
+            </a:r>
+            <a:endParaRPr lang="en-US" dirty="0"/>
+          </a:p>
+        </p:txBody>
+      </p:sp>
+    </p:spTree>
+    <p:extLst>
+      <p:ext uri="{BB962C8B-B14F-4D97-AF65-F5344CB8AC3E}">
+        <p14:creationId xmlns:p14="http://schemas.microsoft.com/office/powerpoint/2010/main" val="1967447598"/>
+      </p:ext>
+    </p:extLst>
+  </p:cSld>
+  <p:clrMapOvr>
+    <a:masterClrMapping/>
+  </p:clrMapOvr>
+</p:sld>
+</file>
+
+<file path=ppt/slides/slide42.xml><?xml version="1.0" encoding="utf-8"?>
+<p:sld xmlns:a="http://schemas.openxmlformats.org/drawingml/2006/main" xmlns:r="http://schemas.openxmlformats.org/officeDocument/2006/relationships" xmlns:p="http://schemas.openxmlformats.org/presentationml/2006/main">
+  <p:cSld>
+    <p:spTree>
+      <p:nvGrpSpPr>
+        <p:cNvPr id="1" name=""/>
+        <p:cNvGrpSpPr/>
+        <p:nvPr/>
+      </p:nvGrpSpPr>
+      <p:grpSpPr>
+        <a:xfrm>
+          <a:off x="0" y="0"/>
+          <a:ext cx="0" cy="0"/>
+          <a:chOff x="0" y="0"/>
+          <a:chExt cx="0" cy="0"/>
+        </a:xfrm>
+      </p:grpSpPr>
+      <p:sp>
+        <p:nvSpPr>
+          <p:cNvPr id="2" name="Title 1"/>
+          <p:cNvSpPr>
+            <a:spLocks noGrp="1"/>
+          </p:cNvSpPr>
+          <p:nvPr>
+            <p:ph type="title"/>
+          </p:nvPr>
+        </p:nvSpPr>
+        <p:spPr/>
+        <p:txBody>
+          <a:bodyPr/>
+          <a:lstStyle/>
+          <a:p>
+            <a:r>
+              <a:rPr lang="en-US" dirty="0" err="1" smtClean="0"/>
+              <a:t>Controle</a:t>
+            </a:r>
+            <a:r>
+              <a:rPr lang="en-US" dirty="0" smtClean="0"/>
+              <a:t> de </a:t>
+            </a:r>
+            <a:r>
+              <a:rPr lang="en-US" dirty="0" err="1" smtClean="0"/>
+              <a:t>Fluxo</a:t>
+            </a:r>
+            <a:r>
+              <a:rPr lang="en-US" dirty="0" smtClean="0"/>
+              <a:t> - Break</a:t>
+            </a:r>
+            <a:endParaRPr lang="en-US" dirty="0"/>
+          </a:p>
+        </p:txBody>
+      </p:sp>
+      <p:pic>
+        <p:nvPicPr>
+          <p:cNvPr id="5" name="Picture 4"/>
+          <p:cNvPicPr>
+            <a:picLocks noChangeAspect="1"/>
+          </p:cNvPicPr>
+          <p:nvPr/>
+        </p:nvPicPr>
+        <p:blipFill>
+          <a:blip r:embed="rId2"/>
+          <a:stretch>
+            <a:fillRect/>
+          </a:stretch>
+        </p:blipFill>
+        <p:spPr>
+          <a:xfrm>
+            <a:off x="1072842" y="1912030"/>
+            <a:ext cx="6908775" cy="3978318"/>
+          </a:xfrm>
+          <a:prstGeom prst="rect">
+            <a:avLst/>
+          </a:prstGeom>
+        </p:spPr>
+      </p:pic>
+    </p:spTree>
+    <p:extLst>
+      <p:ext uri="{BB962C8B-B14F-4D97-AF65-F5344CB8AC3E}">
+        <p14:creationId xmlns:p14="http://schemas.microsoft.com/office/powerpoint/2010/main" val="1990444460"/>
+      </p:ext>
+    </p:extLst>
+  </p:cSld>
+  <p:clrMapOvr>
+    <a:masterClrMapping/>
+  </p:clrMapOvr>
+</p:sld>
+</file>
+
+<file path=ppt/slides/slide43.xml><?xml version="1.0" encoding="utf-8"?>
+<p:sld xmlns:a="http://schemas.openxmlformats.org/drawingml/2006/main" xmlns:r="http://schemas.openxmlformats.org/officeDocument/2006/relationships" xmlns:p="http://schemas.openxmlformats.org/presentationml/2006/main">
+  <p:cSld>
+    <p:spTree>
+      <p:nvGrpSpPr>
+        <p:cNvPr id="1" name=""/>
+        <p:cNvGrpSpPr/>
+        <p:nvPr/>
+      </p:nvGrpSpPr>
+      <p:grpSpPr>
+        <a:xfrm>
+          <a:off x="0" y="0"/>
+          <a:ext cx="0" cy="0"/>
+          <a:chOff x="0" y="0"/>
+          <a:chExt cx="0" cy="0"/>
+        </a:xfrm>
+      </p:grpSpPr>
+      <p:sp>
+        <p:nvSpPr>
+          <p:cNvPr id="2" name="Title 1"/>
+          <p:cNvSpPr>
+            <a:spLocks noGrp="1"/>
+          </p:cNvSpPr>
+          <p:nvPr>
+            <p:ph type="title"/>
+          </p:nvPr>
+        </p:nvSpPr>
+        <p:spPr/>
+        <p:txBody>
+          <a:bodyPr/>
+          <a:lstStyle/>
+          <a:p>
+            <a:r>
+              <a:rPr lang="en-US" dirty="0" err="1" smtClean="0"/>
+              <a:t>Controle</a:t>
+            </a:r>
+            <a:r>
+              <a:rPr lang="en-US" dirty="0" smtClean="0"/>
+              <a:t> de </a:t>
+            </a:r>
+            <a:r>
+              <a:rPr lang="en-US" dirty="0" err="1" smtClean="0"/>
+              <a:t>Fluxo</a:t>
+            </a:r>
+            <a:r>
+              <a:rPr lang="en-US" dirty="0" smtClean="0"/>
+              <a:t> - Continue</a:t>
+            </a:r>
+            <a:endParaRPr lang="en-US" dirty="0"/>
+          </a:p>
+        </p:txBody>
+      </p:sp>
+      <p:pic>
+        <p:nvPicPr>
+          <p:cNvPr id="3" name="Picture 2"/>
+          <p:cNvPicPr>
+            <a:picLocks noChangeAspect="1"/>
+          </p:cNvPicPr>
+          <p:nvPr/>
+        </p:nvPicPr>
+        <p:blipFill>
+          <a:blip r:embed="rId2"/>
+          <a:stretch>
+            <a:fillRect/>
+          </a:stretch>
+        </p:blipFill>
+        <p:spPr>
+          <a:xfrm>
+            <a:off x="997826" y="1689650"/>
+            <a:ext cx="7121343" cy="4511427"/>
+          </a:xfrm>
+          <a:prstGeom prst="rect">
+            <a:avLst/>
+          </a:prstGeom>
+        </p:spPr>
+      </p:pic>
+    </p:spTree>
+    <p:extLst>
+      <p:ext uri="{BB962C8B-B14F-4D97-AF65-F5344CB8AC3E}">
+        <p14:creationId xmlns:p14="http://schemas.microsoft.com/office/powerpoint/2010/main" val="2228741452"/>
+      </p:ext>
+    </p:extLst>
+  </p:cSld>
+  <p:clrMapOvr>
+    <a:masterClrMapping/>
+  </p:clrMapOvr>
+</p:sld>
+</file>
+
+<file path=ppt/slides/slide44.xml><?xml version="1.0" encoding="utf-8"?>
+<p:sld xmlns:a="http://schemas.openxmlformats.org/drawingml/2006/main" xmlns:r="http://schemas.openxmlformats.org/officeDocument/2006/relationships" xmlns:p="http://schemas.openxmlformats.org/presentationml/2006/main">
+  <p:cSld>
+    <p:spTree>
+      <p:nvGrpSpPr>
+        <p:cNvPr id="1" name=""/>
+        <p:cNvGrpSpPr/>
+        <p:nvPr/>
+      </p:nvGrpSpPr>
+      <p:grpSpPr>
+        <a:xfrm>
+          <a:off x="0" y="0"/>
+          <a:ext cx="0" cy="0"/>
+          <a:chOff x="0" y="0"/>
+          <a:chExt cx="0" cy="0"/>
+        </a:xfrm>
+      </p:grpSpPr>
+      <p:sp>
+        <p:nvSpPr>
+          <p:cNvPr id="2" name="Title 1"/>
+          <p:cNvSpPr>
+            <a:spLocks noGrp="1"/>
+          </p:cNvSpPr>
+          <p:nvPr>
+            <p:ph type="title"/>
+          </p:nvPr>
+        </p:nvSpPr>
+        <p:spPr/>
+        <p:txBody>
+          <a:bodyPr/>
+          <a:lstStyle/>
+          <a:p>
+            <a:r>
+              <a:rPr lang="en-US" dirty="0" err="1" smtClean="0"/>
+              <a:t>Vetores</a:t>
+            </a:r>
+            <a:r>
+              <a:rPr lang="en-US" dirty="0" smtClean="0"/>
+              <a:t> e </a:t>
+            </a:r>
+            <a:r>
+              <a:rPr lang="en-US" dirty="0" err="1" smtClean="0"/>
+              <a:t>Matrizes</a:t>
+            </a:r>
+            <a:endParaRPr lang="en-US" dirty="0"/>
+          </a:p>
+        </p:txBody>
+      </p:sp>
+      <p:sp>
+        <p:nvSpPr>
+          <p:cNvPr id="3" name="Content Placeholder 2"/>
+          <p:cNvSpPr>
+            <a:spLocks noGrp="1"/>
+          </p:cNvSpPr>
+          <p:nvPr>
+            <p:ph idx="1"/>
+          </p:nvPr>
+        </p:nvSpPr>
+        <p:spPr/>
+        <p:txBody>
+          <a:bodyPr/>
+          <a:lstStyle/>
+          <a:p>
+            <a:r>
+              <a:rPr lang="en-US" dirty="0" smtClean="0"/>
+              <a:t>Arrays </a:t>
+            </a:r>
+            <a:r>
+              <a:rPr lang="en-US" dirty="0" err="1" smtClean="0"/>
+              <a:t>s</a:t>
+            </a:r>
+            <a:r>
+              <a:rPr lang="en-US" dirty="0" err="1" smtClean="0"/>
+              <a:t>ão</a:t>
+            </a:r>
+            <a:r>
+              <a:rPr lang="en-US" dirty="0" smtClean="0"/>
+              <a:t> </a:t>
+            </a:r>
+            <a:r>
+              <a:rPr lang="en-US" dirty="0" err="1" smtClean="0"/>
+              <a:t>tipos</a:t>
+            </a:r>
+            <a:r>
+              <a:rPr lang="en-US" dirty="0" smtClean="0"/>
+              <a:t> </a:t>
+            </a:r>
+            <a:r>
+              <a:rPr lang="en-US" dirty="0" err="1" smtClean="0"/>
+              <a:t>indexados</a:t>
+            </a:r>
+            <a:r>
+              <a:rPr lang="en-US" dirty="0" smtClean="0"/>
+              <a:t> de dados </a:t>
+            </a:r>
+            <a:r>
+              <a:rPr lang="en-US" dirty="0" err="1" smtClean="0"/>
+              <a:t>que</a:t>
+            </a:r>
+            <a:r>
+              <a:rPr lang="en-US" dirty="0" smtClean="0"/>
+              <a:t> </a:t>
+            </a:r>
+            <a:r>
+              <a:rPr lang="en-US" dirty="0" err="1" smtClean="0"/>
+              <a:t>permitem</a:t>
+            </a:r>
+            <a:r>
+              <a:rPr lang="en-US" dirty="0" smtClean="0"/>
+              <a:t> a </a:t>
+            </a:r>
+            <a:r>
+              <a:rPr lang="en-US" dirty="0" err="1" smtClean="0"/>
+              <a:t>representação</a:t>
+            </a:r>
+            <a:r>
+              <a:rPr lang="en-US" dirty="0" smtClean="0"/>
+              <a:t> de </a:t>
+            </a:r>
+            <a:r>
+              <a:rPr lang="en-US" dirty="0" err="1" smtClean="0"/>
+              <a:t>agrupamento</a:t>
+            </a:r>
+            <a:r>
+              <a:rPr lang="en-US" dirty="0" smtClean="0"/>
+              <a:t> de dados </a:t>
+            </a:r>
+            <a:r>
+              <a:rPr lang="en-US" dirty="0" err="1" smtClean="0"/>
+              <a:t>como</a:t>
+            </a:r>
+            <a:r>
+              <a:rPr lang="en-US" dirty="0" smtClean="0"/>
+              <a:t> </a:t>
+            </a:r>
+            <a:r>
+              <a:rPr lang="en-US" dirty="0" err="1" smtClean="0"/>
+              <a:t>vetores</a:t>
+            </a:r>
+            <a:r>
+              <a:rPr lang="en-US" dirty="0" smtClean="0"/>
+              <a:t> e </a:t>
+            </a:r>
+            <a:r>
+              <a:rPr lang="en-US" dirty="0" err="1" smtClean="0"/>
+              <a:t>matrizes</a:t>
+            </a:r>
+            <a:r>
+              <a:rPr lang="en-US" dirty="0"/>
+              <a:t>;</a:t>
+            </a:r>
+            <a:endParaRPr lang="en-US" dirty="0" smtClean="0"/>
+          </a:p>
+          <a:p>
+            <a:r>
+              <a:rPr lang="en-US" dirty="0" err="1" smtClean="0"/>
+              <a:t>Podemos</a:t>
+            </a:r>
+            <a:r>
+              <a:rPr lang="en-US" dirty="0" smtClean="0"/>
+              <a:t> </a:t>
+            </a:r>
+            <a:r>
+              <a:rPr lang="en-US" dirty="0" err="1" smtClean="0"/>
+              <a:t>declarar</a:t>
+            </a:r>
+            <a:r>
+              <a:rPr lang="en-US" dirty="0" smtClean="0"/>
+              <a:t> arrays de </a:t>
+            </a:r>
+            <a:r>
+              <a:rPr lang="en-US" dirty="0" err="1" smtClean="0"/>
+              <a:t>qualquer</a:t>
+            </a:r>
+            <a:r>
+              <a:rPr lang="en-US" dirty="0" smtClean="0"/>
+              <a:t> </a:t>
+            </a:r>
+            <a:r>
+              <a:rPr lang="en-US" dirty="0" err="1" smtClean="0"/>
+              <a:t>tipo</a:t>
+            </a:r>
+            <a:r>
+              <a:rPr lang="en-US" dirty="0" smtClean="0"/>
+              <a:t> de dados </a:t>
+            </a:r>
+            <a:r>
+              <a:rPr lang="en-US" dirty="0" err="1" smtClean="0"/>
+              <a:t>suportado</a:t>
+            </a:r>
+            <a:r>
+              <a:rPr lang="en-US" dirty="0" smtClean="0"/>
+              <a:t> </a:t>
+            </a:r>
+            <a:r>
+              <a:rPr lang="en-US" dirty="0" err="1" smtClean="0"/>
+              <a:t>pelo</a:t>
+            </a:r>
+            <a:r>
+              <a:rPr lang="en-US" dirty="0" smtClean="0"/>
+              <a:t> java;</a:t>
+            </a:r>
+          </a:p>
+          <a:p>
+            <a:r>
+              <a:rPr lang="en-US" dirty="0" err="1" smtClean="0"/>
+              <a:t>Essa</a:t>
+            </a:r>
+            <a:r>
+              <a:rPr lang="en-US" dirty="0" smtClean="0"/>
+              <a:t> </a:t>
+            </a:r>
+            <a:r>
+              <a:rPr lang="en-US" dirty="0" err="1" smtClean="0"/>
+              <a:t>declaração</a:t>
+            </a:r>
+            <a:r>
+              <a:rPr lang="en-US" dirty="0" smtClean="0"/>
+              <a:t> </a:t>
+            </a:r>
+            <a:r>
+              <a:rPr lang="en-US" dirty="0" err="1" smtClean="0"/>
+              <a:t>é</a:t>
+            </a:r>
+            <a:r>
+              <a:rPr lang="en-US" dirty="0" smtClean="0"/>
+              <a:t> </a:t>
+            </a:r>
+            <a:r>
+              <a:rPr lang="en-US" dirty="0" err="1" smtClean="0"/>
+              <a:t>feita</a:t>
+            </a:r>
+            <a:r>
+              <a:rPr lang="en-US" dirty="0" smtClean="0"/>
+              <a:t> </a:t>
+            </a:r>
+            <a:r>
+              <a:rPr lang="en-US" dirty="0" err="1" smtClean="0"/>
+              <a:t>pela</a:t>
+            </a:r>
+            <a:r>
+              <a:rPr lang="en-US" dirty="0" smtClean="0"/>
+              <a:t> </a:t>
+            </a:r>
+            <a:r>
+              <a:rPr lang="en-US" dirty="0" err="1" smtClean="0"/>
+              <a:t>adição</a:t>
+            </a:r>
+            <a:r>
+              <a:rPr lang="en-US" dirty="0" smtClean="0"/>
+              <a:t> do </a:t>
+            </a:r>
+            <a:r>
+              <a:rPr lang="en-US" dirty="0" err="1" smtClean="0"/>
+              <a:t>símbolo</a:t>
+            </a:r>
+            <a:r>
+              <a:rPr lang="en-US" dirty="0" smtClean="0"/>
+              <a:t> </a:t>
+            </a:r>
+            <a:r>
+              <a:rPr lang="en-US" b="1" dirty="0" smtClean="0"/>
+              <a:t>[]</a:t>
+            </a:r>
+            <a:r>
+              <a:rPr lang="en-US" dirty="0" smtClean="0"/>
+              <a:t> a um </a:t>
+            </a:r>
+            <a:r>
+              <a:rPr lang="en-US" dirty="0" err="1" smtClean="0"/>
+              <a:t>tipo</a:t>
+            </a:r>
+            <a:r>
+              <a:rPr lang="en-US" dirty="0" smtClean="0"/>
+              <a:t> de dado, </a:t>
+            </a:r>
+            <a:r>
+              <a:rPr lang="en-US" dirty="0" err="1" smtClean="0"/>
+              <a:t>que</a:t>
+            </a:r>
+            <a:r>
+              <a:rPr lang="en-US" dirty="0" smtClean="0"/>
+              <a:t> </a:t>
+            </a:r>
+            <a:r>
+              <a:rPr lang="en-US" dirty="0" err="1" smtClean="0"/>
+              <a:t>pode</a:t>
+            </a:r>
+            <a:r>
+              <a:rPr lang="en-US" dirty="0" smtClean="0"/>
+              <a:t> </a:t>
+            </a:r>
+            <a:r>
+              <a:rPr lang="en-US" dirty="0" err="1" smtClean="0"/>
+              <a:t>aparecer</a:t>
+            </a:r>
+            <a:r>
+              <a:rPr lang="en-US" dirty="0" smtClean="0"/>
+              <a:t> antes </a:t>
+            </a:r>
+            <a:r>
+              <a:rPr lang="en-US" dirty="0" err="1" smtClean="0"/>
+              <a:t>ou</a:t>
+            </a:r>
+            <a:r>
+              <a:rPr lang="en-US" dirty="0" smtClean="0"/>
+              <a:t> </a:t>
+            </a:r>
+            <a:r>
+              <a:rPr lang="en-US" dirty="0" err="1" smtClean="0"/>
+              <a:t>após</a:t>
+            </a:r>
+            <a:r>
+              <a:rPr lang="en-US" dirty="0" smtClean="0"/>
+              <a:t> o </a:t>
+            </a:r>
+            <a:r>
+              <a:rPr lang="en-US" dirty="0" err="1" smtClean="0"/>
+              <a:t>identificador</a:t>
+            </a:r>
+            <a:r>
+              <a:rPr lang="en-US" dirty="0" smtClean="0"/>
+              <a:t> da </a:t>
+            </a:r>
+            <a:r>
+              <a:rPr lang="en-US" dirty="0" err="1" smtClean="0"/>
+              <a:t>variável</a:t>
+            </a:r>
+            <a:r>
+              <a:rPr lang="en-US" dirty="0" smtClean="0"/>
+              <a:t>;</a:t>
+            </a:r>
+            <a:endParaRPr lang="en-US" dirty="0"/>
+          </a:p>
+        </p:txBody>
+      </p:sp>
+    </p:spTree>
+    <p:extLst>
+      <p:ext uri="{BB962C8B-B14F-4D97-AF65-F5344CB8AC3E}">
+        <p14:creationId xmlns:p14="http://schemas.microsoft.com/office/powerpoint/2010/main" val="2806278433"/>
+      </p:ext>
+    </p:extLst>
+  </p:cSld>
+  <p:clrMapOvr>
+    <a:masterClrMapping/>
+  </p:clrMapOvr>
+</p:sld>
+</file>
+
+<file path=ppt/slides/slide45.xml><?xml version="1.0" encoding="utf-8"?>
+<p:sld xmlns:a="http://schemas.openxmlformats.org/drawingml/2006/main" xmlns:r="http://schemas.openxmlformats.org/officeDocument/2006/relationships" xmlns:p="http://schemas.openxmlformats.org/presentationml/2006/main">
+  <p:cSld>
+    <p:spTree>
+      <p:nvGrpSpPr>
+        <p:cNvPr id="1" name=""/>
+        <p:cNvGrpSpPr/>
+        <p:nvPr/>
+      </p:nvGrpSpPr>
+      <p:grpSpPr>
+        <a:xfrm>
+          <a:off x="0" y="0"/>
+          <a:ext cx="0" cy="0"/>
+          <a:chOff x="0" y="0"/>
+          <a:chExt cx="0" cy="0"/>
+        </a:xfrm>
+      </p:grpSpPr>
+      <p:sp>
+        <p:nvSpPr>
+          <p:cNvPr id="2" name="Title 1"/>
+          <p:cNvSpPr>
+            <a:spLocks noGrp="1"/>
+          </p:cNvSpPr>
+          <p:nvPr>
+            <p:ph type="title"/>
+          </p:nvPr>
+        </p:nvSpPr>
+        <p:spPr/>
+        <p:txBody>
+          <a:bodyPr/>
+          <a:lstStyle/>
+          <a:p>
+            <a:r>
+              <a:rPr lang="en-US" dirty="0" err="1" smtClean="0"/>
+              <a:t>Vetores</a:t>
+            </a:r>
+            <a:r>
+              <a:rPr lang="en-US" dirty="0" smtClean="0"/>
+              <a:t> e </a:t>
+            </a:r>
+            <a:r>
+              <a:rPr lang="en-US" dirty="0" err="1" smtClean="0"/>
+              <a:t>Matrizes</a:t>
+            </a:r>
+            <a:endParaRPr lang="en-US" dirty="0"/>
+          </a:p>
+        </p:txBody>
+      </p:sp>
+      <p:pic>
+        <p:nvPicPr>
+          <p:cNvPr id="5" name="Picture 4"/>
+          <p:cNvPicPr>
+            <a:picLocks noChangeAspect="1"/>
+          </p:cNvPicPr>
+          <p:nvPr/>
+        </p:nvPicPr>
+        <p:blipFill>
+          <a:blip r:embed="rId2"/>
+          <a:stretch>
+            <a:fillRect/>
+          </a:stretch>
+        </p:blipFill>
+        <p:spPr>
+          <a:xfrm>
+            <a:off x="457200" y="1790182"/>
+            <a:ext cx="8392682" cy="4005598"/>
+          </a:xfrm>
+          <a:prstGeom prst="rect">
+            <a:avLst/>
+          </a:prstGeom>
+        </p:spPr>
+      </p:pic>
+    </p:spTree>
+    <p:extLst>
+      <p:ext uri="{BB962C8B-B14F-4D97-AF65-F5344CB8AC3E}">
+        <p14:creationId xmlns:p14="http://schemas.microsoft.com/office/powerpoint/2010/main" val="3711135009"/>
+      </p:ext>
+    </p:extLst>
+  </p:cSld>
+  <p:clrMapOvr>
+    <a:masterClrMapping/>
+  </p:clrMapOvr>
+</p:sld>
+</file>
+
+<file path=ppt/slides/slide46.xml><?xml version="1.0" encoding="utf-8"?>
+<p:sld xmlns:a="http://schemas.openxmlformats.org/drawingml/2006/main" xmlns:r="http://schemas.openxmlformats.org/officeDocument/2006/relationships" xmlns:p="http://schemas.openxmlformats.org/presentationml/2006/main">
+  <p:cSld>
+    <p:spTree>
+      <p:nvGrpSpPr>
+        <p:cNvPr id="1" name=""/>
+        <p:cNvGrpSpPr/>
+        <p:nvPr/>
+      </p:nvGrpSpPr>
+      <p:grpSpPr>
+        <a:xfrm>
+          <a:off x="0" y="0"/>
+          <a:ext cx="0" cy="0"/>
+          <a:chOff x="0" y="0"/>
+          <a:chExt cx="0" cy="0"/>
+        </a:xfrm>
+      </p:grpSpPr>
+      <p:sp>
+        <p:nvSpPr>
+          <p:cNvPr id="2" name="Title 1"/>
+          <p:cNvSpPr>
+            <a:spLocks noGrp="1"/>
+          </p:cNvSpPr>
+          <p:nvPr>
+            <p:ph type="title"/>
+          </p:nvPr>
+        </p:nvSpPr>
+        <p:spPr/>
+        <p:txBody>
+          <a:bodyPr/>
+          <a:lstStyle/>
+          <a:p>
+            <a:r>
+              <a:rPr lang="en-US" dirty="0" err="1"/>
+              <a:t>Vetores</a:t>
+            </a:r>
+            <a:r>
+              <a:rPr lang="en-US" dirty="0"/>
+              <a:t> e </a:t>
+            </a:r>
+            <a:r>
+              <a:rPr lang="en-US" dirty="0" err="1"/>
+              <a:t>Matrizes</a:t>
+            </a:r>
+            <a:endParaRPr lang="en-US" dirty="0"/>
+          </a:p>
+        </p:txBody>
+      </p:sp>
+      <p:sp>
+        <p:nvSpPr>
+          <p:cNvPr id="3" name="Content Placeholder 2"/>
+          <p:cNvSpPr>
+            <a:spLocks noGrp="1"/>
+          </p:cNvSpPr>
+          <p:nvPr>
+            <p:ph idx="1"/>
+          </p:nvPr>
+        </p:nvSpPr>
+        <p:spPr/>
+        <p:txBody>
+          <a:bodyPr>
+            <a:normAutofit fontScale="85000" lnSpcReduction="20000"/>
+          </a:bodyPr>
+          <a:lstStyle/>
+          <a:p>
+            <a:r>
+              <a:rPr lang="en-US" dirty="0" smtClean="0"/>
+              <a:t>Na </a:t>
+            </a:r>
+            <a:r>
+              <a:rPr lang="en-US" dirty="0" err="1" smtClean="0"/>
+              <a:t>m</a:t>
+            </a:r>
+            <a:r>
+              <a:rPr lang="en-US" dirty="0" err="1" smtClean="0"/>
+              <a:t>emória</a:t>
+            </a:r>
+            <a:r>
+              <a:rPr lang="en-US" dirty="0" smtClean="0"/>
+              <a:t>, um array </a:t>
+            </a:r>
+            <a:r>
+              <a:rPr lang="en-US" dirty="0" err="1" smtClean="0"/>
+              <a:t>é</a:t>
+            </a:r>
+            <a:r>
+              <a:rPr lang="en-US" dirty="0" smtClean="0"/>
+              <a:t> um </a:t>
+            </a:r>
+            <a:r>
+              <a:rPr lang="en-US" dirty="0" err="1" smtClean="0"/>
+              <a:t>agrupamento</a:t>
+            </a:r>
+            <a:r>
+              <a:rPr lang="en-US" dirty="0" smtClean="0"/>
+              <a:t> de dados, </a:t>
+            </a:r>
+            <a:r>
+              <a:rPr lang="en-US" dirty="0" err="1" smtClean="0"/>
+              <a:t>indexados</a:t>
+            </a:r>
+            <a:r>
+              <a:rPr lang="en-US" dirty="0" smtClean="0"/>
+              <a:t> </a:t>
+            </a:r>
+            <a:r>
+              <a:rPr lang="en-US" dirty="0" err="1" smtClean="0"/>
+              <a:t>pelo</a:t>
+            </a:r>
+            <a:r>
+              <a:rPr lang="en-US" dirty="0" smtClean="0"/>
+              <a:t> </a:t>
+            </a:r>
+            <a:r>
+              <a:rPr lang="en-US" dirty="0" err="1" smtClean="0"/>
+              <a:t>tamanho</a:t>
+            </a:r>
+            <a:r>
+              <a:rPr lang="en-US" dirty="0" smtClean="0"/>
+              <a:t> do </a:t>
+            </a:r>
+            <a:r>
+              <a:rPr lang="en-US" dirty="0" err="1" smtClean="0"/>
+              <a:t>tipo</a:t>
+            </a:r>
+            <a:r>
+              <a:rPr lang="en-US" dirty="0" smtClean="0"/>
+              <a:t> de dado </a:t>
+            </a:r>
+            <a:r>
+              <a:rPr lang="en-US" dirty="0" err="1" smtClean="0"/>
+              <a:t>que</a:t>
+            </a:r>
+            <a:r>
+              <a:rPr lang="en-US" dirty="0" smtClean="0"/>
+              <a:t> o array </a:t>
+            </a:r>
+            <a:r>
+              <a:rPr lang="en-US" dirty="0" err="1" smtClean="0"/>
+              <a:t>suporta</a:t>
+            </a:r>
+            <a:r>
+              <a:rPr lang="en-US" dirty="0" smtClean="0"/>
+              <a:t>;</a:t>
+            </a:r>
+          </a:p>
+          <a:p>
+            <a:r>
+              <a:rPr lang="en-US" dirty="0" smtClean="0"/>
+              <a:t>O </a:t>
+            </a:r>
+            <a:r>
+              <a:rPr lang="en-US" dirty="0" err="1" smtClean="0"/>
+              <a:t>primeiro</a:t>
+            </a:r>
+            <a:r>
+              <a:rPr lang="en-US" dirty="0" smtClean="0"/>
+              <a:t> </a:t>
+            </a:r>
+            <a:r>
+              <a:rPr lang="en-US" dirty="0" err="1" smtClean="0"/>
+              <a:t>índice</a:t>
+            </a:r>
+            <a:r>
+              <a:rPr lang="en-US" dirty="0" smtClean="0"/>
+              <a:t> de um array </a:t>
+            </a:r>
+            <a:r>
+              <a:rPr lang="en-US" dirty="0" err="1" smtClean="0"/>
+              <a:t>é</a:t>
+            </a:r>
+            <a:r>
+              <a:rPr lang="en-US" dirty="0" smtClean="0"/>
+              <a:t> </a:t>
+            </a:r>
+            <a:r>
+              <a:rPr lang="en-US" dirty="0" err="1" smtClean="0"/>
+              <a:t>sempre</a:t>
+            </a:r>
+            <a:r>
+              <a:rPr lang="en-US" dirty="0" smtClean="0"/>
+              <a:t> 0, e o </a:t>
+            </a:r>
+            <a:r>
+              <a:rPr lang="en-US" dirty="0" err="1" smtClean="0"/>
+              <a:t>último</a:t>
+            </a:r>
+            <a:r>
+              <a:rPr lang="en-US" dirty="0" smtClean="0"/>
+              <a:t> </a:t>
+            </a:r>
+            <a:r>
+              <a:rPr lang="en-US" dirty="0" err="1" smtClean="0"/>
+              <a:t>índice</a:t>
+            </a:r>
+            <a:r>
+              <a:rPr lang="en-US" dirty="0" smtClean="0"/>
+              <a:t> </a:t>
+            </a:r>
+            <a:r>
+              <a:rPr lang="en-US" dirty="0" err="1" smtClean="0"/>
+              <a:t>é</a:t>
+            </a:r>
+            <a:r>
+              <a:rPr lang="en-US" dirty="0" smtClean="0"/>
+              <a:t> o N-1, </a:t>
+            </a:r>
+            <a:r>
+              <a:rPr lang="en-US" dirty="0" err="1" smtClean="0"/>
+              <a:t>onde</a:t>
+            </a:r>
+            <a:r>
+              <a:rPr lang="en-US" dirty="0" smtClean="0"/>
+              <a:t> N </a:t>
+            </a:r>
+            <a:r>
+              <a:rPr lang="en-US" dirty="0" err="1" smtClean="0"/>
+              <a:t>é</a:t>
+            </a:r>
+            <a:r>
+              <a:rPr lang="en-US" dirty="0" smtClean="0"/>
+              <a:t> o </a:t>
+            </a:r>
+            <a:r>
+              <a:rPr lang="en-US" dirty="0" err="1" smtClean="0"/>
+              <a:t>número</a:t>
+            </a:r>
+            <a:r>
+              <a:rPr lang="en-US" dirty="0" smtClean="0"/>
+              <a:t> de </a:t>
+            </a:r>
+            <a:r>
+              <a:rPr lang="en-US" dirty="0" err="1" smtClean="0"/>
+              <a:t>elementos</a:t>
+            </a:r>
+            <a:r>
+              <a:rPr lang="en-US" dirty="0" smtClean="0"/>
+              <a:t> do array;</a:t>
+            </a:r>
+          </a:p>
+          <a:p>
+            <a:r>
+              <a:rPr lang="en-US" dirty="0" smtClean="0"/>
+              <a:t>Para </a:t>
+            </a:r>
+            <a:r>
+              <a:rPr lang="en-US" dirty="0" err="1" smtClean="0"/>
+              <a:t>criar</a:t>
+            </a:r>
+            <a:r>
+              <a:rPr lang="en-US" dirty="0" smtClean="0"/>
+              <a:t> um array, </a:t>
+            </a:r>
+            <a:r>
+              <a:rPr lang="en-US" dirty="0" err="1" smtClean="0"/>
+              <a:t>usamos</a:t>
+            </a:r>
+            <a:r>
+              <a:rPr lang="en-US" dirty="0" smtClean="0"/>
+              <a:t> a </a:t>
+            </a:r>
+            <a:r>
+              <a:rPr lang="en-US" dirty="0" err="1" smtClean="0"/>
+              <a:t>palavra</a:t>
+            </a:r>
+            <a:r>
+              <a:rPr lang="en-US" dirty="0" smtClean="0"/>
+              <a:t> </a:t>
+            </a:r>
+            <a:r>
+              <a:rPr lang="en-US" dirty="0" err="1" smtClean="0"/>
+              <a:t>chave</a:t>
+            </a:r>
+            <a:r>
+              <a:rPr lang="en-US" dirty="0" smtClean="0"/>
+              <a:t> </a:t>
+            </a:r>
+            <a:r>
+              <a:rPr lang="en-US" b="1" dirty="0" smtClean="0"/>
+              <a:t>new</a:t>
+            </a:r>
+            <a:r>
+              <a:rPr lang="en-US" dirty="0" smtClean="0"/>
+              <a:t>;</a:t>
+            </a:r>
+          </a:p>
+          <a:p>
+            <a:r>
+              <a:rPr lang="en-US" dirty="0" err="1" smtClean="0"/>
+              <a:t>int</a:t>
+            </a:r>
+            <a:r>
+              <a:rPr lang="en-US" dirty="0" smtClean="0"/>
+              <a:t>[] </a:t>
+            </a:r>
+            <a:r>
+              <a:rPr lang="en-US" dirty="0" err="1" smtClean="0"/>
+              <a:t>numeros</a:t>
+            </a:r>
+            <a:r>
+              <a:rPr lang="en-US" dirty="0" smtClean="0"/>
+              <a:t> = new </a:t>
+            </a:r>
+            <a:r>
+              <a:rPr lang="en-US" dirty="0" err="1" smtClean="0"/>
+              <a:t>int</a:t>
+            </a:r>
+            <a:r>
+              <a:rPr lang="en-US" dirty="0" smtClean="0"/>
+              <a:t>[50];</a:t>
+            </a:r>
+          </a:p>
+          <a:p>
+            <a:r>
+              <a:rPr lang="en-US" dirty="0" smtClean="0"/>
+              <a:t>A </a:t>
+            </a:r>
+            <a:r>
+              <a:rPr lang="en-US" dirty="0" err="1" smtClean="0"/>
+              <a:t>quantidade</a:t>
+            </a:r>
+            <a:r>
+              <a:rPr lang="en-US" dirty="0" smtClean="0"/>
+              <a:t> de </a:t>
+            </a:r>
+            <a:r>
+              <a:rPr lang="en-US" dirty="0" err="1" smtClean="0"/>
+              <a:t>elementos</a:t>
+            </a:r>
+            <a:r>
+              <a:rPr lang="en-US" dirty="0" smtClean="0"/>
+              <a:t> de um array </a:t>
+            </a:r>
+            <a:r>
+              <a:rPr lang="en-US" dirty="0" err="1" smtClean="0"/>
+              <a:t>sempre</a:t>
+            </a:r>
+            <a:r>
+              <a:rPr lang="en-US" dirty="0" smtClean="0"/>
+              <a:t> </a:t>
+            </a:r>
+            <a:r>
+              <a:rPr lang="en-US" dirty="0" err="1" smtClean="0"/>
+              <a:t>deve</a:t>
+            </a:r>
+            <a:r>
+              <a:rPr lang="en-US" dirty="0" smtClean="0"/>
+              <a:t> </a:t>
+            </a:r>
+            <a:r>
+              <a:rPr lang="en-US" dirty="0" err="1" smtClean="0"/>
+              <a:t>ser</a:t>
+            </a:r>
+            <a:r>
+              <a:rPr lang="en-US" dirty="0" smtClean="0"/>
+              <a:t> um valor </a:t>
+            </a:r>
+            <a:r>
+              <a:rPr lang="en-US" dirty="0" err="1" smtClean="0"/>
+              <a:t>inteiro</a:t>
+            </a:r>
+            <a:r>
+              <a:rPr lang="en-US" dirty="0" smtClean="0"/>
+              <a:t>.</a:t>
+            </a:r>
+          </a:p>
+          <a:p>
+            <a:r>
+              <a:rPr lang="en-US" dirty="0" smtClean="0"/>
+              <a:t>O </a:t>
+            </a:r>
+            <a:r>
+              <a:rPr lang="en-US" dirty="0" err="1" smtClean="0"/>
+              <a:t>comprimento</a:t>
+            </a:r>
+            <a:r>
+              <a:rPr lang="en-US" dirty="0" smtClean="0"/>
+              <a:t> de um array </a:t>
+            </a:r>
+            <a:r>
+              <a:rPr lang="en-US" dirty="0" err="1" smtClean="0"/>
+              <a:t>é</a:t>
+            </a:r>
+            <a:r>
+              <a:rPr lang="en-US" dirty="0" smtClean="0"/>
+              <a:t> dado </a:t>
+            </a:r>
+            <a:r>
+              <a:rPr lang="en-US" dirty="0" err="1" smtClean="0"/>
+              <a:t>pelo</a:t>
+            </a:r>
+            <a:r>
+              <a:rPr lang="en-US" dirty="0" smtClean="0"/>
+              <a:t> </a:t>
+            </a:r>
+            <a:r>
+              <a:rPr lang="en-US" dirty="0" err="1" smtClean="0"/>
+              <a:t>método</a:t>
+            </a:r>
+            <a:r>
+              <a:rPr lang="en-US" dirty="0" smtClean="0"/>
+              <a:t> </a:t>
+            </a:r>
+            <a:r>
+              <a:rPr lang="en-US" b="1" dirty="0" smtClean="0"/>
+              <a:t>length</a:t>
+            </a:r>
+            <a:r>
+              <a:rPr lang="en-US" dirty="0" smtClean="0"/>
+              <a:t>;</a:t>
+            </a:r>
+            <a:endParaRPr lang="en-US" dirty="0"/>
+          </a:p>
+        </p:txBody>
+      </p:sp>
+    </p:spTree>
+    <p:extLst>
+      <p:ext uri="{BB962C8B-B14F-4D97-AF65-F5344CB8AC3E}">
+        <p14:creationId xmlns:p14="http://schemas.microsoft.com/office/powerpoint/2010/main" val="2959473075"/>
+      </p:ext>
+    </p:extLst>
+  </p:cSld>
+  <p:clrMapOvr>
+    <a:masterClrMapping/>
+  </p:clrMapOvr>
+</p:sld>
+</file>
+
+<file path=ppt/slides/slide47.xml><?xml version="1.0" encoding="utf-8"?>
+<p:sld xmlns:a="http://schemas.openxmlformats.org/drawingml/2006/main" xmlns:r="http://schemas.openxmlformats.org/officeDocument/2006/relationships" xmlns:p="http://schemas.openxmlformats.org/presentationml/2006/main">
+  <p:cSld>
+    <p:spTree>
+      <p:nvGrpSpPr>
+        <p:cNvPr id="1" name=""/>
+        <p:cNvGrpSpPr/>
+        <p:nvPr/>
+      </p:nvGrpSpPr>
+      <p:grpSpPr>
+        <a:xfrm>
+          <a:off x="0" y="0"/>
+          <a:ext cx="0" cy="0"/>
+          <a:chOff x="0" y="0"/>
+          <a:chExt cx="0" cy="0"/>
+        </a:xfrm>
+      </p:grpSpPr>
+      <p:sp>
+        <p:nvSpPr>
+          <p:cNvPr id="2" name="Title 1"/>
+          <p:cNvSpPr>
+            <a:spLocks noGrp="1"/>
+          </p:cNvSpPr>
+          <p:nvPr>
+            <p:ph type="title"/>
+          </p:nvPr>
+        </p:nvSpPr>
+        <p:spPr/>
+        <p:txBody>
+          <a:bodyPr/>
+          <a:lstStyle/>
+          <a:p>
+            <a:r>
+              <a:rPr lang="en-US" dirty="0" err="1" smtClean="0"/>
+              <a:t>Vetores</a:t>
+            </a:r>
+            <a:r>
+              <a:rPr lang="en-US" dirty="0" smtClean="0"/>
+              <a:t> e </a:t>
+            </a:r>
+            <a:r>
+              <a:rPr lang="en-US" dirty="0" err="1" smtClean="0"/>
+              <a:t>Matrizes</a:t>
+            </a:r>
+            <a:endParaRPr lang="en-US" dirty="0"/>
+          </a:p>
+        </p:txBody>
+      </p:sp>
+      <p:pic>
+        <p:nvPicPr>
+          <p:cNvPr id="4" name="Picture 3"/>
+          <p:cNvPicPr>
+            <a:picLocks noChangeAspect="1"/>
+          </p:cNvPicPr>
+          <p:nvPr/>
+        </p:nvPicPr>
+        <p:blipFill>
+          <a:blip r:embed="rId2"/>
+          <a:stretch>
+            <a:fillRect/>
+          </a:stretch>
+        </p:blipFill>
+        <p:spPr>
+          <a:xfrm>
+            <a:off x="310078" y="1803400"/>
+            <a:ext cx="8554814" cy="3397940"/>
+          </a:xfrm>
+          <a:prstGeom prst="rect">
+            <a:avLst/>
+          </a:prstGeom>
+        </p:spPr>
+      </p:pic>
+    </p:spTree>
+    <p:extLst>
+      <p:ext uri="{BB962C8B-B14F-4D97-AF65-F5344CB8AC3E}">
+        <p14:creationId xmlns:p14="http://schemas.microsoft.com/office/powerpoint/2010/main" val="2584648254"/>
+      </p:ext>
+    </p:extLst>
+  </p:cSld>
+  <p:clrMapOvr>
+    <a:masterClrMapping/>
+  </p:clrMapOvr>
+</p:sld>
+</file>
+
+<file path=ppt/slides/slide48.xml><?xml version="1.0" encoding="utf-8"?>
+<p:sld xmlns:a="http://schemas.openxmlformats.org/drawingml/2006/main" xmlns:r="http://schemas.openxmlformats.org/officeDocument/2006/relationships" xmlns:p="http://schemas.openxmlformats.org/presentationml/2006/main">
+  <p:cSld>
+    <p:spTree>
+      <p:nvGrpSpPr>
+        <p:cNvPr id="1" name=""/>
+        <p:cNvGrpSpPr/>
+        <p:nvPr/>
+      </p:nvGrpSpPr>
+      <p:grpSpPr>
+        <a:xfrm>
+          <a:off x="0" y="0"/>
+          <a:ext cx="0" cy="0"/>
+          <a:chOff x="0" y="0"/>
+          <a:chExt cx="0" cy="0"/>
+        </a:xfrm>
+      </p:grpSpPr>
+      <p:sp>
+        <p:nvSpPr>
+          <p:cNvPr id="2" name="Title 1"/>
+          <p:cNvSpPr>
+            <a:spLocks noGrp="1"/>
+          </p:cNvSpPr>
+          <p:nvPr>
+            <p:ph type="title"/>
+          </p:nvPr>
+        </p:nvSpPr>
+        <p:spPr/>
+        <p:txBody>
+          <a:bodyPr/>
+          <a:lstStyle/>
+          <a:p>
+            <a:r>
+              <a:rPr lang="en-US" dirty="0" err="1" smtClean="0"/>
+              <a:t>Vetores</a:t>
+            </a:r>
+            <a:r>
+              <a:rPr lang="en-US" dirty="0" smtClean="0"/>
+              <a:t> e </a:t>
+            </a:r>
+            <a:r>
+              <a:rPr lang="en-US" dirty="0" err="1" smtClean="0"/>
+              <a:t>Matrizes</a:t>
+            </a:r>
+            <a:endParaRPr lang="en-US" dirty="0"/>
+          </a:p>
+        </p:txBody>
+      </p:sp>
+      <p:sp>
+        <p:nvSpPr>
+          <p:cNvPr id="3" name="Content Placeholder 2"/>
+          <p:cNvSpPr>
+            <a:spLocks noGrp="1"/>
+          </p:cNvSpPr>
+          <p:nvPr>
+            <p:ph idx="1"/>
+          </p:nvPr>
+        </p:nvSpPr>
+        <p:spPr/>
+        <p:txBody>
+          <a:bodyPr/>
+          <a:lstStyle/>
+          <a:p>
+            <a:r>
+              <a:rPr lang="en-US" dirty="0" smtClean="0"/>
+              <a:t>Arrays de </a:t>
+            </a:r>
+            <a:r>
+              <a:rPr lang="en-US" dirty="0" err="1" smtClean="0"/>
+              <a:t>tipos</a:t>
+            </a:r>
+            <a:r>
+              <a:rPr lang="en-US" dirty="0" smtClean="0"/>
+              <a:t> </a:t>
+            </a:r>
+            <a:r>
+              <a:rPr lang="en-US" dirty="0" err="1" smtClean="0"/>
+              <a:t>primitivos</a:t>
+            </a:r>
+            <a:r>
+              <a:rPr lang="en-US" dirty="0" smtClean="0"/>
+              <a:t> de dados </a:t>
+            </a:r>
+            <a:r>
+              <a:rPr lang="en-US" dirty="0" err="1" smtClean="0"/>
+              <a:t>s</a:t>
+            </a:r>
+            <a:r>
+              <a:rPr lang="en-US" dirty="0" err="1" smtClean="0"/>
+              <a:t>ão</a:t>
+            </a:r>
+            <a:r>
+              <a:rPr lang="en-US" dirty="0" smtClean="0"/>
+              <a:t> </a:t>
+            </a:r>
+            <a:r>
+              <a:rPr lang="en-US" dirty="0" err="1" smtClean="0"/>
+              <a:t>inicializados</a:t>
+            </a:r>
+            <a:r>
+              <a:rPr lang="en-US" dirty="0"/>
+              <a:t> </a:t>
+            </a:r>
+            <a:r>
+              <a:rPr lang="en-US" dirty="0" smtClean="0"/>
+              <a:t>no </a:t>
+            </a:r>
+            <a:r>
+              <a:rPr lang="en-US" dirty="0" err="1" smtClean="0"/>
+              <a:t>momento</a:t>
+            </a:r>
+            <a:r>
+              <a:rPr lang="en-US" dirty="0" smtClean="0"/>
+              <a:t> de </a:t>
+            </a:r>
+            <a:r>
+              <a:rPr lang="en-US" dirty="0" err="1" smtClean="0"/>
+              <a:t>sua</a:t>
+            </a:r>
+            <a:r>
+              <a:rPr lang="en-US" dirty="0" smtClean="0"/>
+              <a:t> </a:t>
+            </a:r>
+            <a:r>
+              <a:rPr lang="en-US" dirty="0" err="1" smtClean="0"/>
+              <a:t>criação</a:t>
+            </a:r>
+            <a:r>
+              <a:rPr lang="en-US" dirty="0" smtClean="0"/>
+              <a:t>;</a:t>
+            </a:r>
+          </a:p>
+          <a:p>
+            <a:r>
+              <a:rPr lang="en-US" dirty="0" smtClean="0"/>
+              <a:t>Arrays de </a:t>
+            </a:r>
+            <a:r>
+              <a:rPr lang="en-US" dirty="0" err="1" smtClean="0"/>
+              <a:t>tipos</a:t>
+            </a:r>
+            <a:r>
+              <a:rPr lang="en-US" dirty="0" smtClean="0"/>
+              <a:t> </a:t>
+            </a:r>
+            <a:r>
+              <a:rPr lang="en-US" dirty="0" err="1" smtClean="0"/>
+              <a:t>agregados</a:t>
+            </a:r>
+            <a:r>
+              <a:rPr lang="en-US" dirty="0"/>
+              <a:t> </a:t>
+            </a:r>
+            <a:r>
+              <a:rPr lang="en-US" dirty="0" smtClean="0"/>
+              <a:t>de dados </a:t>
+            </a:r>
+            <a:r>
+              <a:rPr lang="en-US" dirty="0" err="1" smtClean="0"/>
+              <a:t>necessitam</a:t>
+            </a:r>
+            <a:r>
+              <a:rPr lang="en-US" dirty="0" smtClean="0"/>
+              <a:t> de </a:t>
+            </a:r>
+            <a:r>
+              <a:rPr lang="en-US" dirty="0" err="1" smtClean="0"/>
+              <a:t>inicialização</a:t>
+            </a:r>
+            <a:r>
+              <a:rPr lang="en-US" dirty="0" smtClean="0"/>
+              <a:t> </a:t>
+            </a:r>
+            <a:r>
+              <a:rPr lang="en-US" dirty="0" err="1" smtClean="0"/>
+              <a:t>explícita</a:t>
+            </a:r>
+            <a:r>
+              <a:rPr lang="en-US" dirty="0" smtClean="0"/>
+              <a:t>;</a:t>
+            </a:r>
+          </a:p>
+        </p:txBody>
+      </p:sp>
+    </p:spTree>
+    <p:extLst>
+      <p:ext uri="{BB962C8B-B14F-4D97-AF65-F5344CB8AC3E}">
+        <p14:creationId xmlns:p14="http://schemas.microsoft.com/office/powerpoint/2010/main" val="3192676589"/>
+      </p:ext>
+    </p:extLst>
+  </p:cSld>
+  <p:clrMapOvr>
+    <a:masterClrMapping/>
+  </p:clrMapOvr>
+</p:sld>
+</file>
+
+<file path=ppt/slides/slide49.xml><?xml version="1.0" encoding="utf-8"?>
+<p:sld xmlns:a="http://schemas.openxmlformats.org/drawingml/2006/main" xmlns:r="http://schemas.openxmlformats.org/officeDocument/2006/relationships" xmlns:p="http://schemas.openxmlformats.org/presentationml/2006/main">
+  <p:cSld>
+    <p:spTree>
+      <p:nvGrpSpPr>
+        <p:cNvPr id="1" name=""/>
+        <p:cNvGrpSpPr/>
+        <p:nvPr/>
+      </p:nvGrpSpPr>
+      <p:grpSpPr>
+        <a:xfrm>
+          <a:off x="0" y="0"/>
+          <a:ext cx="0" cy="0"/>
+          <a:chOff x="0" y="0"/>
+          <a:chExt cx="0" cy="0"/>
+        </a:xfrm>
+      </p:grpSpPr>
+      <p:sp>
+        <p:nvSpPr>
+          <p:cNvPr id="2" name="Title 1"/>
+          <p:cNvSpPr>
+            <a:spLocks noGrp="1"/>
+          </p:cNvSpPr>
+          <p:nvPr>
+            <p:ph type="title"/>
+          </p:nvPr>
+        </p:nvSpPr>
+        <p:spPr/>
+        <p:txBody>
+          <a:bodyPr/>
+          <a:lstStyle/>
+          <a:p>
+            <a:r>
+              <a:rPr lang="en-US" dirty="0" err="1" smtClean="0"/>
+              <a:t>Vetores</a:t>
+            </a:r>
+            <a:r>
+              <a:rPr lang="en-US" dirty="0" smtClean="0"/>
+              <a:t> e </a:t>
+            </a:r>
+            <a:r>
+              <a:rPr lang="en-US" dirty="0" err="1" smtClean="0"/>
+              <a:t>Matrizes</a:t>
+            </a:r>
+            <a:endParaRPr lang="en-US" dirty="0"/>
+          </a:p>
+        </p:txBody>
+      </p:sp>
+      <p:sp>
+        <p:nvSpPr>
+          <p:cNvPr id="3" name="Content Placeholder 2"/>
+          <p:cNvSpPr>
+            <a:spLocks noGrp="1"/>
+          </p:cNvSpPr>
+          <p:nvPr>
+            <p:ph idx="1"/>
+          </p:nvPr>
+        </p:nvSpPr>
+        <p:spPr/>
+        <p:txBody>
+          <a:bodyPr/>
+          <a:lstStyle/>
+          <a:p>
+            <a:r>
+              <a:rPr lang="en-US" dirty="0" err="1" smtClean="0"/>
+              <a:t>Quando</a:t>
+            </a:r>
+            <a:r>
+              <a:rPr lang="en-US" dirty="0" smtClean="0"/>
+              <a:t> </a:t>
+            </a:r>
+            <a:r>
+              <a:rPr lang="en-US" dirty="0" err="1" smtClean="0"/>
+              <a:t>declaramos</a:t>
+            </a:r>
+            <a:r>
+              <a:rPr lang="en-US" dirty="0" smtClean="0"/>
+              <a:t> um array </a:t>
+            </a:r>
+            <a:r>
+              <a:rPr lang="en-US" dirty="0" err="1" smtClean="0"/>
+              <a:t>atrav</a:t>
+            </a:r>
+            <a:r>
+              <a:rPr lang="en-US" dirty="0" err="1" smtClean="0"/>
+              <a:t>és</a:t>
+            </a:r>
+            <a:r>
+              <a:rPr lang="en-US" dirty="0" smtClean="0"/>
+              <a:t> do </a:t>
+            </a:r>
+            <a:r>
+              <a:rPr lang="en-US" dirty="0" err="1" smtClean="0"/>
+              <a:t>símbolo</a:t>
+            </a:r>
+            <a:r>
+              <a:rPr lang="en-US" dirty="0" smtClean="0"/>
+              <a:t> </a:t>
+            </a:r>
+            <a:r>
+              <a:rPr lang="en-US" b="1" dirty="0" smtClean="0"/>
+              <a:t>[]</a:t>
+            </a:r>
+            <a:r>
+              <a:rPr lang="en-US" dirty="0" smtClean="0"/>
+              <a:t>, </a:t>
+            </a:r>
+            <a:r>
+              <a:rPr lang="en-US" dirty="0" err="1" smtClean="0"/>
+              <a:t>estamos</a:t>
+            </a:r>
+            <a:r>
+              <a:rPr lang="en-US" dirty="0" smtClean="0"/>
+              <a:t> de </a:t>
+            </a:r>
+            <a:r>
+              <a:rPr lang="en-US" dirty="0" err="1" smtClean="0"/>
+              <a:t>fato</a:t>
+            </a:r>
+            <a:r>
+              <a:rPr lang="en-US" dirty="0" smtClean="0"/>
+              <a:t> </a:t>
+            </a:r>
+            <a:r>
+              <a:rPr lang="en-US" dirty="0" err="1" smtClean="0"/>
+              <a:t>criando</a:t>
+            </a:r>
+            <a:r>
+              <a:rPr lang="en-US" dirty="0" smtClean="0"/>
+              <a:t> um array </a:t>
+            </a:r>
+            <a:r>
+              <a:rPr lang="en-US" dirty="0" err="1" smtClean="0"/>
+              <a:t>unidimensional</a:t>
+            </a:r>
+            <a:r>
+              <a:rPr lang="en-US" dirty="0" smtClean="0"/>
+              <a:t>(</a:t>
+            </a:r>
+            <a:r>
+              <a:rPr lang="en-US" dirty="0" err="1" smtClean="0"/>
+              <a:t>vetor</a:t>
+            </a:r>
+            <a:r>
+              <a:rPr lang="en-US" smtClean="0"/>
+              <a:t>);</a:t>
+            </a:r>
+            <a:endParaRPr lang="en-US" dirty="0" smtClean="0"/>
+          </a:p>
+          <a:p>
+            <a:r>
+              <a:rPr lang="en-US" dirty="0" err="1" smtClean="0"/>
+              <a:t>Além</a:t>
+            </a:r>
+            <a:r>
+              <a:rPr lang="en-US" dirty="0" smtClean="0"/>
+              <a:t> de </a:t>
+            </a:r>
+            <a:r>
+              <a:rPr lang="en-US" dirty="0" err="1" smtClean="0"/>
+              <a:t>vetores</a:t>
+            </a:r>
+            <a:r>
+              <a:rPr lang="en-US" dirty="0" smtClean="0"/>
+              <a:t>, a </a:t>
+            </a:r>
+            <a:r>
+              <a:rPr lang="en-US" dirty="0" err="1" smtClean="0"/>
+              <a:t>linguagem</a:t>
+            </a:r>
+            <a:r>
+              <a:rPr lang="en-US" dirty="0" smtClean="0"/>
+              <a:t> java </a:t>
+            </a:r>
+            <a:r>
+              <a:rPr lang="en-US" dirty="0" err="1" smtClean="0"/>
+              <a:t>permite</a:t>
+            </a:r>
+            <a:r>
+              <a:rPr lang="en-US" dirty="0" smtClean="0"/>
+              <a:t> a </a:t>
+            </a:r>
+            <a:r>
+              <a:rPr lang="en-US" dirty="0" err="1" smtClean="0"/>
+              <a:t>declaração</a:t>
+            </a:r>
+            <a:r>
+              <a:rPr lang="en-US" dirty="0" smtClean="0"/>
+              <a:t> de arrays n-</a:t>
+            </a:r>
+            <a:r>
+              <a:rPr lang="en-US" dirty="0" err="1" smtClean="0"/>
+              <a:t>dimensionais</a:t>
+            </a:r>
+            <a:r>
+              <a:rPr lang="en-US" dirty="0"/>
+              <a:t>;</a:t>
+            </a:r>
+            <a:endParaRPr lang="en-US" dirty="0"/>
+          </a:p>
+        </p:txBody>
+      </p:sp>
+    </p:spTree>
+    <p:extLst>
+      <p:ext uri="{BB962C8B-B14F-4D97-AF65-F5344CB8AC3E}">
+        <p14:creationId xmlns:p14="http://schemas.microsoft.com/office/powerpoint/2010/main" val="3299305244"/>
+      </p:ext>
+    </p:extLst>
+  </p:cSld>
+  <p:clrMapOvr>
+    <a:masterClrMapping/>
+  </p:clrMapOvr>
 </p:sld>
 </file>
 

</xml_diff>

<commit_message>
Novos exercicios, apostilas, exemplos
</commit_message>
<xml_diff>
--- a/Documentos/Curso Java.pptx
+++ b/Documentos/Curso Java.pptx
@@ -240,7 +240,7 @@
           <a:p>
             <a:fld id="{E2B913E8-0330-B643-A20B-1A6E83DAE541}" type="datetimeFigureOut">
               <a:rPr lang="en-US" smtClean="0"/>
-              <a:t>17/11/14</a:t>
+              <a:t>20/11/14</a:t>
             </a:fld>
             <a:endParaRPr lang="en-US"/>
           </a:p>
@@ -790,7 +790,7 @@
             <a:fld id="{9EB5ECD5-515E-4817-8A06-1D2ED2C83850}" type="datetime4">
               <a:rPr lang="en-US" smtClean="0"/>
               <a:pPr/>
-              <a:t>November 17, 2014</a:t>
+              <a:t>November 20, 2014</a:t>
             </a:fld>
             <a:endParaRPr lang="en-US"/>
           </a:p>
@@ -962,7 +962,7 @@
             <a:fld id="{BA5B59F4-DDCB-41FF-83F5-A48440F36FA7}" type="datetime4">
               <a:rPr lang="en-US" smtClean="0"/>
               <a:pPr/>
-              <a:t>November 17, 2014</a:t>
+              <a:t>November 20, 2014</a:t>
             </a:fld>
             <a:endParaRPr lang="en-US"/>
           </a:p>
@@ -2082,7 +2082,7 @@
             <a:fld id="{48056348-D703-428C-A1C4-7D6796EF5F41}" type="datetime4">
               <a:rPr lang="en-US" smtClean="0"/>
               <a:pPr/>
-              <a:t>November 17, 2014</a:t>
+              <a:t>November 20, 2014</a:t>
             </a:fld>
             <a:endParaRPr lang="en-US"/>
           </a:p>
@@ -3192,7 +3192,7 @@
             <a:fld id="{732D1919-1B5F-4141-B613-3E5C6008A186}" type="datetime4">
               <a:rPr lang="en-US" smtClean="0"/>
               <a:pPr/>
-              <a:t>November 17, 2014</a:t>
+              <a:t>November 20, 2014</a:t>
             </a:fld>
             <a:endParaRPr lang="en-US"/>
           </a:p>
@@ -3440,7 +3440,7 @@
             <a:fld id="{BAD22427-B1DD-49E6-9F05-DE0F1467D7DC}" type="datetime4">
               <a:rPr lang="en-US" smtClean="0"/>
               <a:pPr/>
-              <a:t>November 17, 2014</a:t>
+              <a:t>November 20, 2014</a:t>
             </a:fld>
             <a:endParaRPr lang="en-US"/>
           </a:p>
@@ -3730,7 +3730,7 @@
             <a:fld id="{BBCCA7B5-8BC9-491C-A887-7C3E7ED947D8}" type="datetime4">
               <a:rPr lang="en-US" smtClean="0"/>
               <a:pPr/>
-              <a:t>November 17, 2014</a:t>
+              <a:t>November 20, 2014</a:t>
             </a:fld>
             <a:endParaRPr lang="en-US"/>
           </a:p>
@@ -4154,7 +4154,7 @@
             <a:fld id="{BDA18ED0-40F2-434C-A848-B92581875164}" type="datetime4">
               <a:rPr lang="en-US" smtClean="0"/>
               <a:pPr/>
-              <a:t>November 17, 2014</a:t>
+              <a:t>November 20, 2014</a:t>
             </a:fld>
             <a:endParaRPr lang="en-US"/>
           </a:p>
@@ -4274,7 +4274,7 @@
             <a:fld id="{7855437F-F4F9-44A9-B4D3-9191CA04E889}" type="datetime4">
               <a:rPr lang="en-US" smtClean="0"/>
               <a:pPr/>
-              <a:t>November 17, 2014</a:t>
+              <a:t>November 20, 2014</a:t>
             </a:fld>
             <a:endParaRPr lang="en-US"/>
           </a:p>
@@ -4371,7 +4371,7 @@
             <a:fld id="{39A24E59-01D0-4537-B876-7E5EC75B028D}" type="datetime4">
               <a:rPr lang="en-US" smtClean="0"/>
               <a:pPr/>
-              <a:t>November 17, 2014</a:t>
+              <a:t>November 20, 2014</a:t>
             </a:fld>
             <a:endParaRPr lang="en-US"/>
           </a:p>
@@ -4650,7 +4650,7 @@
             <a:fld id="{655A2E49-18A1-40BC-BA5D-5A2EC8FDDF15}" type="datetime4">
               <a:rPr lang="en-US" smtClean="0"/>
               <a:pPr/>
-              <a:t>November 17, 2014</a:t>
+              <a:t>November 20, 2014</a:t>
             </a:fld>
             <a:endParaRPr lang="en-US"/>
           </a:p>
@@ -4905,7 +4905,7 @@
             <a:fld id="{52983DA4-3B24-449B-95CA-514EB7E30A99}" type="datetime4">
               <a:rPr lang="en-US" smtClean="0"/>
               <a:pPr/>
-              <a:t>November 17, 2014</a:t>
+              <a:t>November 20, 2014</a:t>
             </a:fld>
             <a:endParaRPr lang="en-US"/>
           </a:p>
@@ -5120,7 +5120,7 @@
             <a:fld id="{942120D2-3948-4F8F-BE5D-E7E7D97880B2}" type="datetime4">
               <a:rPr lang="en-US" smtClean="0"/>
               <a:pPr/>
-              <a:t>November 17, 2014</a:t>
+              <a:t>November 20, 2014</a:t>
             </a:fld>
             <a:endParaRPr lang="en-US" dirty="0" err="1"/>
           </a:p>
@@ -8880,11 +8880,7 @@
             </a:r>
             <a:r>
               <a:rPr lang="en-US" dirty="0" err="1" smtClean="0"/>
-              <a:t>Aritm</a:t>
-            </a:r>
-            <a:r>
-              <a:rPr lang="en-US" dirty="0" err="1" smtClean="0"/>
-              <a:t>éticos</a:t>
+              <a:t>Aritméticos</a:t>
             </a:r>
             <a:endParaRPr lang="en-US" dirty="0"/>
           </a:p>
@@ -10655,11 +10651,7 @@
           <a:p>
             <a:r>
               <a:rPr lang="en-US" dirty="0" err="1" smtClean="0"/>
-              <a:t>Promo</a:t>
-            </a:r>
-            <a:r>
-              <a:rPr lang="en-US" dirty="0" err="1" smtClean="0"/>
-              <a:t>ção</a:t>
+              <a:t>Promoção</a:t>
             </a:r>
             <a:r>
               <a:rPr lang="en-US" dirty="0" smtClean="0"/>
@@ -10700,11 +10692,7 @@
             </a:r>
             <a:r>
               <a:rPr lang="en-US" dirty="0" err="1" smtClean="0"/>
-              <a:t>n</a:t>
-            </a:r>
-            <a:r>
-              <a:rPr lang="en-US" dirty="0" err="1" smtClean="0"/>
-              <a:t>ão</a:t>
+              <a:t>não</a:t>
             </a:r>
             <a:r>
               <a:rPr lang="en-US" dirty="0" smtClean="0"/>
@@ -11325,11 +11313,7 @@
           <a:p>
             <a:r>
               <a:rPr lang="en-US" dirty="0" err="1" smtClean="0"/>
-              <a:t>Promo</a:t>
-            </a:r>
-            <a:r>
-              <a:rPr lang="en-US" dirty="0" err="1" smtClean="0"/>
-              <a:t>ção</a:t>
+              <a:t>Promoção</a:t>
             </a:r>
             <a:r>
               <a:rPr lang="en-US" dirty="0" smtClean="0"/>
@@ -11410,11 +11394,7 @@
           <a:p>
             <a:r>
               <a:rPr lang="en-US" dirty="0" err="1" smtClean="0"/>
-              <a:t>Ramifica</a:t>
-            </a:r>
-            <a:r>
-              <a:rPr lang="en-US" dirty="0" err="1" smtClean="0"/>
-              <a:t>ção</a:t>
+              <a:t>Ramificação</a:t>
             </a:r>
             <a:r>
               <a:rPr lang="en-US" dirty="0" smtClean="0"/>
@@ -11455,11 +11435,7 @@
             </a:r>
             <a:r>
               <a:rPr lang="en-US" dirty="0" err="1" smtClean="0"/>
-              <a:t>b</a:t>
-            </a:r>
-            <a:r>
-              <a:rPr lang="en-US" dirty="0" err="1" smtClean="0"/>
-              <a:t>ásica</a:t>
+              <a:t>básica</a:t>
             </a:r>
             <a:r>
               <a:rPr lang="en-US" dirty="0" smtClean="0"/>
@@ -11821,11 +11797,7 @@
           <a:p>
             <a:r>
               <a:rPr lang="en-US" dirty="0" err="1" smtClean="0"/>
-              <a:t>Ramifica</a:t>
-            </a:r>
-            <a:r>
-              <a:rPr lang="en-US" dirty="0" err="1" smtClean="0"/>
-              <a:t>ções</a:t>
+              <a:t>Ramificações</a:t>
             </a:r>
             <a:r>
               <a:rPr lang="en-US" dirty="0" smtClean="0"/>
@@ -12083,11 +12055,7 @@
           <a:p>
             <a:r>
               <a:rPr lang="en-US" dirty="0" err="1" smtClean="0"/>
-              <a:t>Ramifica</a:t>
-            </a:r>
-            <a:r>
-              <a:rPr lang="en-US" dirty="0" err="1" smtClean="0"/>
-              <a:t>ções</a:t>
+              <a:t>Ramificações</a:t>
             </a:r>
             <a:r>
               <a:rPr lang="en-US" dirty="0" smtClean="0"/>
@@ -12302,11 +12270,7 @@
             </a:r>
             <a:r>
               <a:rPr lang="en-US" dirty="0" err="1" smtClean="0"/>
-              <a:t>est</a:t>
-            </a:r>
-            <a:r>
-              <a:rPr lang="en-US" dirty="0" err="1" smtClean="0"/>
-              <a:t>ão</a:t>
+              <a:t>estão</a:t>
             </a:r>
             <a:r>
               <a:rPr lang="en-US" dirty="0" smtClean="0"/>
@@ -12496,11 +12460,7 @@
             </a:r>
             <a:r>
               <a:rPr lang="en-US" dirty="0" err="1" smtClean="0"/>
-              <a:t>declara</a:t>
-            </a:r>
-            <a:r>
-              <a:rPr lang="en-US" dirty="0" err="1" smtClean="0"/>
-              <a:t>ção</a:t>
+              <a:t>declaração</a:t>
             </a:r>
             <a:r>
               <a:rPr lang="en-US" dirty="0" smtClean="0"/>
@@ -12732,11 +12692,6 @@
               </a:rPr>
               <a:t>}</a:t>
             </a:r>
-            <a:endParaRPr lang="en-US" dirty="0">
-              <a:solidFill>
-                <a:schemeClr val="tx2"/>
-              </a:solidFill>
-            </a:endParaRPr>
           </a:p>
         </p:txBody>
       </p:sp>
@@ -12927,11 +12882,7 @@
             </a:r>
             <a:r>
               <a:rPr lang="en-US" dirty="0" err="1" smtClean="0"/>
-              <a:t>vers</a:t>
-            </a:r>
-            <a:r>
-              <a:rPr lang="en-US" dirty="0" err="1" smtClean="0"/>
-              <a:t>ão</a:t>
+              <a:t>versão</a:t>
             </a:r>
             <a:r>
               <a:rPr lang="en-US" dirty="0" smtClean="0"/>
@@ -13248,11 +13199,6 @@
               </a:rPr>
               <a:t>}</a:t>
             </a:r>
-            <a:endParaRPr lang="en-US" dirty="0">
-              <a:solidFill>
-                <a:schemeClr val="tx2"/>
-              </a:solidFill>
-            </a:endParaRPr>
           </a:p>
         </p:txBody>
       </p:sp>
@@ -13429,11 +13375,7 @@
             </a:r>
             <a:r>
               <a:rPr lang="en-US" dirty="0" err="1" smtClean="0"/>
-              <a:t>declara</a:t>
-            </a:r>
-            <a:r>
-              <a:rPr lang="en-US" dirty="0" err="1" smtClean="0"/>
-              <a:t>ção</a:t>
+              <a:t>declaração</a:t>
             </a:r>
             <a:r>
               <a:rPr lang="en-US" dirty="0" smtClean="0"/>
@@ -13682,11 +13624,6 @@
               </a:rPr>
               <a:t>}</a:t>
             </a:r>
-            <a:endParaRPr lang="en-US" dirty="0">
-              <a:solidFill>
-                <a:srgbClr val="1F497D"/>
-              </a:solidFill>
-            </a:endParaRPr>
           </a:p>
         </p:txBody>
       </p:sp>
@@ -14525,11 +14462,7 @@
             </a:r>
             <a:r>
               <a:rPr lang="en-US" dirty="0" err="1" smtClean="0"/>
-              <a:t>repeti</a:t>
-            </a:r>
-            <a:r>
-              <a:rPr lang="en-US" dirty="0" err="1" smtClean="0"/>
-              <a:t>ção</a:t>
+              <a:t>repetição</a:t>
             </a:r>
             <a:r>
               <a:rPr lang="en-US" dirty="0" smtClean="0"/>
@@ -14975,11 +14908,7 @@
             </a:r>
             <a:r>
               <a:rPr lang="en-US" dirty="0" err="1" smtClean="0"/>
-              <a:t>s</a:t>
-            </a:r>
-            <a:r>
-              <a:rPr lang="en-US" dirty="0" err="1" smtClean="0"/>
-              <a:t>ão</a:t>
+              <a:t>são</a:t>
             </a:r>
             <a:r>
               <a:rPr lang="en-US" dirty="0" smtClean="0"/>
@@ -15411,11 +15340,7 @@
             </a:r>
             <a:r>
               <a:rPr lang="en-US" dirty="0" err="1" smtClean="0"/>
-              <a:t>m</a:t>
-            </a:r>
-            <a:r>
-              <a:rPr lang="en-US" dirty="0" err="1" smtClean="0"/>
-              <a:t>emória</a:t>
+              <a:t>memória</a:t>
             </a:r>
             <a:r>
               <a:rPr lang="en-US" dirty="0" smtClean="0"/>
@@ -15938,11 +15863,7 @@
             </a:r>
             <a:r>
               <a:rPr lang="en-US" dirty="0" err="1" smtClean="0"/>
-              <a:t>s</a:t>
-            </a:r>
-            <a:r>
-              <a:rPr lang="en-US" dirty="0" err="1" smtClean="0"/>
-              <a:t>ão</a:t>
+              <a:t>são</a:t>
             </a:r>
             <a:r>
               <a:rPr lang="en-US" dirty="0" smtClean="0"/>
@@ -16131,11 +16052,7 @@
             </a:r>
             <a:r>
               <a:rPr lang="en-US" dirty="0" err="1" smtClean="0"/>
-              <a:t>atrav</a:t>
-            </a:r>
-            <a:r>
-              <a:rPr lang="en-US" dirty="0" err="1" smtClean="0"/>
-              <a:t>és</a:t>
+              <a:t>através</a:t>
             </a:r>
             <a:r>
               <a:rPr lang="en-US" dirty="0" smtClean="0"/>
@@ -16248,7 +16165,6 @@
               <a:rPr lang="en-US" dirty="0"/>
               <a:t>;</a:t>
             </a:r>
-            <a:endParaRPr lang="en-US" dirty="0"/>
           </a:p>
         </p:txBody>
       </p:sp>

</xml_diff>

<commit_message>
Exercicios OO, apostilas e apresentacao adicionados
</commit_message>
<xml_diff>
--- a/Documentos/Curso Java.pptx
+++ b/Documentos/Curso Java.pptx
@@ -12202,6 +12202,13 @@
   <p:clrMapOvr>
     <a:masterClrMapping/>
   </p:clrMapOvr>
+  <p:timing>
+    <p:tnLst>
+      <p:par>
+        <p:cTn xmlns:p14="http://schemas.microsoft.com/office/powerpoint/2010/main" id="1" dur="indefinite" restart="never" nodeType="tmRoot"/>
+      </p:par>
+    </p:tnLst>
+  </p:timing>
 </p:sld>
 </file>
 
@@ -12388,6 +12395,13 @@
   <p:clrMapOvr>
     <a:masterClrMapping/>
   </p:clrMapOvr>
+  <p:timing>
+    <p:tnLst>
+      <p:par>
+        <p:cTn xmlns:p14="http://schemas.microsoft.com/office/powerpoint/2010/main" id="1" dur="indefinite" restart="never" nodeType="tmRoot"/>
+      </p:par>
+    </p:tnLst>
+  </p:timing>
 </p:sld>
 </file>
 
@@ -12611,7 +12625,55 @@
                   <a:schemeClr val="tx2"/>
                 </a:solidFill>
               </a:rPr>
-              <a:t> I = 0; I &lt; 10; </a:t>
+              <a:t> </a:t>
+            </a:r>
+            <a:r>
+              <a:rPr lang="en-US" dirty="0" err="1" smtClean="0">
+                <a:solidFill>
+                  <a:schemeClr val="tx2"/>
+                </a:solidFill>
+              </a:rPr>
+              <a:t>i</a:t>
+            </a:r>
+            <a:r>
+              <a:rPr lang="en-US" dirty="0" smtClean="0">
+                <a:solidFill>
+                  <a:schemeClr val="tx2"/>
+                </a:solidFill>
+              </a:rPr>
+              <a:t> </a:t>
+            </a:r>
+            <a:r>
+              <a:rPr lang="en-US" dirty="0" smtClean="0">
+                <a:solidFill>
+                  <a:schemeClr val="tx2"/>
+                </a:solidFill>
+              </a:rPr>
+              <a:t>= 0; </a:t>
+            </a:r>
+            <a:r>
+              <a:rPr lang="en-US" dirty="0" err="1">
+                <a:solidFill>
+                  <a:schemeClr val="tx2"/>
+                </a:solidFill>
+              </a:rPr>
+              <a:t>i</a:t>
+            </a:r>
+            <a:r>
+              <a:rPr lang="en-US" dirty="0" smtClean="0">
+                <a:solidFill>
+                  <a:schemeClr val="tx2"/>
+                </a:solidFill>
+              </a:rPr>
+              <a:t> </a:t>
+            </a:r>
+            <a:r>
+              <a:rPr lang="en-US" dirty="0" smtClean="0">
+                <a:solidFill>
+                  <a:schemeClr val="tx2"/>
+                </a:solidFill>
+              </a:rPr>
+              <a:t>&lt; 10; </a:t>
             </a:r>
             <a:r>
               <a:rPr lang="en-US" dirty="0" err="1" smtClean="0">
@@ -12705,6 +12767,13 @@
   <p:clrMapOvr>
     <a:masterClrMapping/>
   </p:clrMapOvr>
+  <p:timing>
+    <p:tnLst>
+      <p:par>
+        <p:cTn xmlns:p14="http://schemas.microsoft.com/office/powerpoint/2010/main" id="1" dur="indefinite" restart="never" nodeType="tmRoot"/>
+      </p:par>
+    </p:tnLst>
+  </p:timing>
 </p:sld>
 </file>
 
@@ -12790,6 +12859,13 @@
   <p:clrMapOvr>
     <a:masterClrMapping/>
   </p:clrMapOvr>
+  <p:timing>
+    <p:tnLst>
+      <p:par>
+        <p:cTn xmlns:p14="http://schemas.microsoft.com/office/powerpoint/2010/main" id="1" dur="indefinite" restart="never" nodeType="tmRoot"/>
+      </p:par>
+    </p:tnLst>
+  </p:timing>
 </p:sld>
 </file>
 
@@ -13212,6 +13288,13 @@
   <p:clrMapOvr>
     <a:masterClrMapping/>
   </p:clrMapOvr>
+  <p:timing>
+    <p:tnLst>
+      <p:par>
+        <p:cTn xmlns:p14="http://schemas.microsoft.com/office/powerpoint/2010/main" id="1" dur="indefinite" restart="never" nodeType="tmRoot"/>
+      </p:par>
+    </p:tnLst>
+  </p:timing>
 </p:sld>
 </file>
 
@@ -13303,6 +13386,13 @@
   <p:clrMapOvr>
     <a:masterClrMapping/>
   </p:clrMapOvr>
+  <p:timing>
+    <p:tnLst>
+      <p:par>
+        <p:cTn xmlns:p14="http://schemas.microsoft.com/office/powerpoint/2010/main" id="1" dur="indefinite" restart="never" nodeType="tmRoot"/>
+      </p:par>
+    </p:tnLst>
+  </p:timing>
 </p:sld>
 </file>
 
@@ -13503,14 +13593,6 @@
             </a:r>
             <a:r>
               <a:rPr lang="en-US" dirty="0" err="1" smtClean="0"/>
-              <a:t>não</a:t>
-            </a:r>
-            <a:r>
-              <a:rPr lang="en-US" dirty="0" smtClean="0"/>
-              <a:t> </a:t>
-            </a:r>
-            <a:r>
-              <a:rPr lang="en-US" dirty="0" err="1" smtClean="0"/>
               <a:t>seja</a:t>
             </a:r>
             <a:r>
@@ -13519,10 +13601,10 @@
             </a:r>
             <a:r>
               <a:rPr lang="en-US" dirty="0" err="1" smtClean="0"/>
-              <a:t>verdade</a:t>
-            </a:r>
-            <a:r>
-              <a:rPr lang="en-US" dirty="0"/>
+              <a:t>verdadeira</a:t>
+            </a:r>
+            <a:r>
+              <a:rPr lang="en-US" dirty="0" smtClean="0"/>
               <a:t>.</a:t>
             </a:r>
             <a:endParaRPr lang="en-US" dirty="0" smtClean="0"/>
@@ -13637,6 +13719,13 @@
   <p:clrMapOvr>
     <a:masterClrMapping/>
   </p:clrMapOvr>
+  <p:timing>
+    <p:tnLst>
+      <p:par>
+        <p:cTn xmlns:p14="http://schemas.microsoft.com/office/powerpoint/2010/main" id="1" dur="indefinite" restart="never" nodeType="tmRoot"/>
+      </p:par>
+    </p:tnLst>
+  </p:timing>
 </p:sld>
 </file>
 
@@ -13722,6 +13811,13 @@
   <p:clrMapOvr>
     <a:masterClrMapping/>
   </p:clrMapOvr>
+  <p:timing>
+    <p:tnLst>
+      <p:par>
+        <p:cTn xmlns:p14="http://schemas.microsoft.com/office/powerpoint/2010/main" id="1" dur="indefinite" restart="never" nodeType="tmRoot"/>
+      </p:par>
+    </p:tnLst>
+  </p:timing>
 </p:sld>
 </file>
 
@@ -14081,6 +14177,13 @@
   <p:clrMapOvr>
     <a:masterClrMapping/>
   </p:clrMapOvr>
+  <p:timing>
+    <p:tnLst>
+      <p:par>
+        <p:cTn xmlns:p14="http://schemas.microsoft.com/office/powerpoint/2010/main" id="1" dur="indefinite" restart="never" nodeType="tmRoot"/>
+      </p:par>
+    </p:tnLst>
+  </p:timing>
 </p:sld>
 </file>
 
@@ -14378,6 +14481,13 @@
   <p:clrMapOvr>
     <a:masterClrMapping/>
   </p:clrMapOvr>
+  <p:timing>
+    <p:tnLst>
+      <p:par>
+        <p:cTn xmlns:p14="http://schemas.microsoft.com/office/powerpoint/2010/main" id="1" dur="indefinite" restart="never" nodeType="tmRoot"/>
+      </p:par>
+    </p:tnLst>
+  </p:timing>
 </p:sld>
 </file>
 
@@ -14658,6 +14768,13 @@
   <p:clrMapOvr>
     <a:masterClrMapping/>
   </p:clrMapOvr>
+  <p:timing>
+    <p:tnLst>
+      <p:par>
+        <p:cTn xmlns:p14="http://schemas.microsoft.com/office/powerpoint/2010/main" id="1" dur="indefinite" restart="never" nodeType="tmRoot"/>
+      </p:par>
+    </p:tnLst>
+  </p:timing>
 </p:sld>
 </file>
 
@@ -14747,6 +14864,13 @@
   <p:clrMapOvr>
     <a:masterClrMapping/>
   </p:clrMapOvr>
+  <p:timing>
+    <p:tnLst>
+      <p:par>
+        <p:cTn xmlns:p14="http://schemas.microsoft.com/office/powerpoint/2010/main" id="1" dur="indefinite" restart="never" nodeType="tmRoot"/>
+      </p:par>
+    </p:tnLst>
+  </p:timing>
 </p:sld>
 </file>
 
@@ -14836,6 +14960,13 @@
   <p:clrMapOvr>
     <a:masterClrMapping/>
   </p:clrMapOvr>
+  <p:timing>
+    <p:tnLst>
+      <p:par>
+        <p:cTn xmlns:p14="http://schemas.microsoft.com/office/powerpoint/2010/main" id="1" dur="indefinite" restart="never" nodeType="tmRoot"/>
+      </p:par>
+    </p:tnLst>
+  </p:timing>
 </p:sld>
 </file>
 
@@ -15181,6 +15312,13 @@
   <p:clrMapOvr>
     <a:masterClrMapping/>
   </p:clrMapOvr>
+  <p:timing>
+    <p:tnLst>
+      <p:par>
+        <p:cTn xmlns:p14="http://schemas.microsoft.com/office/powerpoint/2010/main" id="1" dur="indefinite" restart="never" nodeType="tmRoot"/>
+      </p:par>
+    </p:tnLst>
+  </p:timing>
 </p:sld>
 </file>
 
@@ -15266,6 +15404,13 @@
   <p:clrMapOvr>
     <a:masterClrMapping/>
   </p:clrMapOvr>
+  <p:timing>
+    <p:tnLst>
+      <p:par>
+        <p:cTn xmlns:p14="http://schemas.microsoft.com/office/powerpoint/2010/main" id="1" dur="indefinite" restart="never" nodeType="tmRoot"/>
+      </p:par>
+    </p:tnLst>
+  </p:timing>
 </p:sld>
 </file>
 
@@ -15690,6 +15835,13 @@
   <p:clrMapOvr>
     <a:masterClrMapping/>
   </p:clrMapOvr>
+  <p:timing>
+    <p:tnLst>
+      <p:par>
+        <p:cTn xmlns:p14="http://schemas.microsoft.com/office/powerpoint/2010/main" id="1" dur="indefinite" restart="never" nodeType="tmRoot"/>
+      </p:par>
+    </p:tnLst>
+  </p:timing>
 </p:sld>
 </file>
 
@@ -15775,6 +15927,13 @@
   <p:clrMapOvr>
     <a:masterClrMapping/>
   </p:clrMapOvr>
+  <p:timing>
+    <p:tnLst>
+      <p:par>
+        <p:cTn xmlns:p14="http://schemas.microsoft.com/office/powerpoint/2010/main" id="1" dur="indefinite" restart="never" nodeType="tmRoot"/>
+      </p:par>
+    </p:tnLst>
+  </p:timing>
 </p:sld>
 </file>
 
@@ -15968,6 +16127,13 @@
   <p:clrMapOvr>
     <a:masterClrMapping/>
   </p:clrMapOvr>
+  <p:timing>
+    <p:tnLst>
+      <p:par>
+        <p:cTn xmlns:p14="http://schemas.microsoft.com/office/powerpoint/2010/main" id="1" dur="indefinite" restart="never" nodeType="tmRoot"/>
+      </p:par>
+    </p:tnLst>
+  </p:timing>
 </p:sld>
 </file>
 
@@ -16178,6 +16344,13 @@
   <p:clrMapOvr>
     <a:masterClrMapping/>
   </p:clrMapOvr>
+  <p:timing>
+    <p:tnLst>
+      <p:par>
+        <p:cTn xmlns:p14="http://schemas.microsoft.com/office/powerpoint/2010/main" id="1" dur="indefinite" restart="never" nodeType="tmRoot"/>
+      </p:par>
+    </p:tnLst>
+  </p:timing>
 </p:sld>
 </file>
 

</xml_diff>